<commit_message>
mongodb文档 by qiyu 2022-05-04
</commit_message>
<xml_diff>
--- a/doc/MongoDB索引.pptx
+++ b/doc/MongoDB索引.pptx
@@ -9,10 +9,11 @@
     <p:sldId id="257" r:id="rId3"/>
     <p:sldId id="258" r:id="rId4"/>
     <p:sldId id="259" r:id="rId5"/>
-    <p:sldId id="260" r:id="rId6"/>
-    <p:sldId id="261" r:id="rId7"/>
-    <p:sldId id="262" r:id="rId8"/>
-    <p:sldId id="263" r:id="rId9"/>
+    <p:sldId id="264" r:id="rId6"/>
+    <p:sldId id="260" r:id="rId7"/>
+    <p:sldId id="261" r:id="rId8"/>
+    <p:sldId id="262" r:id="rId9"/>
+    <p:sldId id="263" r:id="rId10"/>
   </p:sldIdLst>
   <p:sldSz cx="12192000" cy="6858000"/>
   <p:notesSz cx="6858000" cy="9144000"/>
@@ -7970,6 +7971,17 @@
           <a:lstStyle/>
           <a:p>
             <a:r>
+              <a:rPr kumimoji="1" lang="en-US" altLang="zh-CN" dirty="0"/>
+              <a:t>_id</a:t>
+            </a:r>
+            <a:r>
+              <a:rPr kumimoji="1" lang="zh-CN" altLang="en-US" dirty="0"/>
+              <a:t>索引</a:t>
+            </a:r>
+            <a:endParaRPr kumimoji="1" lang="en-US" altLang="zh-CN" dirty="0"/>
+          </a:p>
+          <a:p>
+            <a:r>
               <a:rPr kumimoji="1" lang="zh-CN" altLang="en-US" dirty="0"/>
               <a:t>单字段索引</a:t>
             </a:r>
@@ -7987,6 +7999,16 @@
               <a:rPr kumimoji="1" lang="zh-CN" altLang="en-US" dirty="0"/>
               <a:t>多键索引</a:t>
             </a:r>
+            <a:endParaRPr kumimoji="1" lang="en-US" altLang="zh-CN" dirty="0"/>
+          </a:p>
+          <a:p>
+            <a:r>
+              <a:rPr kumimoji="1" lang="zh-CN" altLang="en-US" dirty="0"/>
+              <a:t>过期索引</a:t>
+            </a:r>
+            <a:endParaRPr kumimoji="1" lang="en-US" altLang="zh-CN" dirty="0"/>
+          </a:p>
+          <a:p>
             <a:endParaRPr kumimoji="1" lang="en-US" altLang="zh-CN" dirty="0"/>
           </a:p>
           <a:p>
@@ -8257,7 +8279,7 @@
           <p:cNvPr id="2" name="标题 1">
             <a:extLst>
               <a:ext uri="{FF2B5EF4-FFF2-40B4-BE49-F238E27FC236}">
-                <a16:creationId xmlns:a16="http://schemas.microsoft.com/office/drawing/2014/main" id="{450E7134-F245-9147-9448-145F2B1A2FFB}"/>
+                <a16:creationId xmlns:a16="http://schemas.microsoft.com/office/drawing/2014/main" id="{0FD412CA-2282-9B4B-8284-7BC751F258BB}"/>
               </a:ext>
             </a:extLst>
           </p:cNvPr>
@@ -8274,12 +8296,8 @@
           <a:lstStyle/>
           <a:p>
             <a:r>
-              <a:rPr kumimoji="1" lang="en-US" altLang="zh-CN" dirty="0"/>
-              <a:t>B-Tree</a:t>
-            </a:r>
-            <a:r>
               <a:rPr kumimoji="1" lang="zh-CN" altLang="en-US" dirty="0"/>
-              <a:t>索引</a:t>
+              <a:t>覆盖索引</a:t>
             </a:r>
           </a:p>
         </p:txBody>
@@ -8289,7 +8307,7 @@
           <p:cNvPr id="3" name="内容占位符 2">
             <a:extLst>
               <a:ext uri="{FF2B5EF4-FFF2-40B4-BE49-F238E27FC236}">
-                <a16:creationId xmlns:a16="http://schemas.microsoft.com/office/drawing/2014/main" id="{E3F0AB26-A870-354B-AC3A-EA550F362FDE}"/>
+                <a16:creationId xmlns:a16="http://schemas.microsoft.com/office/drawing/2014/main" id="{3490AE3A-8EF3-9F40-864E-741552CF2B71}"/>
               </a:ext>
             </a:extLst>
           </p:cNvPr>
@@ -8305,14 +8323,14 @@
           <a:bodyPr/>
           <a:lstStyle/>
           <a:p>
-            <a:endParaRPr kumimoji="1" lang="zh-CN" altLang="en-US"/>
+            <a:endParaRPr kumimoji="1" lang="zh-CN" altLang="en-US" dirty="0"/>
           </a:p>
         </p:txBody>
       </p:sp>
     </p:spTree>
     <p:extLst>
       <p:ext uri="{BB962C8B-B14F-4D97-AF65-F5344CB8AC3E}">
-        <p14:creationId xmlns:p14="http://schemas.microsoft.com/office/powerpoint/2010/main" val="145157885"/>
+        <p14:creationId xmlns:p14="http://schemas.microsoft.com/office/powerpoint/2010/main" val="2008845935"/>
       </p:ext>
     </p:extLst>
   </p:cSld>
@@ -8344,7 +8362,7 @@
           <p:cNvPr id="2" name="标题 1">
             <a:extLst>
               <a:ext uri="{FF2B5EF4-FFF2-40B4-BE49-F238E27FC236}">
-                <a16:creationId xmlns:a16="http://schemas.microsoft.com/office/drawing/2014/main" id="{91D3547B-93D4-8846-A98A-8144B61C46E8}"/>
+                <a16:creationId xmlns:a16="http://schemas.microsoft.com/office/drawing/2014/main" id="{450E7134-F245-9147-9448-145F2B1A2FFB}"/>
               </a:ext>
             </a:extLst>
           </p:cNvPr>
@@ -8361,8 +8379,8 @@
           <a:lstStyle/>
           <a:p>
             <a:r>
-              <a:rPr kumimoji="1" lang="en-US" altLang="zh-CN" dirty="0" err="1"/>
-              <a:t>B+Tree</a:t>
+              <a:rPr kumimoji="1" lang="en-US" altLang="zh-CN" dirty="0"/>
+              <a:t>B-Tree</a:t>
             </a:r>
             <a:r>
               <a:rPr kumimoji="1" lang="zh-CN" altLang="en-US" dirty="0"/>
@@ -8376,7 +8394,7 @@
           <p:cNvPr id="3" name="内容占位符 2">
             <a:extLst>
               <a:ext uri="{FF2B5EF4-FFF2-40B4-BE49-F238E27FC236}">
-                <a16:creationId xmlns:a16="http://schemas.microsoft.com/office/drawing/2014/main" id="{2BF6E963-4DB7-224F-AB1C-E11073917934}"/>
+                <a16:creationId xmlns:a16="http://schemas.microsoft.com/office/drawing/2014/main" id="{E3F0AB26-A870-354B-AC3A-EA550F362FDE}"/>
               </a:ext>
             </a:extLst>
           </p:cNvPr>
@@ -8392,14 +8410,14 @@
           <a:bodyPr/>
           <a:lstStyle/>
           <a:p>
-            <a:endParaRPr kumimoji="1" lang="zh-CN" altLang="en-US" dirty="0"/>
+            <a:endParaRPr kumimoji="1" lang="zh-CN" altLang="en-US"/>
           </a:p>
         </p:txBody>
       </p:sp>
     </p:spTree>
     <p:extLst>
       <p:ext uri="{BB962C8B-B14F-4D97-AF65-F5344CB8AC3E}">
-        <p14:creationId xmlns:p14="http://schemas.microsoft.com/office/powerpoint/2010/main" val="437534014"/>
+        <p14:creationId xmlns:p14="http://schemas.microsoft.com/office/powerpoint/2010/main" val="145157885"/>
       </p:ext>
     </p:extLst>
   </p:cSld>
@@ -8431,7 +8449,7 @@
           <p:cNvPr id="2" name="标题 1">
             <a:extLst>
               <a:ext uri="{FF2B5EF4-FFF2-40B4-BE49-F238E27FC236}">
-                <a16:creationId xmlns:a16="http://schemas.microsoft.com/office/drawing/2014/main" id="{951C8D9F-F918-094F-B3B7-0B4A65FD2AAB}"/>
+                <a16:creationId xmlns:a16="http://schemas.microsoft.com/office/drawing/2014/main" id="{91D3547B-93D4-8846-A98A-8144B61C46E8}"/>
               </a:ext>
             </a:extLst>
           </p:cNvPr>
@@ -8448,12 +8466,12 @@
           <a:lstStyle/>
           <a:p>
             <a:r>
-              <a:rPr kumimoji="1" lang="en-US" altLang="zh-CN" dirty="0"/>
-              <a:t>MongoDB</a:t>
+              <a:rPr kumimoji="1" lang="en-US" altLang="zh-CN" dirty="0" err="1"/>
+              <a:t>B+Tree</a:t>
             </a:r>
             <a:r>
               <a:rPr kumimoji="1" lang="zh-CN" altLang="en-US" dirty="0"/>
-              <a:t>到底用的什么索引？</a:t>
+              <a:t>索引</a:t>
             </a:r>
           </a:p>
         </p:txBody>
@@ -8463,7 +8481,7 @@
           <p:cNvPr id="3" name="内容占位符 2">
             <a:extLst>
               <a:ext uri="{FF2B5EF4-FFF2-40B4-BE49-F238E27FC236}">
-                <a16:creationId xmlns:a16="http://schemas.microsoft.com/office/drawing/2014/main" id="{C367EE54-4DFA-E24F-9986-823FBF52E925}"/>
+                <a16:creationId xmlns:a16="http://schemas.microsoft.com/office/drawing/2014/main" id="{2BF6E963-4DB7-224F-AB1C-E11073917934}"/>
               </a:ext>
             </a:extLst>
           </p:cNvPr>
@@ -8479,129 +8497,14 @@
           <a:bodyPr/>
           <a:lstStyle/>
           <a:p>
-            <a:r>
-              <a:rPr lang="en-US" altLang="zh-CN" dirty="0">
-                <a:hlinkClick r:id="rId2"/>
-              </a:rPr>
-              <a:t>MMAPV1</a:t>
-            </a:r>
-            <a:r>
-              <a:rPr lang="zh-CN" altLang="en-US" dirty="0">
-                <a:hlinkClick r:id="rId2"/>
-              </a:rPr>
-              <a:t>是</a:t>
-            </a:r>
-            <a:r>
-              <a:rPr lang="en" altLang="zh-CN" dirty="0"/>
-              <a:t>MongoDB 3.2</a:t>
-            </a:r>
-            <a:r>
-              <a:rPr lang="zh-CN" altLang="en" dirty="0"/>
-              <a:t>前</a:t>
-            </a:r>
-            <a:r>
-              <a:rPr lang="zh-CN" altLang="en-US" dirty="0"/>
-              <a:t>的默认存储引擎，</a:t>
-            </a:r>
-            <a:r>
-              <a:rPr lang="en-US" altLang="zh-CN" dirty="0"/>
-              <a:t>4.0</a:t>
-            </a:r>
-            <a:r>
-              <a:rPr lang="zh-CN" altLang="en-US" dirty="0"/>
-              <a:t>废弃，使用的是</a:t>
-            </a:r>
-            <a:r>
-              <a:rPr lang="en-US" altLang="zh-CN" dirty="0"/>
-              <a:t>B-Tree</a:t>
-            </a:r>
-            <a:endParaRPr lang="en" altLang="zh-CN" u="sng" dirty="0">
-              <a:hlinkClick r:id="rId2"/>
-            </a:endParaRPr>
-          </a:p>
-          <a:p>
-            <a:r>
-              <a:rPr lang="en" altLang="zh-CN" u="sng" dirty="0">
-                <a:hlinkClick r:id="rId2"/>
-              </a:rPr>
-              <a:t>WiredTiger</a:t>
-            </a:r>
-            <a:r>
-              <a:rPr lang="zh-CN" altLang="en-US" dirty="0"/>
-              <a:t>是从</a:t>
-            </a:r>
-            <a:r>
-              <a:rPr lang="en" altLang="zh-CN" dirty="0"/>
-              <a:t>MongoDB 3.2</a:t>
-            </a:r>
-            <a:r>
-              <a:rPr lang="zh-CN" altLang="en-US" dirty="0"/>
-              <a:t>开始的默认存储引擎，索引文件用的</a:t>
-            </a:r>
-            <a:r>
-              <a:rPr lang="en-US" altLang="zh-CN" dirty="0"/>
-              <a:t>B-Tree</a:t>
-            </a:r>
-            <a:r>
-              <a:rPr lang="zh-CN" altLang="en-US" dirty="0"/>
-              <a:t>，数据文件使用的是</a:t>
-            </a:r>
-            <a:r>
-              <a:rPr lang="en-US" altLang="zh-CN" dirty="0" err="1"/>
-              <a:t>B+Tree</a:t>
-            </a:r>
-            <a:endParaRPr kumimoji="1" lang="en" altLang="zh-CN" dirty="0">
-              <a:hlinkClick r:id="rId3"/>
-            </a:endParaRPr>
-          </a:p>
-          <a:p>
-            <a:r>
-              <a:rPr kumimoji="1" lang="en" altLang="zh-CN" dirty="0">
-                <a:hlinkClick r:id="rId3"/>
-              </a:rPr>
-              <a:t>http://source.wiredtiger.com/3.2.1/tune_page_size_and_comp.html</a:t>
-            </a:r>
-            <a:endParaRPr kumimoji="1" lang="en" altLang="zh-CN" dirty="0"/>
-          </a:p>
-          <a:p>
             <a:endParaRPr kumimoji="1" lang="zh-CN" altLang="en-US" dirty="0"/>
           </a:p>
         </p:txBody>
       </p:sp>
-      <p:pic>
-        <p:nvPicPr>
-          <p:cNvPr id="4" name="图片 3">
-            <a:extLst>
-              <a:ext uri="{FF2B5EF4-FFF2-40B4-BE49-F238E27FC236}">
-                <a16:creationId xmlns:a16="http://schemas.microsoft.com/office/drawing/2014/main" id="{DFEEAF35-0EDD-584D-98B7-043329147B46}"/>
-              </a:ext>
-            </a:extLst>
-          </p:cNvPr>
-          <p:cNvPicPr>
-            <a:picLocks noChangeAspect="1"/>
-          </p:cNvPicPr>
-          <p:nvPr/>
-        </p:nvPicPr>
-        <p:blipFill>
-          <a:blip r:embed="rId4"/>
-          <a:stretch>
-            <a:fillRect/>
-          </a:stretch>
-        </p:blipFill>
-        <p:spPr>
-          <a:xfrm>
-            <a:off x="1531599" y="4171951"/>
-            <a:ext cx="10388600" cy="1562100"/>
-          </a:xfrm>
-          <a:prstGeom prst="rect">
-            <a:avLst/>
-          </a:prstGeom>
-        </p:spPr>
-      </p:pic>
     </p:spTree>
     <p:extLst>
       <p:ext uri="{BB962C8B-B14F-4D97-AF65-F5344CB8AC3E}">
-        <p14:creationId xmlns:p14="http://schemas.microsoft.com/office/powerpoint/2010/main" val="448146830"/>
+        <p14:creationId xmlns:p14="http://schemas.microsoft.com/office/powerpoint/2010/main" val="437534014"/>
       </p:ext>
     </p:extLst>
   </p:cSld>
@@ -8633,6 +8536,231 @@
           <p:cNvPr id="2" name="标题 1">
             <a:extLst>
               <a:ext uri="{FF2B5EF4-FFF2-40B4-BE49-F238E27FC236}">
+                <a16:creationId xmlns:a16="http://schemas.microsoft.com/office/drawing/2014/main" id="{951C8D9F-F918-094F-B3B7-0B4A65FD2AAB}"/>
+              </a:ext>
+            </a:extLst>
+          </p:cNvPr>
+          <p:cNvSpPr>
+            <a:spLocks noGrp="1"/>
+          </p:cNvSpPr>
+          <p:nvPr>
+            <p:ph type="title"/>
+          </p:nvPr>
+        </p:nvSpPr>
+        <p:spPr/>
+        <p:txBody>
+          <a:bodyPr/>
+          <a:lstStyle/>
+          <a:p>
+            <a:r>
+              <a:rPr kumimoji="1" lang="en-US" altLang="zh-CN" dirty="0"/>
+              <a:t>MongoDB</a:t>
+            </a:r>
+            <a:r>
+              <a:rPr kumimoji="1" lang="zh-CN" altLang="en-US" dirty="0"/>
+              <a:t>到底用的什么索引？</a:t>
+            </a:r>
+          </a:p>
+        </p:txBody>
+      </p:sp>
+      <p:sp>
+        <p:nvSpPr>
+          <p:cNvPr id="3" name="内容占位符 2">
+            <a:extLst>
+              <a:ext uri="{FF2B5EF4-FFF2-40B4-BE49-F238E27FC236}">
+                <a16:creationId xmlns:a16="http://schemas.microsoft.com/office/drawing/2014/main" id="{C367EE54-4DFA-E24F-9986-823FBF52E925}"/>
+              </a:ext>
+            </a:extLst>
+          </p:cNvPr>
+          <p:cNvSpPr>
+            <a:spLocks noGrp="1"/>
+          </p:cNvSpPr>
+          <p:nvPr>
+            <p:ph idx="1"/>
+          </p:nvPr>
+        </p:nvSpPr>
+        <p:spPr/>
+        <p:txBody>
+          <a:bodyPr/>
+          <a:lstStyle/>
+          <a:p>
+            <a:r>
+              <a:rPr lang="en-US" altLang="zh-CN" dirty="0">
+                <a:hlinkClick r:id="rId2"/>
+              </a:rPr>
+              <a:t>MMAPV1</a:t>
+            </a:r>
+            <a:r>
+              <a:rPr lang="zh-CN" altLang="en-US" dirty="0">
+                <a:hlinkClick r:id="rId2"/>
+              </a:rPr>
+              <a:t>是</a:t>
+            </a:r>
+            <a:r>
+              <a:rPr lang="en" altLang="zh-CN" dirty="0"/>
+              <a:t>MongoDB 3.2</a:t>
+            </a:r>
+            <a:r>
+              <a:rPr lang="zh-CN" altLang="en" dirty="0"/>
+              <a:t>前</a:t>
+            </a:r>
+            <a:r>
+              <a:rPr lang="zh-CN" altLang="en-US" dirty="0"/>
+              <a:t>的默认存储引擎，</a:t>
+            </a:r>
+            <a:r>
+              <a:rPr lang="en-US" altLang="zh-CN" dirty="0"/>
+              <a:t>4.0</a:t>
+            </a:r>
+            <a:r>
+              <a:rPr lang="zh-CN" altLang="en-US" dirty="0"/>
+              <a:t>废弃，使用的是</a:t>
+            </a:r>
+            <a:r>
+              <a:rPr lang="en-US" altLang="zh-CN" dirty="0"/>
+              <a:t>B-Tree</a:t>
+            </a:r>
+            <a:endParaRPr lang="en" altLang="zh-CN" u="sng" dirty="0">
+              <a:hlinkClick r:id="rId2"/>
+            </a:endParaRPr>
+          </a:p>
+          <a:p>
+            <a:r>
+              <a:rPr lang="en" altLang="zh-CN" u="sng" dirty="0">
+                <a:hlinkClick r:id="rId2"/>
+              </a:rPr>
+              <a:t>WiredTiger</a:t>
+            </a:r>
+            <a:r>
+              <a:rPr lang="zh-CN" altLang="en-US" dirty="0"/>
+              <a:t>是从</a:t>
+            </a:r>
+            <a:r>
+              <a:rPr lang="en" altLang="zh-CN" dirty="0"/>
+              <a:t>MongoDB 3.2</a:t>
+            </a:r>
+            <a:r>
+              <a:rPr lang="zh-CN" altLang="en-US" dirty="0"/>
+              <a:t>开始的默认存储引擎，索引文件用的</a:t>
+            </a:r>
+            <a:r>
+              <a:rPr lang="en-US" altLang="zh-CN" dirty="0"/>
+              <a:t>B-Tree</a:t>
+            </a:r>
+            <a:r>
+              <a:rPr lang="zh-CN" altLang="en-US" dirty="0"/>
+              <a:t>，数据文件使用的是</a:t>
+            </a:r>
+            <a:r>
+              <a:rPr lang="en-US" altLang="zh-CN" dirty="0" err="1"/>
+              <a:t>B+Tree</a:t>
+            </a:r>
+            <a:endParaRPr lang="en-US" altLang="zh-CN" dirty="0"/>
+          </a:p>
+          <a:p>
+            <a:r>
+              <a:rPr kumimoji="1" lang="zh-CN" altLang="en-US" dirty="0">
+                <a:hlinkClick r:id="rId3"/>
+              </a:rPr>
+              <a:t>参考：</a:t>
+            </a:r>
+            <a:endParaRPr kumimoji="1" lang="en" altLang="zh-CN" dirty="0">
+              <a:hlinkClick r:id="rId3"/>
+            </a:endParaRPr>
+          </a:p>
+          <a:p>
+            <a:r>
+              <a:rPr kumimoji="1" lang="en" altLang="zh-CN" dirty="0">
+                <a:hlinkClick r:id="rId3"/>
+              </a:rPr>
+              <a:t>http://source.wiredtiger.com/3.2.1/tune_page_size_and_comp.html</a:t>
+            </a:r>
+            <a:endParaRPr kumimoji="1" lang="en" altLang="zh-CN" dirty="0"/>
+          </a:p>
+          <a:p>
+            <a:r>
+              <a:rPr kumimoji="1" lang="en" altLang="zh-CN" dirty="0"/>
+              <a:t>https://</a:t>
+            </a:r>
+            <a:r>
+              <a:rPr kumimoji="1" lang="en" altLang="zh-CN" dirty="0" err="1"/>
+              <a:t>mongoing.com</a:t>
+            </a:r>
+            <a:r>
+              <a:rPr kumimoji="1" lang="en" altLang="zh-CN" dirty="0"/>
+              <a:t>/topic/archives-35143</a:t>
+            </a:r>
+          </a:p>
+          <a:p>
+            <a:endParaRPr kumimoji="1" lang="zh-CN" altLang="en-US" dirty="0"/>
+          </a:p>
+        </p:txBody>
+      </p:sp>
+      <p:pic>
+        <p:nvPicPr>
+          <p:cNvPr id="4" name="图片 3">
+            <a:extLst>
+              <a:ext uri="{FF2B5EF4-FFF2-40B4-BE49-F238E27FC236}">
+                <a16:creationId xmlns:a16="http://schemas.microsoft.com/office/drawing/2014/main" id="{DFEEAF35-0EDD-584D-98B7-043329147B46}"/>
+              </a:ext>
+            </a:extLst>
+          </p:cNvPr>
+          <p:cNvPicPr>
+            <a:picLocks noChangeAspect="1"/>
+          </p:cNvPicPr>
+          <p:nvPr/>
+        </p:nvPicPr>
+        <p:blipFill>
+          <a:blip r:embed="rId4"/>
+          <a:stretch>
+            <a:fillRect/>
+          </a:stretch>
+        </p:blipFill>
+        <p:spPr>
+          <a:xfrm>
+            <a:off x="1385685" y="4577722"/>
+            <a:ext cx="10388600" cy="1562100"/>
+          </a:xfrm>
+          <a:prstGeom prst="rect">
+            <a:avLst/>
+          </a:prstGeom>
+        </p:spPr>
+      </p:pic>
+    </p:spTree>
+    <p:extLst>
+      <p:ext uri="{BB962C8B-B14F-4D97-AF65-F5344CB8AC3E}">
+        <p14:creationId xmlns:p14="http://schemas.microsoft.com/office/powerpoint/2010/main" val="448146830"/>
+      </p:ext>
+    </p:extLst>
+  </p:cSld>
+  <p:clrMapOvr>
+    <a:masterClrMapping/>
+  </p:clrMapOvr>
+</p:sld>
+</file>
+
+<file path=ppt/slides/slide9.xml><?xml version="1.0" encoding="utf-8"?>
+<p:sld xmlns:a="http://schemas.openxmlformats.org/drawingml/2006/main" xmlns:r="http://schemas.openxmlformats.org/officeDocument/2006/relationships" xmlns:p="http://schemas.openxmlformats.org/presentationml/2006/main">
+  <p:cSld>
+    <p:spTree>
+      <p:nvGrpSpPr>
+        <p:cNvPr id="1" name=""/>
+        <p:cNvGrpSpPr/>
+        <p:nvPr/>
+      </p:nvGrpSpPr>
+      <p:grpSpPr>
+        <a:xfrm>
+          <a:off x="0" y="0"/>
+          <a:ext cx="0" cy="0"/>
+          <a:chOff x="0" y="0"/>
+          <a:chExt cx="0" cy="0"/>
+        </a:xfrm>
+      </p:grpSpPr>
+      <p:sp>
+        <p:nvSpPr>
+          <p:cNvPr id="2" name="标题 1">
+            <a:extLst>
+              <a:ext uri="{FF2B5EF4-FFF2-40B4-BE49-F238E27FC236}">
                 <a16:creationId xmlns:a16="http://schemas.microsoft.com/office/drawing/2014/main" id="{E4AE24F0-D3AD-A547-9872-9856F5FE7DA9}"/>
               </a:ext>
             </a:extLst>
@@ -8649,35 +8777,67 @@
           <a:bodyPr/>
           <a:lstStyle/>
           <a:p>
-            <a:endParaRPr kumimoji="1" lang="zh-CN" altLang="en-US"/>
-          </a:p>
-        </p:txBody>
-      </p:sp>
-      <p:sp>
-        <p:nvSpPr>
-          <p:cNvPr id="3" name="内容占位符 2">
+            <a:r>
+              <a:rPr lang="en" altLang="zh-CN" dirty="0" err="1"/>
+              <a:t>WiredTiger</a:t>
+            </a:r>
+            <a:r>
+              <a:rPr lang="zh-CN" altLang="en-US" dirty="0"/>
+              <a:t>数据文件在磁盘上的存储结构</a:t>
+            </a:r>
+            <a:endParaRPr kumimoji="1" lang="zh-CN" altLang="en-US" dirty="0"/>
+          </a:p>
+        </p:txBody>
+      </p:sp>
+      <p:pic>
+        <p:nvPicPr>
+          <p:cNvPr id="1026" name="Picture 2">
             <a:extLst>
               <a:ext uri="{FF2B5EF4-FFF2-40B4-BE49-F238E27FC236}">
-                <a16:creationId xmlns:a16="http://schemas.microsoft.com/office/drawing/2014/main" id="{95B69CEC-2F8D-5440-9AF6-8888FF3AA12B}"/>
+                <a16:creationId xmlns:a16="http://schemas.microsoft.com/office/drawing/2014/main" id="{13179A40-80A1-F34A-84C7-AAAD4498E4C0}"/>
               </a:ext>
             </a:extLst>
           </p:cNvPr>
-          <p:cNvSpPr>
-            <a:spLocks noGrp="1"/>
-          </p:cNvSpPr>
+          <p:cNvPicPr>
+            <a:picLocks noGrp="1" noChangeAspect="1" noChangeArrowheads="1"/>
+          </p:cNvPicPr>
           <p:nvPr>
             <p:ph idx="1"/>
           </p:nvPr>
-        </p:nvSpPr>
-        <p:spPr/>
-        <p:txBody>
-          <a:bodyPr/>
-          <a:lstStyle/>
-          <a:p>
-            <a:endParaRPr kumimoji="1" lang="zh-CN" altLang="en-US"/>
-          </a:p>
-        </p:txBody>
-      </p:sp>
+        </p:nvPicPr>
+        <p:blipFill>
+          <a:blip r:embed="rId2">
+            <a:extLst>
+              <a:ext uri="{28A0092B-C50C-407E-A947-70E740481C1C}">
+                <a14:useLocalDpi xmlns:a14="http://schemas.microsoft.com/office/drawing/2010/main" val="0"/>
+              </a:ext>
+            </a:extLst>
+          </a:blip>
+          <a:srcRect/>
+          <a:stretch>
+            <a:fillRect/>
+          </a:stretch>
+        </p:blipFill>
+        <p:spPr bwMode="auto">
+          <a:xfrm>
+            <a:off x="4208463" y="2251075"/>
+            <a:ext cx="5676900" cy="3543300"/>
+          </a:xfrm>
+          <a:prstGeom prst="rect">
+            <a:avLst/>
+          </a:prstGeom>
+          <a:noFill/>
+          <a:extLst>
+            <a:ext uri="{909E8E84-426E-40DD-AFC4-6F175D3DCCD1}">
+              <a14:hiddenFill xmlns:a14="http://schemas.microsoft.com/office/drawing/2010/main">
+                <a:solidFill>
+                  <a:srgbClr val="FFFFFF"/>
+                </a:solidFill>
+              </a14:hiddenFill>
+            </a:ext>
+          </a:extLst>
+        </p:spPr>
+      </p:pic>
     </p:spTree>
     <p:extLst>
       <p:ext uri="{BB962C8B-B14F-4D97-AF65-F5344CB8AC3E}">

</xml_diff>

<commit_message>
mongodb文档 by qiyu 2022-05-16
</commit_message>
<xml_diff>
--- a/doc/MongoDB索引.pptx
+++ b/doc/MongoDB索引.pptx
@@ -3002,7 +3002,7 @@
         <p:spPr>
           <a:xfrm>
             <a:off x="0" y="2575080"/>
-            <a:ext cx="100080" cy="625320"/>
+            <a:ext cx="98640" cy="623880"/>
           </a:xfrm>
           <a:custGeom>
             <a:avLst/>
@@ -3068,7 +3068,7 @@
         <p:spPr>
           <a:xfrm>
             <a:off x="128520" y="3156480"/>
-            <a:ext cx="645840" cy="2321640"/>
+            <a:ext cx="644400" cy="2320200"/>
           </a:xfrm>
           <a:custGeom>
             <a:avLst/>
@@ -3139,7 +3139,7 @@
         <p:spPr>
           <a:xfrm>
             <a:off x="807120" y="5447160"/>
-            <a:ext cx="608760" cy="1419480"/>
+            <a:ext cx="607320" cy="1418040"/>
           </a:xfrm>
           <a:custGeom>
             <a:avLst/>
@@ -3215,7 +3215,7 @@
         <p:spPr>
           <a:xfrm>
             <a:off x="959760" y="6503760"/>
-            <a:ext cx="170640" cy="362880"/>
+            <a:ext cx="169200" cy="361440"/>
           </a:xfrm>
           <a:custGeom>
             <a:avLst/>
@@ -3271,7 +3271,7 @@
         <p:spPr>
           <a:xfrm>
             <a:off x="100800" y="3201120"/>
-            <a:ext cx="821160" cy="3327840"/>
+            <a:ext cx="819720" cy="3326400"/>
           </a:xfrm>
           <a:custGeom>
             <a:avLst/>
@@ -3362,7 +3362,7 @@
         <p:spPr>
           <a:xfrm>
             <a:off x="22320" y="228600"/>
-            <a:ext cx="105480" cy="2927160"/>
+            <a:ext cx="104040" cy="2925720"/>
           </a:xfrm>
           <a:custGeom>
             <a:avLst/>
@@ -3448,7 +3448,7 @@
         <p:spPr>
           <a:xfrm>
             <a:off x="78120" y="2944080"/>
-            <a:ext cx="77400" cy="493200"/>
+            <a:ext cx="75960" cy="491760"/>
           </a:xfrm>
           <a:custGeom>
             <a:avLst/>
@@ -3514,7 +3514,7 @@
         <p:spPr>
           <a:xfrm>
             <a:off x="769680" y="5478840"/>
-            <a:ext cx="189360" cy="1024200"/>
+            <a:ext cx="187920" cy="1022760"/>
           </a:xfrm>
           <a:custGeom>
             <a:avLst/>
@@ -3600,7 +3600,7 @@
         <p:spPr>
           <a:xfrm>
             <a:off x="775440" y="1398960"/>
-            <a:ext cx="2075400" cy="4047480"/>
+            <a:ext cx="2073960" cy="4046040"/>
           </a:xfrm>
           <a:custGeom>
             <a:avLst/>
@@ -3721,7 +3721,7 @@
         <p:spPr>
           <a:xfrm>
             <a:off x="922680" y="6530040"/>
-            <a:ext cx="161280" cy="336600"/>
+            <a:ext cx="159840" cy="335160"/>
           </a:xfrm>
           <a:custGeom>
             <a:avLst/>
@@ -3777,7 +3777,7 @@
         <p:spPr>
           <a:xfrm>
             <a:off x="769680" y="5359320"/>
-            <a:ext cx="36720" cy="221040"/>
+            <a:ext cx="35280" cy="219600"/>
           </a:xfrm>
           <a:custGeom>
             <a:avLst/>
@@ -3843,7 +3843,7 @@
         <p:spPr>
           <a:xfrm>
             <a:off x="849960" y="6244560"/>
-            <a:ext cx="237960" cy="621720"/>
+            <a:ext cx="236520" cy="620280"/>
           </a:xfrm>
           <a:custGeom>
             <a:avLst/>
@@ -3919,7 +3919,7 @@
         <p:spPr>
           <a:xfrm>
             <a:off x="27360" y="-720"/>
-            <a:ext cx="493560" cy="4400280"/>
+            <a:ext cx="492120" cy="4398840"/>
           </a:xfrm>
           <a:custGeom>
             <a:avLst/>
@@ -4028,7 +4028,7 @@
         <p:spPr>
           <a:xfrm>
             <a:off x="550440" y="4316400"/>
-            <a:ext cx="422640" cy="1580040"/>
+            <a:ext cx="421200" cy="1578600"/>
           </a:xfrm>
           <a:custGeom>
             <a:avLst/>
@@ -4102,7 +4102,7 @@
         <p:spPr>
           <a:xfrm>
             <a:off x="1006200" y="5862600"/>
-            <a:ext cx="430200" cy="990000"/>
+            <a:ext cx="428760" cy="988560"/>
           </a:xfrm>
           <a:custGeom>
             <a:avLst/>
@@ -4176,7 +4176,7 @@
         <p:spPr>
           <a:xfrm>
             <a:off x="521640" y="4364280"/>
-            <a:ext cx="551160" cy="2235240"/>
+            <a:ext cx="549720" cy="2233800"/>
           </a:xfrm>
           <a:custGeom>
             <a:avLst/>
@@ -4265,7 +4265,7 @@
         <p:spPr>
           <a:xfrm>
             <a:off x="468000" y="1289160"/>
-            <a:ext cx="173520" cy="3026520"/>
+            <a:ext cx="172080" cy="3025080"/>
           </a:xfrm>
           <a:custGeom>
             <a:avLst/>
@@ -4364,7 +4364,7 @@
         <p:spPr>
           <a:xfrm>
             <a:off x="1111680" y="6571440"/>
-            <a:ext cx="133560" cy="280800"/>
+            <a:ext cx="132120" cy="279360"/>
           </a:xfrm>
           <a:custGeom>
             <a:avLst/>
@@ -4418,7 +4418,7 @@
         <p:spPr>
           <a:xfrm>
             <a:off x="502560" y="4107600"/>
-            <a:ext cx="81720" cy="510840"/>
+            <a:ext cx="80280" cy="509400"/>
           </a:xfrm>
           <a:custGeom>
             <a:avLst/>
@@ -4487,7 +4487,7 @@
         <p:spPr>
           <a:xfrm>
             <a:off x="973800" y="3145680"/>
-            <a:ext cx="1409400" cy="2716200"/>
+            <a:ext cx="1407960" cy="2714760"/>
           </a:xfrm>
           <a:custGeom>
             <a:avLst/>
@@ -4601,7 +4601,7 @@
         <p:spPr>
           <a:xfrm>
             <a:off x="1073520" y="6600240"/>
-            <a:ext cx="119880" cy="252360"/>
+            <a:ext cx="118440" cy="250920"/>
           </a:xfrm>
           <a:custGeom>
             <a:avLst/>
@@ -4655,7 +4655,7 @@
         <p:spPr>
           <a:xfrm>
             <a:off x="973800" y="5897160"/>
-            <a:ext cx="137160" cy="673560"/>
+            <a:ext cx="135720" cy="672120"/>
           </a:xfrm>
           <a:custGeom>
             <a:avLst/>
@@ -4729,7 +4729,7 @@
         <p:spPr>
           <a:xfrm>
             <a:off x="973800" y="5772600"/>
-            <a:ext cx="37440" cy="227160"/>
+            <a:ext cx="36000" cy="225720"/>
           </a:xfrm>
           <a:custGeom>
             <a:avLst/>
@@ -4798,7 +4798,7 @@
         <p:spPr>
           <a:xfrm>
             <a:off x="1006200" y="6322680"/>
-            <a:ext cx="209880" cy="529920"/>
+            <a:ext cx="208440" cy="528480"/>
           </a:xfrm>
           <a:custGeom>
             <a:avLst/>
@@ -4872,7 +4872,7 @@
         <p:spPr>
           <a:xfrm>
             <a:off x="0" y="0"/>
-            <a:ext cx="182160" cy="6857280"/>
+            <a:ext cx="180720" cy="6855840"/>
           </a:xfrm>
           <a:prstGeom prst="rect">
             <a:avLst/>
@@ -4913,7 +4913,7 @@
         <p:spPr>
           <a:xfrm>
             <a:off x="0" y="4323960"/>
-            <a:ext cx="1743840" cy="777960"/>
+            <a:ext cx="1742400" cy="776520"/>
           </a:xfrm>
           <a:custGeom>
             <a:avLst/>
@@ -5003,8 +5003,8 @@
         </p:nvSpPr>
         <p:spPr>
           <a:xfrm>
-            <a:off x="2593080" y="624240"/>
-            <a:ext cx="8911080" cy="1280160"/>
+            <a:off x="609480" y="273600"/>
+            <a:ext cx="10972440" cy="1144800"/>
           </a:xfrm>
           <a:prstGeom prst="rect">
             <a:avLst/>
@@ -5014,6 +5014,20 @@
           <a:bodyPr lIns="0" rIns="0" tIns="0" bIns="0" anchor="ctr"/>
           <a:p>
             <a:pPr algn="ctr"/>
+            <a:r>
+              <a:rPr b="0" lang="en-US" sz="4400" spc="-1" strike="noStrike">
+                <a:solidFill>
+                  <a:srgbClr val="000000"/>
+                </a:solidFill>
+                <a:uFill>
+                  <a:solidFill>
+                    <a:srgbClr val="ffffff"/>
+                  </a:solidFill>
+                </a:uFill>
+                <a:latin typeface="Arial"/>
+              </a:rPr>
+              <a:t>单击鼠标编辑标题文字格式</a:t>
+            </a:r>
             <a:endParaRPr b="0" lang="en-US" sz="4400" spc="-1" strike="noStrike">
               <a:solidFill>
                 <a:srgbClr val="000000"/>
@@ -5342,7 +5356,7 @@
         <p:spPr>
           <a:xfrm>
             <a:off x="0" y="2575080"/>
-            <a:ext cx="100080" cy="625320"/>
+            <a:ext cx="98640" cy="623880"/>
           </a:xfrm>
           <a:custGeom>
             <a:avLst/>
@@ -5408,7 +5422,7 @@
         <p:spPr>
           <a:xfrm>
             <a:off x="128520" y="3156480"/>
-            <a:ext cx="645840" cy="2321640"/>
+            <a:ext cx="644400" cy="2320200"/>
           </a:xfrm>
           <a:custGeom>
             <a:avLst/>
@@ -5479,7 +5493,7 @@
         <p:spPr>
           <a:xfrm>
             <a:off x="807120" y="5447160"/>
-            <a:ext cx="608760" cy="1419480"/>
+            <a:ext cx="607320" cy="1418040"/>
           </a:xfrm>
           <a:custGeom>
             <a:avLst/>
@@ -5555,7 +5569,7 @@
         <p:spPr>
           <a:xfrm>
             <a:off x="959760" y="6503760"/>
-            <a:ext cx="170640" cy="362880"/>
+            <a:ext cx="169200" cy="361440"/>
           </a:xfrm>
           <a:custGeom>
             <a:avLst/>
@@ -5611,7 +5625,7 @@
         <p:spPr>
           <a:xfrm>
             <a:off x="100800" y="3201120"/>
-            <a:ext cx="821160" cy="3327840"/>
+            <a:ext cx="819720" cy="3326400"/>
           </a:xfrm>
           <a:custGeom>
             <a:avLst/>
@@ -5702,7 +5716,7 @@
         <p:spPr>
           <a:xfrm>
             <a:off x="22320" y="228600"/>
-            <a:ext cx="105480" cy="2927160"/>
+            <a:ext cx="104040" cy="2925720"/>
           </a:xfrm>
           <a:custGeom>
             <a:avLst/>
@@ -5788,7 +5802,7 @@
         <p:spPr>
           <a:xfrm>
             <a:off x="78120" y="2944080"/>
-            <a:ext cx="77400" cy="493200"/>
+            <a:ext cx="75960" cy="491760"/>
           </a:xfrm>
           <a:custGeom>
             <a:avLst/>
@@ -5854,7 +5868,7 @@
         <p:spPr>
           <a:xfrm>
             <a:off x="769680" y="5478840"/>
-            <a:ext cx="189360" cy="1024200"/>
+            <a:ext cx="187920" cy="1022760"/>
           </a:xfrm>
           <a:custGeom>
             <a:avLst/>
@@ -5940,7 +5954,7 @@
         <p:spPr>
           <a:xfrm>
             <a:off x="775440" y="1398960"/>
-            <a:ext cx="2075400" cy="4047480"/>
+            <a:ext cx="2073960" cy="4046040"/>
           </a:xfrm>
           <a:custGeom>
             <a:avLst/>
@@ -6061,7 +6075,7 @@
         <p:spPr>
           <a:xfrm>
             <a:off x="922680" y="6530040"/>
-            <a:ext cx="161280" cy="336600"/>
+            <a:ext cx="159840" cy="335160"/>
           </a:xfrm>
           <a:custGeom>
             <a:avLst/>
@@ -6117,7 +6131,7 @@
         <p:spPr>
           <a:xfrm>
             <a:off x="769680" y="5359320"/>
-            <a:ext cx="36720" cy="221040"/>
+            <a:ext cx="35280" cy="219600"/>
           </a:xfrm>
           <a:custGeom>
             <a:avLst/>
@@ -6183,7 +6197,7 @@
         <p:spPr>
           <a:xfrm>
             <a:off x="849960" y="6244560"/>
-            <a:ext cx="237960" cy="621720"/>
+            <a:ext cx="236520" cy="620280"/>
           </a:xfrm>
           <a:custGeom>
             <a:avLst/>
@@ -6259,7 +6273,7 @@
         <p:spPr>
           <a:xfrm>
             <a:off x="27360" y="-720"/>
-            <a:ext cx="493560" cy="4400280"/>
+            <a:ext cx="492120" cy="4398840"/>
           </a:xfrm>
           <a:custGeom>
             <a:avLst/>
@@ -6368,7 +6382,7 @@
         <p:spPr>
           <a:xfrm>
             <a:off x="550440" y="4316400"/>
-            <a:ext cx="422640" cy="1580040"/>
+            <a:ext cx="421200" cy="1578600"/>
           </a:xfrm>
           <a:custGeom>
             <a:avLst/>
@@ -6442,7 +6456,7 @@
         <p:spPr>
           <a:xfrm>
             <a:off x="1006200" y="5862600"/>
-            <a:ext cx="430200" cy="990000"/>
+            <a:ext cx="428760" cy="988560"/>
           </a:xfrm>
           <a:custGeom>
             <a:avLst/>
@@ -6516,7 +6530,7 @@
         <p:spPr>
           <a:xfrm>
             <a:off x="521640" y="4364280"/>
-            <a:ext cx="551160" cy="2235240"/>
+            <a:ext cx="549720" cy="2233800"/>
           </a:xfrm>
           <a:custGeom>
             <a:avLst/>
@@ -6605,7 +6619,7 @@
         <p:spPr>
           <a:xfrm>
             <a:off x="468000" y="1289160"/>
-            <a:ext cx="173520" cy="3026520"/>
+            <a:ext cx="172080" cy="3025080"/>
           </a:xfrm>
           <a:custGeom>
             <a:avLst/>
@@ -6704,7 +6718,7 @@
         <p:spPr>
           <a:xfrm>
             <a:off x="1111680" y="6571440"/>
-            <a:ext cx="133560" cy="280800"/>
+            <a:ext cx="132120" cy="279360"/>
           </a:xfrm>
           <a:custGeom>
             <a:avLst/>
@@ -6758,7 +6772,7 @@
         <p:spPr>
           <a:xfrm>
             <a:off x="502560" y="4107600"/>
-            <a:ext cx="81720" cy="510840"/>
+            <a:ext cx="80280" cy="509400"/>
           </a:xfrm>
           <a:custGeom>
             <a:avLst/>
@@ -6827,7 +6841,7 @@
         <p:spPr>
           <a:xfrm>
             <a:off x="973800" y="3145680"/>
-            <a:ext cx="1409400" cy="2716200"/>
+            <a:ext cx="1407960" cy="2714760"/>
           </a:xfrm>
           <a:custGeom>
             <a:avLst/>
@@ -6941,7 +6955,7 @@
         <p:spPr>
           <a:xfrm>
             <a:off x="1073520" y="6600240"/>
-            <a:ext cx="119880" cy="252360"/>
+            <a:ext cx="118440" cy="250920"/>
           </a:xfrm>
           <a:custGeom>
             <a:avLst/>
@@ -6995,7 +7009,7 @@
         <p:spPr>
           <a:xfrm>
             <a:off x="973800" y="5897160"/>
-            <a:ext cx="137160" cy="673560"/>
+            <a:ext cx="135720" cy="672120"/>
           </a:xfrm>
           <a:custGeom>
             <a:avLst/>
@@ -7069,7 +7083,7 @@
         <p:spPr>
           <a:xfrm>
             <a:off x="973800" y="5772600"/>
-            <a:ext cx="37440" cy="227160"/>
+            <a:ext cx="36000" cy="225720"/>
           </a:xfrm>
           <a:custGeom>
             <a:avLst/>
@@ -7138,7 +7152,7 @@
         <p:spPr>
           <a:xfrm>
             <a:off x="1006200" y="6322680"/>
-            <a:ext cx="209880" cy="529920"/>
+            <a:ext cx="208440" cy="528480"/>
           </a:xfrm>
           <a:custGeom>
             <a:avLst/>
@@ -7212,7 +7226,7 @@
         <p:spPr>
           <a:xfrm>
             <a:off x="0" y="0"/>
-            <a:ext cx="182160" cy="6857280"/>
+            <a:ext cx="180720" cy="6855840"/>
           </a:xfrm>
           <a:prstGeom prst="rect">
             <a:avLst/>
@@ -7252,8 +7266,8 @@
         </p:nvSpPr>
         <p:spPr>
           <a:xfrm flipV="1">
-            <a:off x="-4320" y="713520"/>
-            <a:ext cx="1587960" cy="506520"/>
+            <a:off x="-4320" y="712080"/>
+            <a:ext cx="1586520" cy="505080"/>
           </a:xfrm>
           <a:custGeom>
             <a:avLst/>
@@ -7696,7 +7710,7 @@
         <p:spPr>
           <a:xfrm>
             <a:off x="2589120" y="792720"/>
-            <a:ext cx="8914680" cy="2262240"/>
+            <a:ext cx="8913240" cy="2260800"/>
           </a:xfrm>
           <a:prstGeom prst="rect">
             <a:avLst/>
@@ -7726,6 +7740,7 @@
                   </a:solidFill>
                 </a:uFill>
                 <a:latin typeface="Century Gothic"/>
+                <a:ea typeface="DejaVu Sans"/>
               </a:rPr>
               <a:t>MongoDB</a:t>
             </a:r>
@@ -7740,6 +7755,7 @@
                   </a:solidFill>
                 </a:uFill>
                 <a:latin typeface="Century Gothic"/>
+                <a:ea typeface="DejaVu Sans"/>
               </a:rPr>
               <a:t>索引</a:t>
             </a:r>
@@ -7784,7 +7800,7 @@
         <p:spPr>
           <a:xfrm>
             <a:off x="2589120" y="4777200"/>
-            <a:ext cx="8914680" cy="1125720"/>
+            <a:ext cx="8913240" cy="1124280"/>
           </a:xfrm>
           <a:prstGeom prst="rect">
             <a:avLst/>
@@ -7819,6 +7835,7 @@
                   </a:solidFill>
                 </a:uFill>
                 <a:latin typeface="Century Gothic"/>
+                <a:ea typeface="DejaVu Sans"/>
               </a:rPr>
               <a:t>吴添</a:t>
             </a:r>
@@ -7894,7 +7911,7 @@
         <p:spPr>
           <a:xfrm>
             <a:off x="2593080" y="624240"/>
-            <a:ext cx="8911080" cy="1280160"/>
+            <a:ext cx="8909640" cy="1278720"/>
           </a:xfrm>
           <a:prstGeom prst="rect">
             <a:avLst/>
@@ -7929,6 +7946,7 @@
                   </a:solidFill>
                 </a:uFill>
                 <a:latin typeface="Century Gothic"/>
+                <a:ea typeface="DejaVu Sans"/>
               </a:rPr>
               <a:t>交叉索引（索引交集）</a:t>
             </a:r>
@@ -7955,7 +7973,7 @@
         <p:spPr>
           <a:xfrm>
             <a:off x="2589120" y="2133720"/>
-            <a:ext cx="8914680" cy="3776760"/>
+            <a:ext cx="8913240" cy="3775320"/>
           </a:xfrm>
           <a:prstGeom prst="rect">
             <a:avLst/>
@@ -7974,7 +7992,7 @@
         <p:txBody>
           <a:bodyPr lIns="90000" rIns="90000" tIns="45000" bIns="45000"/>
           <a:p>
-            <a:pPr marL="343080" indent="-342360">
+            <a:pPr marL="343080" indent="-340920">
               <a:lnSpc>
                 <a:spcPct val="100000"/>
               </a:lnSpc>
@@ -7995,6 +8013,7 @@
                   </a:solidFill>
                 </a:uFill>
                 <a:latin typeface="Century Gothic"/>
+                <a:ea typeface="DejaVu Sans"/>
               </a:rPr>
               <a:t>MongoDB</a:t>
             </a:r>
@@ -8009,6 +8028,7 @@
                   </a:solidFill>
                 </a:uFill>
                 <a:latin typeface="Century Gothic"/>
+                <a:ea typeface="DejaVu Sans"/>
               </a:rPr>
               <a:t>可以使用多个索引的交集来完成查询。</a:t>
             </a:r>
@@ -8025,7 +8045,7 @@
             </a:endParaRPr>
           </a:p>
           <a:p>
-            <a:pPr marL="343080" indent="-342360">
+            <a:pPr marL="343080" indent="-340920">
               <a:lnSpc>
                 <a:spcPct val="100000"/>
               </a:lnSpc>
@@ -8046,6 +8066,7 @@
                   </a:solidFill>
                 </a:uFill>
                 <a:latin typeface="Century Gothic"/>
+                <a:ea typeface="DejaVu Sans"/>
               </a:rPr>
               <a:t>交叉索引不能代替复合索引。</a:t>
             </a:r>
@@ -8062,7 +8083,7 @@
             </a:endParaRPr>
           </a:p>
           <a:p>
-            <a:pPr marL="343080" indent="-342360">
+            <a:pPr marL="343080" indent="-340920">
               <a:lnSpc>
                 <a:spcPct val="100000"/>
               </a:lnSpc>
@@ -8083,6 +8104,7 @@
                   </a:solidFill>
                 </a:uFill>
                 <a:latin typeface="Century Gothic"/>
+                <a:ea typeface="DejaVu Sans"/>
               </a:rPr>
               <a:t>执行计划里包含</a:t>
             </a:r>
@@ -8097,6 +8119,7 @@
                   </a:solidFill>
                 </a:uFill>
                 <a:latin typeface="Century Gothic"/>
+                <a:ea typeface="DejaVu Sans"/>
               </a:rPr>
               <a:t>AND_SORTED</a:t>
             </a:r>
@@ -8111,6 +8134,7 @@
                   </a:solidFill>
                 </a:uFill>
                 <a:latin typeface="Century Gothic"/>
+                <a:ea typeface="DejaVu Sans"/>
               </a:rPr>
               <a:t>阶段说明使用了交叉索引。</a:t>
             </a:r>
@@ -8127,7 +8151,7 @@
             </a:endParaRPr>
           </a:p>
           <a:p>
-            <a:pPr marL="343080" indent="-342360">
+            <a:pPr marL="343080" indent="-340920">
               <a:lnSpc>
                 <a:spcPct val="100000"/>
               </a:lnSpc>
@@ -8148,6 +8172,7 @@
                   </a:solidFill>
                 </a:uFill>
                 <a:latin typeface="Century Gothic"/>
+                <a:ea typeface="DejaVu Sans"/>
               </a:rPr>
               <a:t>db.product.createIndex({</a:t>
             </a:r>
@@ -8164,7 +8189,7 @@
             </a:endParaRPr>
           </a:p>
           <a:p>
-            <a:pPr marL="343080" indent="-342360">
+            <a:pPr marL="343080" indent="-340920">
               <a:lnSpc>
                 <a:spcPct val="100000"/>
               </a:lnSpc>
@@ -8185,6 +8210,7 @@
                   </a:solidFill>
                 </a:uFill>
                 <a:latin typeface="Century Gothic"/>
+                <a:ea typeface="DejaVu Sans"/>
               </a:rPr>
               <a:t>   </a:t>
             </a:r>
@@ -8199,6 +8225,7 @@
                   </a:solidFill>
                 </a:uFill>
                 <a:latin typeface="Century Gothic"/>
+                <a:ea typeface="DejaVu Sans"/>
               </a:rPr>
               <a:t>price:1},{</a:t>
             </a:r>
@@ -8215,7 +8242,7 @@
             </a:endParaRPr>
           </a:p>
           <a:p>
-            <a:pPr marL="343080" indent="-342360">
+            <a:pPr marL="343080" indent="-340920">
               <a:lnSpc>
                 <a:spcPct val="100000"/>
               </a:lnSpc>
@@ -8236,6 +8263,7 @@
                   </a:solidFill>
                 </a:uFill>
                 <a:latin typeface="Century Gothic"/>
+                <a:ea typeface="DejaVu Sans"/>
               </a:rPr>
               <a:t>   </a:t>
             </a:r>
@@ -8250,6 +8278,7 @@
                   </a:solidFill>
                 </a:uFill>
                 <a:latin typeface="Century Gothic"/>
+                <a:ea typeface="DejaVu Sans"/>
               </a:rPr>
               <a:t>background:true})</a:t>
             </a:r>
@@ -8266,7 +8295,7 @@
             </a:endParaRPr>
           </a:p>
           <a:p>
-            <a:pPr marL="343080" indent="-342360">
+            <a:pPr marL="343080" indent="-340920">
               <a:lnSpc>
                 <a:spcPct val="100000"/>
               </a:lnSpc>
@@ -8287,6 +8316,7 @@
                   </a:solidFill>
                 </a:uFill>
                 <a:latin typeface="Century Gothic"/>
+                <a:ea typeface="DejaVu Sans"/>
               </a:rPr>
               <a:t>db.product.createIndex({</a:t>
             </a:r>
@@ -8303,7 +8333,7 @@
             </a:endParaRPr>
           </a:p>
           <a:p>
-            <a:pPr marL="343080" indent="-342360">
+            <a:pPr marL="343080" indent="-340920">
               <a:lnSpc>
                 <a:spcPct val="100000"/>
               </a:lnSpc>
@@ -8324,6 +8354,7 @@
                   </a:solidFill>
                 </a:uFill>
                 <a:latin typeface="Century Gothic"/>
+                <a:ea typeface="DejaVu Sans"/>
               </a:rPr>
               <a:t>   </a:t>
             </a:r>
@@ -8338,6 +8369,7 @@
                   </a:solidFill>
                 </a:uFill>
                 <a:latin typeface="Century Gothic"/>
+                <a:ea typeface="DejaVu Sans"/>
               </a:rPr>
               <a:t>stock:1},{</a:t>
             </a:r>
@@ -8354,7 +8386,7 @@
             </a:endParaRPr>
           </a:p>
           <a:p>
-            <a:pPr marL="343080" indent="-342360">
+            <a:pPr marL="343080" indent="-340920">
               <a:lnSpc>
                 <a:spcPct val="100000"/>
               </a:lnSpc>
@@ -8375,6 +8407,7 @@
                   </a:solidFill>
                 </a:uFill>
                 <a:latin typeface="Century Gothic"/>
+                <a:ea typeface="DejaVu Sans"/>
               </a:rPr>
               <a:t>   </a:t>
             </a:r>
@@ -8389,6 +8422,7 @@
                   </a:solidFill>
                 </a:uFill>
                 <a:latin typeface="Century Gothic"/>
+                <a:ea typeface="DejaVu Sans"/>
               </a:rPr>
               <a:t>background:true})</a:t>
             </a:r>
@@ -8405,7 +8439,7 @@
             </a:endParaRPr>
           </a:p>
           <a:p>
-            <a:pPr marL="343080" indent="-342360">
+            <a:pPr marL="343080" indent="-340920">
               <a:lnSpc>
                 <a:spcPct val="100000"/>
               </a:lnSpc>
@@ -8426,6 +8460,7 @@
                   </a:solidFill>
                 </a:uFill>
                 <a:latin typeface="Century Gothic"/>
+                <a:ea typeface="DejaVu Sans"/>
               </a:rPr>
               <a:t>//</a:t>
             </a:r>
@@ -8440,6 +8475,7 @@
                   </a:solidFill>
                 </a:uFill>
                 <a:latin typeface="Century Gothic"/>
+                <a:ea typeface="DejaVu Sans"/>
               </a:rPr>
               <a:t>可以使用交叉索引</a:t>
             </a:r>
@@ -8456,7 +8492,7 @@
             </a:endParaRPr>
           </a:p>
           <a:p>
-            <a:pPr marL="343080" indent="-342360">
+            <a:pPr marL="343080" indent="-340920">
               <a:lnSpc>
                 <a:spcPct val="100000"/>
               </a:lnSpc>
@@ -8477,6 +8513,7 @@
                   </a:solidFill>
                 </a:uFill>
                 <a:latin typeface="Century Gothic"/>
+                <a:ea typeface="DejaVu Sans"/>
               </a:rPr>
               <a:t>db.product.find({"price":20,"stock":8}).explain();</a:t>
             </a:r>
@@ -8493,7 +8530,7 @@
             </a:endParaRPr>
           </a:p>
           <a:p>
-            <a:pPr marL="343080" indent="-342360">
+            <a:pPr marL="343080" indent="-340920">
               <a:lnSpc>
                 <a:spcPct val="100000"/>
               </a:lnSpc>
@@ -8514,6 +8551,7 @@
                   </a:solidFill>
                 </a:uFill>
                 <a:latin typeface="Century Gothic"/>
+                <a:ea typeface="DejaVu Sans"/>
               </a:rPr>
               <a:t>//</a:t>
             </a:r>
@@ -8528,6 +8566,7 @@
                   </a:solidFill>
                 </a:uFill>
                 <a:latin typeface="Century Gothic"/>
+                <a:ea typeface="DejaVu Sans"/>
               </a:rPr>
               <a:t>不能使用交叉索引</a:t>
             </a:r>
@@ -8544,7 +8583,7 @@
             </a:endParaRPr>
           </a:p>
           <a:p>
-            <a:pPr marL="343080" indent="-342360">
+            <a:pPr marL="343080" indent="-340920">
               <a:lnSpc>
                 <a:spcPct val="100000"/>
               </a:lnSpc>
@@ -8565,6 +8604,7 @@
                   </a:solidFill>
                 </a:uFill>
                 <a:latin typeface="Century Gothic"/>
+                <a:ea typeface="DejaVu Sans"/>
               </a:rPr>
               <a:t>db.product.find({"price":20}).sort({"stock":1}).explain();</a:t>
             </a:r>
@@ -8581,7 +8621,7 @@
             </a:endParaRPr>
           </a:p>
           <a:p>
-            <a:pPr marL="343080" indent="-342360">
+            <a:pPr marL="343080" indent="-340920">
               <a:lnSpc>
                 <a:spcPct val="100000"/>
               </a:lnSpc>
@@ -8602,6 +8642,7 @@
                   </a:solidFill>
                 </a:uFill>
                 <a:latin typeface="Century Gothic"/>
+                <a:ea typeface="DejaVu Sans"/>
               </a:rPr>
               <a:t> </a:t>
             </a:r>
@@ -8677,7 +8718,7 @@
         <p:spPr>
           <a:xfrm>
             <a:off x="2593080" y="624240"/>
-            <a:ext cx="8911080" cy="1280160"/>
+            <a:ext cx="8909640" cy="1278720"/>
           </a:xfrm>
           <a:prstGeom prst="rect">
             <a:avLst/>
@@ -8712,6 +8753,7 @@
                   </a:solidFill>
                 </a:uFill>
                 <a:latin typeface="Century Gothic"/>
+                <a:ea typeface="DejaVu Sans"/>
               </a:rPr>
               <a:t>覆盖索引</a:t>
             </a:r>
@@ -8738,7 +8780,7 @@
         <p:spPr>
           <a:xfrm>
             <a:off x="2589120" y="2133720"/>
-            <a:ext cx="8914680" cy="3776760"/>
+            <a:ext cx="8913240" cy="3775320"/>
           </a:xfrm>
           <a:prstGeom prst="rect">
             <a:avLst/>
@@ -8757,7 +8799,7 @@
         <p:txBody>
           <a:bodyPr lIns="90000" rIns="90000" tIns="45000" bIns="45000"/>
           <a:p>
-            <a:pPr marL="343080" indent="-342360">
+            <a:pPr marL="343080" indent="-340920">
               <a:lnSpc>
                 <a:spcPct val="100000"/>
               </a:lnSpc>
@@ -8778,6 +8820,7 @@
                   </a:solidFill>
                 </a:uFill>
                 <a:latin typeface="Century Gothic"/>
+                <a:ea typeface="DejaVu Sans"/>
               </a:rPr>
               <a:t>当查询符合以下条件时，</a:t>
             </a:r>
@@ -8792,6 +8835,7 @@
                   </a:solidFill>
                 </a:uFill>
                 <a:latin typeface="Century Gothic"/>
+                <a:ea typeface="DejaVu Sans"/>
               </a:rPr>
               <a:t>MongoDB</a:t>
             </a:r>
@@ -8806,6 +8850,7 @@
                   </a:solidFill>
                 </a:uFill>
                 <a:latin typeface="Century Gothic"/>
+                <a:ea typeface="DejaVu Sans"/>
               </a:rPr>
               <a:t>可以直接从索引中获取返回数据，而不需要回表查询整个集合。</a:t>
             </a:r>
@@ -8838,6 +8883,7 @@
                   </a:solidFill>
                 </a:uFill>
                 <a:latin typeface="Century Gothic"/>
+                <a:ea typeface="DejaVu Sans"/>
               </a:rPr>
               <a:t>1. </a:t>
             </a:r>
@@ -8852,6 +8898,7 @@
                   </a:solidFill>
                 </a:uFill>
                 <a:latin typeface="Century Gothic"/>
+                <a:ea typeface="DejaVu Sans"/>
               </a:rPr>
               <a:t>所有的查询字段是索引的一部分</a:t>
             </a:r>
@@ -8884,6 +8931,7 @@
                   </a:solidFill>
                 </a:uFill>
                 <a:latin typeface="Century Gothic"/>
+                <a:ea typeface="DejaVu Sans"/>
               </a:rPr>
               <a:t>2. </a:t>
             </a:r>
@@ -8898,6 +8946,7 @@
                   </a:solidFill>
                 </a:uFill>
                 <a:latin typeface="Century Gothic"/>
+                <a:ea typeface="DejaVu Sans"/>
               </a:rPr>
               <a:t>所有的查询返回字段在同一个索引中</a:t>
             </a:r>
@@ -8914,7 +8963,7 @@
             </a:endParaRPr>
           </a:p>
           <a:p>
-            <a:pPr marL="343080" indent="-342360">
+            <a:pPr marL="343080" indent="-340920">
               <a:lnSpc>
                 <a:spcPct val="100000"/>
               </a:lnSpc>
@@ -8935,6 +8984,7 @@
                   </a:solidFill>
                 </a:uFill>
                 <a:latin typeface="Century Gothic"/>
+                <a:ea typeface="DejaVu Sans"/>
               </a:rPr>
               <a:t>因为索引存在于</a:t>
             </a:r>
@@ -8949,6 +8999,7 @@
                   </a:solidFill>
                 </a:uFill>
                 <a:latin typeface="Century Gothic"/>
+                <a:ea typeface="DejaVu Sans"/>
               </a:rPr>
               <a:t>RAM</a:t>
             </a:r>
@@ -8963,6 +9014,7 @@
                   </a:solidFill>
                 </a:uFill>
                 <a:latin typeface="Century Gothic"/>
+                <a:ea typeface="DejaVu Sans"/>
               </a:rPr>
               <a:t>中，从索引中获取数据比通过扫描文档读取数据要快得多。</a:t>
             </a:r>
@@ -8979,7 +9031,7 @@
             </a:endParaRPr>
           </a:p>
           <a:p>
-            <a:pPr marL="343080" indent="-342360">
+            <a:pPr marL="343080" indent="-340920">
               <a:lnSpc>
                 <a:spcPct val="100000"/>
               </a:lnSpc>
@@ -9000,6 +9052,7 @@
                   </a:solidFill>
                 </a:uFill>
                 <a:latin typeface="Century Gothic"/>
+                <a:ea typeface="DejaVu Sans"/>
               </a:rPr>
               <a:t>创建的索引中一般不包括 </a:t>
             </a:r>
@@ -9014,6 +9067,7 @@
                   </a:solidFill>
                 </a:uFill>
                 <a:latin typeface="Century Gothic"/>
+                <a:ea typeface="DejaVu Sans"/>
               </a:rPr>
               <a:t>_id </a:t>
             </a:r>
@@ -9028,6 +9082,7 @@
                   </a:solidFill>
                 </a:uFill>
                 <a:latin typeface="Century Gothic"/>
+                <a:ea typeface="DejaVu Sans"/>
               </a:rPr>
               <a:t>字段，而</a:t>
             </a:r>
@@ -9042,6 +9097,7 @@
                   </a:solidFill>
                 </a:uFill>
                 <a:latin typeface="Century Gothic"/>
+                <a:ea typeface="DejaVu Sans"/>
               </a:rPr>
               <a:t>_id</a:t>
             </a:r>
@@ -9056,6 +9112,7 @@
                   </a:solidFill>
                 </a:uFill>
                 <a:latin typeface="Century Gothic"/>
+                <a:ea typeface="DejaVu Sans"/>
               </a:rPr>
               <a:t>在查询中会默认返回，我们可以在</a:t>
             </a:r>
@@ -9070,6 +9127,7 @@
                   </a:solidFill>
                 </a:uFill>
                 <a:latin typeface="Century Gothic"/>
+                <a:ea typeface="DejaVu Sans"/>
               </a:rPr>
               <a:t>MongoDB</a:t>
             </a:r>
@@ -9084,6 +9142,7 @@
                   </a:solidFill>
                 </a:uFill>
                 <a:latin typeface="Century Gothic"/>
+                <a:ea typeface="DejaVu Sans"/>
               </a:rPr>
               <a:t>的查询结果集中排除</a:t>
             </a:r>
@@ -9098,6 +9157,7 @@
                   </a:solidFill>
                 </a:uFill>
                 <a:latin typeface="Century Gothic"/>
+                <a:ea typeface="DejaVu Sans"/>
               </a:rPr>
               <a:t>_id</a:t>
             </a:r>
@@ -9112,6 +9172,7 @@
                   </a:solidFill>
                 </a:uFill>
                 <a:latin typeface="Century Gothic"/>
+                <a:ea typeface="DejaVu Sans"/>
               </a:rPr>
               <a:t>字段来实现索引覆盖。</a:t>
             </a:r>
@@ -9128,7 +9189,7 @@
             </a:endParaRPr>
           </a:p>
           <a:p>
-            <a:pPr marL="343080" indent="-342360">
+            <a:pPr marL="343080" indent="-340920">
               <a:lnSpc>
                 <a:spcPct val="100000"/>
               </a:lnSpc>
@@ -9149,6 +9210,7 @@
                   </a:solidFill>
                 </a:uFill>
                 <a:latin typeface="Century Gothic"/>
+                <a:ea typeface="DejaVu Sans"/>
               </a:rPr>
               <a:t>MongoDB</a:t>
             </a:r>
@@ -9163,6 +9225,7 @@
                   </a:solidFill>
                 </a:uFill>
                 <a:latin typeface="Century Gothic"/>
+                <a:ea typeface="DejaVu Sans"/>
               </a:rPr>
               <a:t>如果命中覆盖索引，则执行计划里的</a:t>
             </a:r>
@@ -9177,6 +9240,7 @@
                   </a:solidFill>
                 </a:uFill>
                 <a:latin typeface="Century Gothic"/>
+                <a:ea typeface="DejaVu Sans"/>
               </a:rPr>
               <a:t>stage</a:t>
             </a:r>
@@ -9191,6 +9255,7 @@
                   </a:solidFill>
                 </a:uFill>
                 <a:latin typeface="Century Gothic"/>
+                <a:ea typeface="DejaVu Sans"/>
               </a:rPr>
               <a:t>为</a:t>
             </a:r>
@@ -9205,6 +9270,7 @@
                   </a:solidFill>
                 </a:uFill>
                 <a:latin typeface="Century Gothic"/>
+                <a:ea typeface="DejaVu Sans"/>
               </a:rPr>
               <a:t>"PROJECTION_COVERED”</a:t>
             </a:r>
@@ -9237,6 +9303,7 @@
                   </a:solidFill>
                 </a:uFill>
                 <a:latin typeface="Century Gothic"/>
+                <a:ea typeface="DejaVu Sans"/>
               </a:rPr>
               <a:t>      </a:t>
             </a:r>
@@ -9251,6 +9318,7 @@
                   </a:solidFill>
                 </a:uFill>
                 <a:latin typeface="Century Gothic"/>
+                <a:ea typeface="DejaVu Sans"/>
               </a:rPr>
               <a:t>totalDocsExamined</a:t>
             </a:r>
@@ -9265,6 +9333,7 @@
                   </a:solidFill>
                 </a:uFill>
                 <a:latin typeface="Century Gothic"/>
+                <a:ea typeface="DejaVu Sans"/>
               </a:rPr>
               <a:t>为</a:t>
             </a:r>
@@ -9279,6 +9348,7 @@
                   </a:solidFill>
                 </a:uFill>
                 <a:latin typeface="Century Gothic"/>
+                <a:ea typeface="DejaVu Sans"/>
               </a:rPr>
               <a:t>0</a:t>
             </a:r>
@@ -9293,6 +9363,7 @@
                   </a:solidFill>
                 </a:uFill>
                 <a:latin typeface="Century Gothic"/>
+                <a:ea typeface="DejaVu Sans"/>
               </a:rPr>
               <a:t>。</a:t>
             </a:r>
@@ -9368,7 +9439,7 @@
         <p:spPr>
           <a:xfrm>
             <a:off x="2593080" y="624240"/>
-            <a:ext cx="8869680" cy="902520"/>
+            <a:ext cx="8868240" cy="901080"/>
           </a:xfrm>
           <a:prstGeom prst="rect">
             <a:avLst/>
@@ -9403,6 +9474,7 @@
                   </a:solidFill>
                 </a:uFill>
                 <a:latin typeface="Century Gothic"/>
+                <a:ea typeface="DejaVu Sans"/>
               </a:rPr>
               <a:t>B-Tree</a:t>
             </a:r>
@@ -9417,6 +9489,7 @@
                   </a:solidFill>
                 </a:uFill>
                 <a:latin typeface="Century Gothic"/>
+                <a:ea typeface="DejaVu Sans"/>
               </a:rPr>
               <a:t>索引</a:t>
             </a:r>
@@ -9443,7 +9516,7 @@
         <p:spPr>
           <a:xfrm>
             <a:off x="2776680" y="1895760"/>
-            <a:ext cx="183960" cy="368640"/>
+            <a:ext cx="182520" cy="367200"/>
           </a:xfrm>
           <a:prstGeom prst="rect">
             <a:avLst/>
@@ -9469,7 +9542,7 @@
         <p:spPr>
           <a:xfrm>
             <a:off x="2637360" y="1438560"/>
-            <a:ext cx="183960" cy="368640"/>
+            <a:ext cx="182520" cy="367200"/>
           </a:xfrm>
           <a:prstGeom prst="rect">
             <a:avLst/>
@@ -9495,7 +9568,7 @@
         <p:spPr>
           <a:xfrm>
             <a:off x="3847320" y="2653920"/>
-            <a:ext cx="183960" cy="368640"/>
+            <a:ext cx="182520" cy="367200"/>
           </a:xfrm>
           <a:prstGeom prst="rect">
             <a:avLst/>
@@ -9521,7 +9594,7 @@
         <p:spPr>
           <a:xfrm>
             <a:off x="3456720" y="1706040"/>
-            <a:ext cx="183960" cy="368640"/>
+            <a:ext cx="182520" cy="367200"/>
           </a:xfrm>
           <a:prstGeom prst="rect">
             <a:avLst/>
@@ -9547,7 +9620,7 @@
         <p:spPr>
           <a:xfrm>
             <a:off x="2589120" y="2133720"/>
-            <a:ext cx="8914680" cy="3776760"/>
+            <a:ext cx="8913240" cy="3775320"/>
           </a:xfrm>
           <a:prstGeom prst="rect">
             <a:avLst/>
@@ -9566,7 +9639,7 @@
         <p:txBody>
           <a:bodyPr lIns="90000" rIns="90000" tIns="45000" bIns="45000"/>
           <a:p>
-            <a:pPr marL="343080" indent="-342360">
+            <a:pPr marL="343080" indent="-340920">
               <a:lnSpc>
                 <a:spcPct val="100000"/>
               </a:lnSpc>
@@ -9587,6 +9660,7 @@
                   </a:solidFill>
                 </a:uFill>
                 <a:latin typeface="Century Gothic"/>
+                <a:ea typeface="DejaVu Sans"/>
               </a:rPr>
               <a:t>树内的每个节点都存储数据</a:t>
             </a:r>
@@ -9603,7 +9677,7 @@
             </a:endParaRPr>
           </a:p>
           <a:p>
-            <a:pPr marL="343080" indent="-342360">
+            <a:pPr marL="343080" indent="-340920">
               <a:lnSpc>
                 <a:spcPct val="100000"/>
               </a:lnSpc>
@@ -9624,6 +9698,7 @@
                   </a:solidFill>
                 </a:uFill>
                 <a:latin typeface="Century Gothic"/>
+                <a:ea typeface="DejaVu Sans"/>
               </a:rPr>
               <a:t>叶子节点之间无指针相邻</a:t>
             </a:r>
@@ -9640,7 +9715,7 @@
             </a:endParaRPr>
           </a:p>
           <a:p>
-            <a:pPr marL="343080" indent="-342360">
+            <a:pPr marL="343080" indent="-340920">
               <a:lnSpc>
                 <a:spcPct val="100000"/>
               </a:lnSpc>
@@ -9661,6 +9736,7 @@
                   </a:solidFill>
                 </a:uFill>
                 <a:latin typeface="Century Gothic"/>
+                <a:ea typeface="DejaVu Sans"/>
               </a:rPr>
               <a:t>检索单条数据时效率不固定，最好是</a:t>
             </a:r>
@@ -9675,6 +9751,7 @@
                   </a:solidFill>
                 </a:uFill>
                 <a:latin typeface="Century Gothic"/>
+                <a:ea typeface="DejaVu Sans"/>
               </a:rPr>
               <a:t>O</a:t>
             </a:r>
@@ -9689,6 +9766,7 @@
                   </a:solidFill>
                 </a:uFill>
                 <a:latin typeface="Century Gothic"/>
+                <a:ea typeface="DejaVu Sans"/>
               </a:rPr>
               <a:t>（</a:t>
             </a:r>
@@ -9703,6 +9781,7 @@
                   </a:solidFill>
                 </a:uFill>
                 <a:latin typeface="Century Gothic"/>
+                <a:ea typeface="DejaVu Sans"/>
               </a:rPr>
               <a:t>1</a:t>
             </a:r>
@@ -9717,6 +9796,7 @@
                   </a:solidFill>
                 </a:uFill>
                 <a:latin typeface="Century Gothic"/>
+                <a:ea typeface="DejaVu Sans"/>
               </a:rPr>
               <a:t>），最差</a:t>
             </a:r>
@@ -9731,6 +9811,7 @@
                   </a:solidFill>
                 </a:uFill>
                 <a:latin typeface="Century Gothic"/>
+                <a:ea typeface="DejaVu Sans"/>
               </a:rPr>
               <a:t>O(log n)</a:t>
             </a:r>
@@ -9761,7 +9842,7 @@
         <p:spPr>
           <a:xfrm>
             <a:off x="2637360" y="3599640"/>
-            <a:ext cx="8520840" cy="2831400"/>
+            <a:ext cx="8519400" cy="2829960"/>
           </a:xfrm>
           <a:prstGeom prst="rect">
             <a:avLst/>
@@ -9829,7 +9910,7 @@
         <p:spPr>
           <a:xfrm>
             <a:off x="2593080" y="624240"/>
-            <a:ext cx="8911080" cy="1280160"/>
+            <a:ext cx="8909640" cy="1278720"/>
           </a:xfrm>
           <a:prstGeom prst="rect">
             <a:avLst/>
@@ -9864,6 +9945,7 @@
                   </a:solidFill>
                 </a:uFill>
                 <a:latin typeface="Century Gothic"/>
+                <a:ea typeface="DejaVu Sans"/>
               </a:rPr>
               <a:t>B+Tree</a:t>
             </a:r>
@@ -9878,6 +9960,7 @@
                   </a:solidFill>
                 </a:uFill>
                 <a:latin typeface="Century Gothic"/>
+                <a:ea typeface="DejaVu Sans"/>
               </a:rPr>
               <a:t>索引</a:t>
             </a:r>
@@ -9904,7 +9987,7 @@
         <p:spPr>
           <a:xfrm>
             <a:off x="2589120" y="2133720"/>
-            <a:ext cx="8914680" cy="3776760"/>
+            <a:ext cx="8913240" cy="3775320"/>
           </a:xfrm>
           <a:prstGeom prst="rect">
             <a:avLst/>
@@ -9923,7 +10006,7 @@
         <p:txBody>
           <a:bodyPr lIns="90000" rIns="90000" tIns="45000" bIns="45000"/>
           <a:p>
-            <a:pPr marL="343080" indent="-342360">
+            <a:pPr marL="343080" indent="-340920">
               <a:lnSpc>
                 <a:spcPct val="100000"/>
               </a:lnSpc>
@@ -9944,6 +10027,7 @@
                   </a:solidFill>
                 </a:uFill>
                 <a:latin typeface="Century Gothic"/>
+                <a:ea typeface="DejaVu Sans"/>
               </a:rPr>
               <a:t>数据只出现在叶子节点</a:t>
             </a:r>
@@ -9960,7 +10044,7 @@
             </a:endParaRPr>
           </a:p>
           <a:p>
-            <a:pPr marL="343080" indent="-342360">
+            <a:pPr marL="343080" indent="-340920">
               <a:lnSpc>
                 <a:spcPct val="100000"/>
               </a:lnSpc>
@@ -9981,6 +10065,7 @@
                   </a:solidFill>
                 </a:uFill>
                 <a:latin typeface="Century Gothic"/>
+                <a:ea typeface="DejaVu Sans"/>
               </a:rPr>
               <a:t>所有叶子节点增加了一个链指针</a:t>
             </a:r>
@@ -9997,7 +10082,7 @@
             </a:endParaRPr>
           </a:p>
           <a:p>
-            <a:pPr marL="343080" indent="-342360">
+            <a:pPr marL="343080" indent="-340920">
               <a:lnSpc>
                 <a:spcPct val="100000"/>
               </a:lnSpc>
@@ -10018,6 +10103,7 @@
                   </a:solidFill>
                 </a:uFill>
                 <a:latin typeface="Century Gothic"/>
+                <a:ea typeface="DejaVu Sans"/>
               </a:rPr>
               <a:t>检索单条数据时效率稳定，需要查找到叶子结点，都是</a:t>
             </a:r>
@@ -10032,8 +10118,62 @@
                   </a:solidFill>
                 </a:uFill>
                 <a:latin typeface="Century Gothic"/>
+                <a:ea typeface="DejaVu Sans"/>
               </a:rPr>
               <a:t>O(log n)</a:t>
+            </a:r>
+            <a:endParaRPr b="0" lang="en-US" sz="1800" spc="-1" strike="noStrike">
+              <a:solidFill>
+                <a:srgbClr val="000000"/>
+              </a:solidFill>
+              <a:uFill>
+                <a:solidFill>
+                  <a:srgbClr val="ffffff"/>
+                </a:solidFill>
+              </a:uFill>
+              <a:latin typeface="Arial"/>
+            </a:endParaRPr>
+          </a:p>
+          <a:p>
+            <a:pPr marL="343080" indent="-340920">
+              <a:lnSpc>
+                <a:spcPct val="100000"/>
+              </a:lnSpc>
+              <a:buClr>
+                <a:srgbClr val="a53010"/>
+              </a:buClr>
+              <a:buFont typeface="Wingdings 3" charset="2"/>
+              <a:buChar char=""/>
+            </a:pPr>
+            <a:r>
+              <a:rPr b="0" lang="en-US" sz="1800" spc="-1" strike="noStrike">
+                <a:solidFill>
+                  <a:srgbClr val="404040"/>
+                </a:solidFill>
+                <a:uFill>
+                  <a:solidFill>
+                    <a:srgbClr val="ffffff"/>
+                  </a:solidFill>
+                </a:uFill>
+                <a:latin typeface="Century Gothic"/>
+                <a:ea typeface="DejaVu Sans"/>
+              </a:rPr>
+              <a:t>B+Tree</a:t>
+            </a:r>
+            <a:r>
+              <a:rPr b="0" lang="en-US" sz="1800" spc="-1" strike="noStrike">
+                <a:solidFill>
+                  <a:srgbClr val="404040"/>
+                </a:solidFill>
+                <a:uFill>
+                  <a:solidFill>
+                    <a:srgbClr val="ffffff"/>
+                  </a:solidFill>
+                </a:uFill>
+                <a:latin typeface="Century Gothic"/>
+                <a:ea typeface="DejaVu Sans"/>
+              </a:rPr>
+              <a:t>的非页节点不保存数据，因此可以容纳更多的关键字，所以树的高度会更矮一些。</a:t>
             </a:r>
             <a:endParaRPr b="0" lang="en-US" sz="1800" spc="-1" strike="noStrike">
               <a:solidFill>
@@ -10061,8 +10201,8 @@
         </p:blipFill>
         <p:spPr>
           <a:xfrm>
-            <a:off x="2589120" y="3504240"/>
-            <a:ext cx="8914680" cy="3314160"/>
+            <a:off x="2589120" y="3545280"/>
+            <a:ext cx="8913240" cy="3312720"/>
           </a:xfrm>
           <a:prstGeom prst="rect">
             <a:avLst/>
@@ -10130,7 +10270,7 @@
         <p:spPr>
           <a:xfrm>
             <a:off x="2593080" y="624240"/>
-            <a:ext cx="8911080" cy="1280160"/>
+            <a:ext cx="8909640" cy="1278720"/>
           </a:xfrm>
           <a:prstGeom prst="rect">
             <a:avLst/>
@@ -10165,6 +10305,7 @@
                   </a:solidFill>
                 </a:uFill>
                 <a:latin typeface="Century Gothic"/>
+                <a:ea typeface="DejaVu Sans"/>
               </a:rPr>
               <a:t>为什么</a:t>
             </a:r>
@@ -10179,6 +10320,7 @@
                   </a:solidFill>
                 </a:uFill>
                 <a:latin typeface="Century Gothic"/>
+                <a:ea typeface="DejaVu Sans"/>
               </a:rPr>
               <a:t>MongoDB</a:t>
             </a:r>
@@ -10193,6 +10335,7 @@
                   </a:solidFill>
                 </a:uFill>
                 <a:latin typeface="Century Gothic"/>
+                <a:ea typeface="DejaVu Sans"/>
               </a:rPr>
               <a:t>用</a:t>
             </a:r>
@@ -10207,6 +10350,7 @@
                   </a:solidFill>
                 </a:uFill>
                 <a:latin typeface="Century Gothic"/>
+                <a:ea typeface="DejaVu Sans"/>
               </a:rPr>
               <a:t>B-Tree</a:t>
             </a:r>
@@ -10221,6 +10365,7 @@
                   </a:solidFill>
                 </a:uFill>
                 <a:latin typeface="Century Gothic"/>
+                <a:ea typeface="DejaVu Sans"/>
               </a:rPr>
               <a:t>，而</a:t>
             </a:r>
@@ -10235,6 +10380,7 @@
                   </a:solidFill>
                 </a:uFill>
                 <a:latin typeface="Century Gothic"/>
+                <a:ea typeface="DejaVu Sans"/>
               </a:rPr>
               <a:t>MySQL</a:t>
             </a:r>
@@ -10249,6 +10395,7 @@
                   </a:solidFill>
                 </a:uFill>
                 <a:latin typeface="Century Gothic"/>
+                <a:ea typeface="DejaVu Sans"/>
               </a:rPr>
               <a:t>用</a:t>
             </a:r>
@@ -10263,6 +10410,7 @@
                   </a:solidFill>
                 </a:uFill>
                 <a:latin typeface="Century Gothic"/>
+                <a:ea typeface="DejaVu Sans"/>
               </a:rPr>
               <a:t>B+Tree</a:t>
             </a:r>
@@ -10289,7 +10437,7 @@
         <p:spPr>
           <a:xfrm>
             <a:off x="2589120" y="2133720"/>
-            <a:ext cx="8914680" cy="3776760"/>
+            <a:ext cx="8913240" cy="3775320"/>
           </a:xfrm>
           <a:prstGeom prst="rect">
             <a:avLst/>
@@ -10308,7 +10456,7 @@
         <p:txBody>
           <a:bodyPr lIns="90000" rIns="90000" tIns="45000" bIns="45000"/>
           <a:p>
-            <a:pPr marL="343080" indent="-342360">
+            <a:pPr marL="343080" indent="-340920">
               <a:lnSpc>
                 <a:spcPct val="100000"/>
               </a:lnSpc>
@@ -10329,6 +10477,7 @@
                   </a:solidFill>
                 </a:uFill>
                 <a:latin typeface="Century Gothic"/>
+                <a:ea typeface="DejaVu Sans"/>
               </a:rPr>
               <a:t>B-Tree</a:t>
             </a:r>
@@ -10343,6 +10492,7 @@
                   </a:solidFill>
                 </a:uFill>
                 <a:latin typeface="Century Gothic"/>
+                <a:ea typeface="DejaVu Sans"/>
               </a:rPr>
               <a:t>单条查询效率不稳定，平均查询效率高于</a:t>
             </a:r>
@@ -10357,6 +10507,7 @@
                   </a:solidFill>
                 </a:uFill>
                 <a:latin typeface="Century Gothic"/>
+                <a:ea typeface="DejaVu Sans"/>
               </a:rPr>
               <a:t>B+Tree</a:t>
             </a:r>
@@ -10371,6 +10522,7 @@
                   </a:solidFill>
                 </a:uFill>
                 <a:latin typeface="Century Gothic"/>
+                <a:ea typeface="DejaVu Sans"/>
               </a:rPr>
               <a:t>。叶子结点之间没有相邻指针，不适合数据遍历扫描。</a:t>
             </a:r>
@@ -10387,7 +10539,7 @@
             </a:endParaRPr>
           </a:p>
           <a:p>
-            <a:pPr marL="343080" indent="-342360">
+            <a:pPr marL="343080" indent="-340920">
               <a:lnSpc>
                 <a:spcPct val="100000"/>
               </a:lnSpc>
@@ -10408,6 +10560,7 @@
                   </a:solidFill>
                 </a:uFill>
                 <a:latin typeface="Century Gothic"/>
+                <a:ea typeface="DejaVu Sans"/>
               </a:rPr>
               <a:t>B+Tree</a:t>
             </a:r>
@@ -10422,6 +10575,7 @@
                   </a:solidFill>
                 </a:uFill>
                 <a:latin typeface="Century Gothic"/>
+                <a:ea typeface="DejaVu Sans"/>
               </a:rPr>
               <a:t>单条查询效率稳定，叶子结点有相邻指针，适合数据遍历扫描。</a:t>
             </a:r>
@@ -10438,7 +10592,7 @@
             </a:endParaRPr>
           </a:p>
           <a:p>
-            <a:pPr marL="343080" indent="-342360">
+            <a:pPr marL="343080" indent="-340920">
               <a:lnSpc>
                 <a:spcPct val="100000"/>
               </a:lnSpc>
@@ -10459,6 +10613,7 @@
                   </a:solidFill>
                 </a:uFill>
                 <a:latin typeface="Century Gothic"/>
+                <a:ea typeface="DejaVu Sans"/>
               </a:rPr>
               <a:t>MongoDB</a:t>
             </a:r>
@@ -10473,6 +10628,7 @@
                   </a:solidFill>
                 </a:uFill>
                 <a:latin typeface="Century Gothic"/>
+                <a:ea typeface="DejaVu Sans"/>
               </a:rPr>
               <a:t>是非关系型数据库，更适合单条数据快速查询。</a:t>
             </a:r>
@@ -10487,6 +10643,7 @@
                   </a:solidFill>
                 </a:uFill>
                 <a:latin typeface="Century Gothic"/>
+                <a:ea typeface="DejaVu Sans"/>
               </a:rPr>
               <a:t>MySQL</a:t>
             </a:r>
@@ -10501,6 +10658,7 @@
                   </a:solidFill>
                 </a:uFill>
                 <a:latin typeface="Century Gothic"/>
+                <a:ea typeface="DejaVu Sans"/>
               </a:rPr>
               <a:t>是关系型数据库，会有比较多的数据遍历查询（</a:t>
             </a:r>
@@ -10515,6 +10673,7 @@
                   </a:solidFill>
                 </a:uFill>
                 <a:latin typeface="Century Gothic"/>
+                <a:ea typeface="DejaVu Sans"/>
               </a:rPr>
               <a:t>join</a:t>
             </a:r>
@@ -10529,6 +10688,7 @@
                   </a:solidFill>
                 </a:uFill>
                 <a:latin typeface="Century Gothic"/>
+                <a:ea typeface="DejaVu Sans"/>
               </a:rPr>
               <a:t>操作）。</a:t>
             </a:r>
@@ -10595,7 +10755,7 @@
         <p:spPr>
           <a:xfrm>
             <a:off x="2589120" y="3935880"/>
-            <a:ext cx="1991160" cy="2660400"/>
+            <a:ext cx="1989720" cy="2658960"/>
           </a:xfrm>
           <a:prstGeom prst="rect">
             <a:avLst/>
@@ -10618,7 +10778,7 @@
         <p:spPr>
           <a:xfrm>
             <a:off x="7610760" y="3609720"/>
-            <a:ext cx="2214000" cy="3007080"/>
+            <a:ext cx="2212560" cy="3005640"/>
           </a:xfrm>
           <a:prstGeom prst="rect">
             <a:avLst/>
@@ -10686,7 +10846,7 @@
         <p:spPr>
           <a:xfrm>
             <a:off x="2593080" y="624240"/>
-            <a:ext cx="8911080" cy="1280160"/>
+            <a:ext cx="8909640" cy="1278720"/>
           </a:xfrm>
           <a:prstGeom prst="rect">
             <a:avLst/>
@@ -10721,6 +10881,7 @@
                   </a:solidFill>
                 </a:uFill>
                 <a:latin typeface="Century Gothic"/>
+                <a:ea typeface="DejaVu Sans"/>
               </a:rPr>
               <a:t>MongoDB</a:t>
             </a:r>
@@ -10735,6 +10896,7 @@
                   </a:solidFill>
                 </a:uFill>
                 <a:latin typeface="Century Gothic"/>
+                <a:ea typeface="DejaVu Sans"/>
               </a:rPr>
               <a:t>到底用的什么索引？</a:t>
             </a:r>
@@ -10761,7 +10923,7 @@
         <p:spPr>
           <a:xfrm>
             <a:off x="2589120" y="2133720"/>
-            <a:ext cx="8914680" cy="3776760"/>
+            <a:ext cx="8913240" cy="3775320"/>
           </a:xfrm>
           <a:prstGeom prst="rect">
             <a:avLst/>
@@ -10780,7 +10942,7 @@
         <p:txBody>
           <a:bodyPr lIns="90000" rIns="90000" tIns="45000" bIns="45000"/>
           <a:p>
-            <a:pPr marL="343080" indent="-342360">
+            <a:pPr marL="343080" indent="-340920">
               <a:lnSpc>
                 <a:spcPct val="100000"/>
               </a:lnSpc>
@@ -10801,6 +10963,7 @@
                   </a:solidFill>
                 </a:uFill>
                 <a:latin typeface="Century Gothic"/>
+                <a:ea typeface="DejaVu Sans"/>
                 <a:hlinkClick r:id="rId1"/>
               </a:rPr>
               <a:t>MMAPV1</a:t>
@@ -10816,6 +10979,7 @@
                   </a:solidFill>
                 </a:uFill>
                 <a:latin typeface="Century Gothic"/>
+                <a:ea typeface="DejaVu Sans"/>
                 <a:hlinkClick r:id="rId2"/>
               </a:rPr>
               <a:t>是</a:t>
@@ -10831,6 +10995,7 @@
                   </a:solidFill>
                 </a:uFill>
                 <a:latin typeface="Century Gothic"/>
+                <a:ea typeface="DejaVu Sans"/>
               </a:rPr>
               <a:t>MongoDB 3.2</a:t>
             </a:r>
@@ -10845,6 +11010,7 @@
                   </a:solidFill>
                 </a:uFill>
                 <a:latin typeface="Century Gothic"/>
+                <a:ea typeface="DejaVu Sans"/>
               </a:rPr>
               <a:t>前的默认存储引擎，</a:t>
             </a:r>
@@ -10859,6 +11025,7 @@
                   </a:solidFill>
                 </a:uFill>
                 <a:latin typeface="Century Gothic"/>
+                <a:ea typeface="DejaVu Sans"/>
               </a:rPr>
               <a:t>4.0</a:t>
             </a:r>
@@ -10873,6 +11040,7 @@
                   </a:solidFill>
                 </a:uFill>
                 <a:latin typeface="Century Gothic"/>
+                <a:ea typeface="DejaVu Sans"/>
               </a:rPr>
               <a:t>废弃，使用的是</a:t>
             </a:r>
@@ -10887,6 +11055,7 @@
                   </a:solidFill>
                 </a:uFill>
                 <a:latin typeface="Century Gothic"/>
+                <a:ea typeface="DejaVu Sans"/>
               </a:rPr>
               <a:t>B-Tree</a:t>
             </a:r>
@@ -10903,7 +11072,7 @@
             </a:endParaRPr>
           </a:p>
           <a:p>
-            <a:pPr marL="343080" indent="-342360">
+            <a:pPr marL="343080" indent="-340920">
               <a:lnSpc>
                 <a:spcPct val="100000"/>
               </a:lnSpc>
@@ -10924,6 +11093,7 @@
                   </a:solidFill>
                 </a:uFill>
                 <a:latin typeface="Century Gothic"/>
+                <a:ea typeface="DejaVu Sans"/>
                 <a:hlinkClick r:id="rId3"/>
               </a:rPr>
               <a:t>WiredTiger</a:t>
@@ -10939,6 +11109,7 @@
                   </a:solidFill>
                 </a:uFill>
                 <a:latin typeface="Century Gothic"/>
+                <a:ea typeface="DejaVu Sans"/>
               </a:rPr>
               <a:t>是从</a:t>
             </a:r>
@@ -10953,6 +11124,7 @@
                   </a:solidFill>
                 </a:uFill>
                 <a:latin typeface="Century Gothic"/>
+                <a:ea typeface="DejaVu Sans"/>
               </a:rPr>
               <a:t>MongoDB 3.2</a:t>
             </a:r>
@@ -10967,6 +11139,7 @@
                   </a:solidFill>
                 </a:uFill>
                 <a:latin typeface="Century Gothic"/>
+                <a:ea typeface="DejaVu Sans"/>
               </a:rPr>
               <a:t>开始的默认存储引擎，索引文件用的</a:t>
             </a:r>
@@ -10981,6 +11154,7 @@
                   </a:solidFill>
                 </a:uFill>
                 <a:latin typeface="Century Gothic"/>
+                <a:ea typeface="DejaVu Sans"/>
               </a:rPr>
               <a:t>B-Tree</a:t>
             </a:r>
@@ -10995,6 +11169,7 @@
                   </a:solidFill>
                 </a:uFill>
                 <a:latin typeface="Century Gothic"/>
+                <a:ea typeface="DejaVu Sans"/>
               </a:rPr>
               <a:t>，数据文件使用的是</a:t>
             </a:r>
@@ -11009,6 +11184,7 @@
                   </a:solidFill>
                 </a:uFill>
                 <a:latin typeface="Century Gothic"/>
+                <a:ea typeface="DejaVu Sans"/>
               </a:rPr>
               <a:t>B+Tree</a:t>
             </a:r>
@@ -11025,7 +11201,7 @@
             </a:endParaRPr>
           </a:p>
           <a:p>
-            <a:pPr marL="343080" indent="-342360">
+            <a:pPr marL="343080" indent="-340920">
               <a:lnSpc>
                 <a:spcPct val="100000"/>
               </a:lnSpc>
@@ -11046,6 +11222,7 @@
                   </a:solidFill>
                 </a:uFill>
                 <a:latin typeface="Century Gothic"/>
+                <a:ea typeface="DejaVu Sans"/>
                 <a:hlinkClick r:id="rId4"/>
               </a:rPr>
               <a:t>参考：</a:t>
@@ -11063,7 +11240,7 @@
             </a:endParaRPr>
           </a:p>
           <a:p>
-            <a:pPr marL="343080" indent="-342360">
+            <a:pPr marL="343080" indent="-340920">
               <a:lnSpc>
                 <a:spcPct val="100000"/>
               </a:lnSpc>
@@ -11084,6 +11261,7 @@
                   </a:solidFill>
                 </a:uFill>
                 <a:latin typeface="Century Gothic"/>
+                <a:ea typeface="DejaVu Sans"/>
                 <a:hlinkClick r:id="rId5"/>
               </a:rPr>
               <a:t>http://source.wiredtiger.com/3.2.1/tune_page_size_and_comp.html</a:t>
@@ -11101,7 +11279,7 @@
             </a:endParaRPr>
           </a:p>
           <a:p>
-            <a:pPr marL="343080" indent="-342360">
+            <a:pPr marL="343080" indent="-340920">
               <a:lnSpc>
                 <a:spcPct val="100000"/>
               </a:lnSpc>
@@ -11122,6 +11300,7 @@
                   </a:solidFill>
                 </a:uFill>
                 <a:latin typeface="Century Gothic"/>
+                <a:ea typeface="DejaVu Sans"/>
               </a:rPr>
               <a:t>https://mongoing.com/topic/archives-35143</a:t>
             </a:r>
@@ -11170,7 +11349,7 @@
         <p:spPr>
           <a:xfrm>
             <a:off x="1385640" y="4577760"/>
-            <a:ext cx="10387800" cy="1561320"/>
+            <a:ext cx="10386360" cy="1559880"/>
           </a:xfrm>
           <a:prstGeom prst="rect">
             <a:avLst/>
@@ -11238,7 +11417,7 @@
         <p:spPr>
           <a:xfrm>
             <a:off x="2593080" y="624240"/>
-            <a:ext cx="8911080" cy="1280160"/>
+            <a:ext cx="8909640" cy="1278720"/>
           </a:xfrm>
           <a:prstGeom prst="rect">
             <a:avLst/>
@@ -11273,6 +11452,7 @@
                   </a:solidFill>
                 </a:uFill>
                 <a:latin typeface="Century Gothic"/>
+                <a:ea typeface="DejaVu Sans"/>
               </a:rPr>
               <a:t>WiredTiger</a:t>
             </a:r>
@@ -11287,6 +11467,7 @@
                   </a:solidFill>
                 </a:uFill>
                 <a:latin typeface="Century Gothic"/>
+                <a:ea typeface="DejaVu Sans"/>
               </a:rPr>
               <a:t>数据文件在磁盘上的存储结构</a:t>
             </a:r>
@@ -11317,7 +11498,7 @@
         <p:spPr>
           <a:xfrm>
             <a:off x="4208400" y="2251080"/>
-            <a:ext cx="5676120" cy="3542760"/>
+            <a:ext cx="5674680" cy="3541320"/>
           </a:xfrm>
           <a:prstGeom prst="rect">
             <a:avLst/>
@@ -11385,7 +11566,7 @@
         <p:spPr>
           <a:xfrm>
             <a:off x="2593080" y="624240"/>
-            <a:ext cx="8911080" cy="1280160"/>
+            <a:ext cx="8909640" cy="1278720"/>
           </a:xfrm>
           <a:prstGeom prst="rect">
             <a:avLst/>
@@ -11420,6 +11601,7 @@
                   </a:solidFill>
                 </a:uFill>
                 <a:latin typeface="Century Gothic"/>
+                <a:ea typeface="DejaVu Sans"/>
               </a:rPr>
               <a:t>MongoDB</a:t>
             </a:r>
@@ -11434,6 +11616,7 @@
                   </a:solidFill>
                 </a:uFill>
                 <a:latin typeface="Century Gothic"/>
+                <a:ea typeface="DejaVu Sans"/>
               </a:rPr>
               <a:t>简介</a:t>
             </a:r>
@@ -11460,7 +11643,7 @@
         <p:spPr>
           <a:xfrm>
             <a:off x="2589120" y="2133720"/>
-            <a:ext cx="8914680" cy="3776760"/>
+            <a:ext cx="8913240" cy="3775320"/>
           </a:xfrm>
           <a:prstGeom prst="rect">
             <a:avLst/>
@@ -11479,7 +11662,7 @@
         <p:txBody>
           <a:bodyPr lIns="90000" rIns="90000" tIns="45000" bIns="45000"/>
           <a:p>
-            <a:pPr marL="343080" indent="-342360">
+            <a:pPr marL="343080" indent="-340920">
               <a:lnSpc>
                 <a:spcPct val="100000"/>
               </a:lnSpc>
@@ -11500,6 +11683,7 @@
                   </a:solidFill>
                 </a:uFill>
                 <a:latin typeface="Century Gothic"/>
+                <a:ea typeface="DejaVu Sans"/>
               </a:rPr>
               <a:t>MongoDB </a:t>
             </a:r>
@@ -11514,6 +11698,7 @@
                   </a:solidFill>
                 </a:uFill>
                 <a:latin typeface="Century Gothic"/>
+                <a:ea typeface="DejaVu Sans"/>
               </a:rPr>
               <a:t>是一个基于分布式文件存储的面向文档的数据库。由 </a:t>
             </a:r>
@@ -11528,6 +11713,7 @@
                   </a:solidFill>
                 </a:uFill>
                 <a:latin typeface="Century Gothic"/>
+                <a:ea typeface="DejaVu Sans"/>
               </a:rPr>
               <a:t>C++ </a:t>
             </a:r>
@@ -11542,6 +11728,7 @@
                   </a:solidFill>
                 </a:uFill>
                 <a:latin typeface="Century Gothic"/>
+                <a:ea typeface="DejaVu Sans"/>
               </a:rPr>
               <a:t>语言编写。旨在为 </a:t>
             </a:r>
@@ -11556,6 +11743,7 @@
                   </a:solidFill>
                 </a:uFill>
                 <a:latin typeface="Century Gothic"/>
+                <a:ea typeface="DejaVu Sans"/>
               </a:rPr>
               <a:t>WEB </a:t>
             </a:r>
@@ -11570,6 +11758,7 @@
                   </a:solidFill>
                 </a:uFill>
                 <a:latin typeface="Century Gothic"/>
+                <a:ea typeface="DejaVu Sans"/>
               </a:rPr>
               <a:t>应用提供可扩展的高性能数据存储解决方案。</a:t>
             </a:r>
@@ -11586,7 +11775,7 @@
             </a:endParaRPr>
           </a:p>
           <a:p>
-            <a:pPr marL="343080" indent="-342360">
+            <a:pPr marL="343080" indent="-340920">
               <a:lnSpc>
                 <a:spcPct val="100000"/>
               </a:lnSpc>
@@ -11607,6 +11796,7 @@
                   </a:solidFill>
                 </a:uFill>
                 <a:latin typeface="Century Gothic"/>
+                <a:ea typeface="DejaVu Sans"/>
               </a:rPr>
               <a:t>MongoDB</a:t>
             </a:r>
@@ -11621,6 +11811,7 @@
                   </a:solidFill>
                 </a:uFill>
                 <a:latin typeface="Century Gothic"/>
+                <a:ea typeface="DejaVu Sans"/>
               </a:rPr>
               <a:t>是一个介于关系数据库和非关系数据库之间的产品，是非关系数据库当中功能最丰富，最像关系数据库的。</a:t>
             </a:r>
@@ -11637,7 +11828,7 @@
             </a:endParaRPr>
           </a:p>
           <a:p>
-            <a:pPr marL="343080" indent="-342360">
+            <a:pPr marL="343080" indent="-340920">
               <a:lnSpc>
                 <a:spcPct val="100000"/>
               </a:lnSpc>
@@ -11658,6 +11849,7 @@
                   </a:solidFill>
                 </a:uFill>
                 <a:latin typeface="Century Gothic"/>
+                <a:ea typeface="DejaVu Sans"/>
               </a:rPr>
               <a:t>使用</a:t>
             </a:r>
@@ -11672,6 +11864,7 @@
                   </a:solidFill>
                 </a:uFill>
                 <a:latin typeface="Century Gothic"/>
+                <a:ea typeface="DejaVu Sans"/>
               </a:rPr>
               <a:t>Binary JSON</a:t>
             </a:r>
@@ -11686,6 +11879,7 @@
                   </a:solidFill>
                 </a:uFill>
                 <a:latin typeface="Century Gothic"/>
+                <a:ea typeface="DejaVu Sans"/>
               </a:rPr>
               <a:t>（二进制</a:t>
             </a:r>
@@ -11700,6 +11894,7 @@
                   </a:solidFill>
                 </a:uFill>
                 <a:latin typeface="Century Gothic"/>
+                <a:ea typeface="DejaVu Sans"/>
               </a:rPr>
               <a:t>JSON</a:t>
             </a:r>
@@ -11714,6 +11909,7 @@
                   </a:solidFill>
                 </a:uFill>
                 <a:latin typeface="Century Gothic"/>
+                <a:ea typeface="DejaVu Sans"/>
               </a:rPr>
               <a:t>）存储数据。</a:t>
             </a:r>
@@ -11730,7 +11926,7 @@
             </a:endParaRPr>
           </a:p>
           <a:p>
-            <a:pPr marL="343080" indent="-342360">
+            <a:pPr marL="343080" indent="-340920">
               <a:lnSpc>
                 <a:spcPct val="100000"/>
               </a:lnSpc>
@@ -11751,6 +11947,7 @@
                   </a:solidFill>
                 </a:uFill>
                 <a:latin typeface="Century Gothic"/>
+                <a:ea typeface="DejaVu Sans"/>
               </a:rPr>
               <a:t>NO-SQL</a:t>
             </a:r>
@@ -11765,6 +11962,7 @@
                   </a:solidFill>
                 </a:uFill>
                 <a:latin typeface="Century Gothic"/>
+                <a:ea typeface="DejaVu Sans"/>
               </a:rPr>
               <a:t>数据库。</a:t>
             </a:r>
@@ -11781,7 +11979,7 @@
             </a:endParaRPr>
           </a:p>
           <a:p>
-            <a:pPr marL="343080" indent="-342360">
+            <a:pPr marL="343080" indent="-340920">
               <a:lnSpc>
                 <a:spcPct val="100000"/>
               </a:lnSpc>
@@ -11802,6 +12000,7 @@
                   </a:solidFill>
                 </a:uFill>
                 <a:latin typeface="Century Gothic"/>
+                <a:ea typeface="DejaVu Sans"/>
               </a:rPr>
               <a:t>支持复制（副本集）和分片</a:t>
             </a:r>
@@ -11818,7 +12017,7 @@
             </a:endParaRPr>
           </a:p>
           <a:p>
-            <a:pPr marL="343080" indent="-342360">
+            <a:pPr marL="343080" indent="-340920">
               <a:lnSpc>
                 <a:spcPct val="100000"/>
               </a:lnSpc>
@@ -11839,6 +12038,7 @@
                   </a:solidFill>
                 </a:uFill>
                 <a:latin typeface="Century Gothic"/>
+                <a:ea typeface="DejaVu Sans"/>
               </a:rPr>
               <a:t>GridFS</a:t>
             </a:r>
@@ -11853,6 +12053,7 @@
                   </a:solidFill>
                 </a:uFill>
                 <a:latin typeface="Century Gothic"/>
+                <a:ea typeface="DejaVu Sans"/>
               </a:rPr>
               <a:t>分布式文件系统</a:t>
             </a:r>
@@ -11928,7 +12129,7 @@
         <p:spPr>
           <a:xfrm>
             <a:off x="2593080" y="624240"/>
-            <a:ext cx="8911080" cy="1280160"/>
+            <a:ext cx="8909640" cy="1278720"/>
           </a:xfrm>
           <a:prstGeom prst="rect">
             <a:avLst/>
@@ -11963,6 +12164,7 @@
                   </a:solidFill>
                 </a:uFill>
                 <a:latin typeface="Century Gothic"/>
+                <a:ea typeface="DejaVu Sans"/>
               </a:rPr>
               <a:t>MongoDB</a:t>
             </a:r>
@@ -11977,6 +12179,7 @@
                   </a:solidFill>
                 </a:uFill>
                 <a:latin typeface="Century Gothic"/>
+                <a:ea typeface="DejaVu Sans"/>
               </a:rPr>
               <a:t>有哪些索引</a:t>
             </a:r>
@@ -12003,7 +12206,7 @@
         <p:spPr>
           <a:xfrm>
             <a:off x="2589120" y="2133720"/>
-            <a:ext cx="8914680" cy="3776760"/>
+            <a:ext cx="8913240" cy="3775320"/>
           </a:xfrm>
           <a:prstGeom prst="rect">
             <a:avLst/>
@@ -12022,7 +12225,7 @@
         <p:txBody>
           <a:bodyPr lIns="90000" rIns="90000" tIns="45000" bIns="45000"/>
           <a:p>
-            <a:pPr marL="343080" indent="-342360">
+            <a:pPr marL="343080" indent="-340920">
               <a:lnSpc>
                 <a:spcPct val="100000"/>
               </a:lnSpc>
@@ -12043,6 +12246,7 @@
                   </a:solidFill>
                 </a:uFill>
                 <a:latin typeface="Century Gothic"/>
+                <a:ea typeface="DejaVu Sans"/>
               </a:rPr>
               <a:t>单字段索引</a:t>
             </a:r>
@@ -12059,7 +12263,7 @@
             </a:endParaRPr>
           </a:p>
           <a:p>
-            <a:pPr marL="343080" indent="-342360">
+            <a:pPr marL="343080" indent="-340920">
               <a:lnSpc>
                 <a:spcPct val="100000"/>
               </a:lnSpc>
@@ -12080,6 +12284,7 @@
                   </a:solidFill>
                 </a:uFill>
                 <a:latin typeface="Century Gothic"/>
+                <a:ea typeface="DejaVu Sans"/>
               </a:rPr>
               <a:t>复合索引</a:t>
             </a:r>
@@ -12096,7 +12301,7 @@
             </a:endParaRPr>
           </a:p>
           <a:p>
-            <a:pPr marL="343080" indent="-342360">
+            <a:pPr marL="343080" indent="-340920">
               <a:lnSpc>
                 <a:spcPct val="100000"/>
               </a:lnSpc>
@@ -12117,6 +12322,7 @@
                   </a:solidFill>
                 </a:uFill>
                 <a:latin typeface="Century Gothic"/>
+                <a:ea typeface="DejaVu Sans"/>
               </a:rPr>
               <a:t>多键索引</a:t>
             </a:r>
@@ -12133,7 +12339,7 @@
             </a:endParaRPr>
           </a:p>
           <a:p>
-            <a:pPr marL="343080" indent="-342360">
+            <a:pPr marL="343080" indent="-340920">
               <a:lnSpc>
                 <a:spcPct val="100000"/>
               </a:lnSpc>
@@ -12154,6 +12360,7 @@
                   </a:solidFill>
                 </a:uFill>
                 <a:latin typeface="Century Gothic"/>
+                <a:ea typeface="DejaVu Sans"/>
               </a:rPr>
               <a:t>Hash</a:t>
             </a:r>
@@ -12168,6 +12375,7 @@
                   </a:solidFill>
                 </a:uFill>
                 <a:latin typeface="Century Gothic"/>
+                <a:ea typeface="DejaVu Sans"/>
               </a:rPr>
               <a:t>索引</a:t>
             </a:r>
@@ -12184,7 +12392,7 @@
             </a:endParaRPr>
           </a:p>
           <a:p>
-            <a:pPr marL="343080" indent="-342360">
+            <a:pPr marL="343080" indent="-340920">
               <a:lnSpc>
                 <a:spcPct val="100000"/>
               </a:lnSpc>
@@ -12205,6 +12413,7 @@
                   </a:solidFill>
                 </a:uFill>
                 <a:latin typeface="Century Gothic"/>
+                <a:ea typeface="DejaVu Sans"/>
               </a:rPr>
               <a:t>全文索引</a:t>
             </a:r>
@@ -12221,7 +12430,7 @@
             </a:endParaRPr>
           </a:p>
           <a:p>
-            <a:pPr marL="343080" indent="-342360">
+            <a:pPr marL="343080" indent="-340920">
               <a:lnSpc>
                 <a:spcPct val="100000"/>
               </a:lnSpc>
@@ -12242,6 +12451,7 @@
                   </a:solidFill>
                 </a:uFill>
                 <a:latin typeface="Century Gothic"/>
+                <a:ea typeface="DejaVu Sans"/>
               </a:rPr>
               <a:t>过期索引</a:t>
             </a:r>
@@ -12353,7 +12563,7 @@
         <p:spPr>
           <a:xfrm>
             <a:off x="2593080" y="624240"/>
-            <a:ext cx="8911080" cy="1280160"/>
+            <a:ext cx="8909640" cy="1278720"/>
           </a:xfrm>
           <a:prstGeom prst="rect">
             <a:avLst/>
@@ -12388,6 +12598,7 @@
                   </a:solidFill>
                 </a:uFill>
                 <a:latin typeface="Century Gothic"/>
+                <a:ea typeface="DejaVu Sans"/>
               </a:rPr>
               <a:t>单字段索引</a:t>
             </a:r>
@@ -12414,7 +12625,7 @@
         <p:spPr>
           <a:xfrm>
             <a:off x="2589120" y="2133720"/>
-            <a:ext cx="8914680" cy="3776760"/>
+            <a:ext cx="8913240" cy="3775320"/>
           </a:xfrm>
           <a:prstGeom prst="rect">
             <a:avLst/>
@@ -12433,7 +12644,7 @@
         <p:txBody>
           <a:bodyPr lIns="90000" rIns="90000" tIns="45000" bIns="45000"/>
           <a:p>
-            <a:pPr marL="343080" indent="-342360">
+            <a:pPr marL="343080" indent="-340920">
               <a:lnSpc>
                 <a:spcPct val="100000"/>
               </a:lnSpc>
@@ -12454,6 +12665,7 @@
                   </a:solidFill>
                 </a:uFill>
                 <a:latin typeface="Century Gothic"/>
+                <a:ea typeface="DejaVu Sans"/>
               </a:rPr>
               <a:t>MongoDB </a:t>
             </a:r>
@@ -12468,6 +12680,7 @@
                   </a:solidFill>
                 </a:uFill>
                 <a:latin typeface="Century Gothic"/>
+                <a:ea typeface="DejaVu Sans"/>
               </a:rPr>
               <a:t>支持在文档集合中任意某个字段上创建索引</a:t>
             </a:r>
@@ -12484,7 +12697,7 @@
             </a:endParaRPr>
           </a:p>
           <a:p>
-            <a:pPr marL="343080" indent="-342360">
+            <a:pPr marL="343080" indent="-340920">
               <a:lnSpc>
                 <a:spcPct val="100000"/>
               </a:lnSpc>
@@ -12505,6 +12718,7 @@
                   </a:solidFill>
                 </a:uFill>
                 <a:latin typeface="Century Gothic"/>
+                <a:ea typeface="DejaVu Sans"/>
               </a:rPr>
               <a:t>在默认情况下，所有集合在 </a:t>
             </a:r>
@@ -12519,6 +12733,7 @@
                   </a:solidFill>
                 </a:uFill>
                 <a:latin typeface="Century Gothic"/>
+                <a:ea typeface="DejaVu Sans"/>
               </a:rPr>
               <a:t>_id </a:t>
             </a:r>
@@ -12533,6 +12748,7 @@
                   </a:solidFill>
                 </a:uFill>
                 <a:latin typeface="Century Gothic"/>
+                <a:ea typeface="DejaVu Sans"/>
               </a:rPr>
               <a:t>字段上都有一个索引</a:t>
             </a:r>
@@ -12549,7 +12765,7 @@
             </a:endParaRPr>
           </a:p>
           <a:p>
-            <a:pPr marL="343080" indent="-342360">
+            <a:pPr marL="343080" indent="-340920">
               <a:lnSpc>
                 <a:spcPct val="100000"/>
               </a:lnSpc>
@@ -12570,6 +12786,7 @@
                   </a:solidFill>
                 </a:uFill>
                 <a:latin typeface="Century Gothic"/>
+                <a:ea typeface="DejaVu Sans"/>
               </a:rPr>
               <a:t>对于单字段索引和排序操作，索引键的排序顺序（即升序或降序）无关紧要，因为 </a:t>
             </a:r>
@@ -12584,6 +12801,7 @@
                   </a:solidFill>
                 </a:uFill>
                 <a:latin typeface="Century Gothic"/>
+                <a:ea typeface="DejaVu Sans"/>
               </a:rPr>
               <a:t>MongoDB </a:t>
             </a:r>
@@ -12598,8 +12816,92 @@
                   </a:solidFill>
                 </a:uFill>
                 <a:latin typeface="Century Gothic"/>
+                <a:ea typeface="DejaVu Sans"/>
               </a:rPr>
               <a:t>可以在任意方向上遍历索引。</a:t>
+            </a:r>
+            <a:endParaRPr b="0" lang="en-US" sz="1800" spc="-1" strike="noStrike">
+              <a:solidFill>
+                <a:srgbClr val="000000"/>
+              </a:solidFill>
+              <a:uFill>
+                <a:solidFill>
+                  <a:srgbClr val="ffffff"/>
+                </a:solidFill>
+              </a:uFill>
+              <a:latin typeface="Arial"/>
+            </a:endParaRPr>
+          </a:p>
+          <a:p>
+            <a:pPr marL="343080" indent="-340920">
+              <a:lnSpc>
+                <a:spcPct val="100000"/>
+              </a:lnSpc>
+              <a:buClr>
+                <a:srgbClr val="a53010"/>
+              </a:buClr>
+              <a:buFont typeface="Wingdings 3" charset="2"/>
+              <a:buChar char=""/>
+            </a:pPr>
+            <a:r>
+              <a:rPr b="0" lang="en-US" sz="1800" spc="-1" strike="noStrike">
+                <a:solidFill>
+                  <a:srgbClr val="404040"/>
+                </a:solidFill>
+                <a:uFill>
+                  <a:solidFill>
+                    <a:srgbClr val="ffffff"/>
+                  </a:solidFill>
+                </a:uFill>
+                <a:latin typeface="Century Gothic"/>
+                <a:ea typeface="DejaVu Sans"/>
+              </a:rPr>
+              <a:t>MongoDB</a:t>
+            </a:r>
+            <a:r>
+              <a:rPr b="0" lang="en-US" sz="1800" spc="-1" strike="noStrike">
+                <a:solidFill>
+                  <a:srgbClr val="404040"/>
+                </a:solidFill>
+                <a:uFill>
+                  <a:solidFill>
+                    <a:srgbClr val="ffffff"/>
+                  </a:solidFill>
+                </a:uFill>
+                <a:latin typeface="Century Gothic"/>
+                <a:ea typeface="DejaVu Sans"/>
+              </a:rPr>
+              <a:t>最多只能创建</a:t>
+            </a:r>
+            <a:r>
+              <a:rPr b="0" lang="en-US" sz="1800" spc="-1" strike="noStrike">
+                <a:solidFill>
+                  <a:srgbClr val="404040"/>
+                </a:solidFill>
+                <a:uFill>
+                  <a:solidFill>
+                    <a:srgbClr val="ffffff"/>
+                  </a:solidFill>
+                </a:uFill>
+                <a:latin typeface="Century Gothic"/>
+                <a:ea typeface="DejaVu Sans"/>
+              </a:rPr>
+              <a:t>64</a:t>
+            </a:r>
+            <a:r>
+              <a:rPr b="0" lang="en-US" sz="1800" spc="-1" strike="noStrike">
+                <a:solidFill>
+                  <a:srgbClr val="404040"/>
+                </a:solidFill>
+                <a:uFill>
+                  <a:solidFill>
+                    <a:srgbClr val="ffffff"/>
+                  </a:solidFill>
+                </a:uFill>
+                <a:latin typeface="Century Gothic"/>
+                <a:ea typeface="DejaVu Sans"/>
+              </a:rPr>
+              <a:t>个索引。</a:t>
             </a:r>
             <a:endParaRPr b="0" lang="en-US" sz="1800" spc="-1" strike="noStrike">
               <a:solidFill>
@@ -12673,7 +12975,7 @@
         <p:spPr>
           <a:xfrm>
             <a:off x="2593080" y="624240"/>
-            <a:ext cx="8911080" cy="1280160"/>
+            <a:ext cx="8909640" cy="1278720"/>
           </a:xfrm>
           <a:prstGeom prst="rect">
             <a:avLst/>
@@ -12708,6 +13010,7 @@
                   </a:solidFill>
                 </a:uFill>
                 <a:latin typeface="Century Gothic"/>
+                <a:ea typeface="DejaVu Sans"/>
               </a:rPr>
               <a:t>_id</a:t>
             </a:r>
@@ -12722,6 +13025,7 @@
                   </a:solidFill>
                 </a:uFill>
                 <a:latin typeface="Century Gothic"/>
+                <a:ea typeface="DejaVu Sans"/>
               </a:rPr>
               <a:t>索引</a:t>
             </a:r>
@@ -12748,7 +13052,7 @@
         <p:spPr>
           <a:xfrm>
             <a:off x="2589120" y="2133720"/>
-            <a:ext cx="8914680" cy="3776760"/>
+            <a:ext cx="8913240" cy="3775320"/>
           </a:xfrm>
           <a:prstGeom prst="rect">
             <a:avLst/>
@@ -12767,7 +13071,7 @@
         <p:txBody>
           <a:bodyPr lIns="90000" rIns="90000" tIns="45000" bIns="45000"/>
           <a:p>
-            <a:pPr marL="343080" indent="-342360">
+            <a:pPr marL="343080" indent="-340920">
               <a:lnSpc>
                 <a:spcPct val="100000"/>
               </a:lnSpc>
@@ -12788,6 +13092,7 @@
                   </a:solidFill>
                 </a:uFill>
                 <a:latin typeface="Century Gothic"/>
+                <a:ea typeface="DejaVu Sans"/>
               </a:rPr>
               <a:t>属于单字段索引的一种，</a:t>
             </a:r>
@@ -12802,6 +13107,7 @@
                   </a:solidFill>
                 </a:uFill>
                 <a:latin typeface="Century Gothic"/>
+                <a:ea typeface="DejaVu Sans"/>
               </a:rPr>
               <a:t>MongoDB</a:t>
             </a:r>
@@ -12816,6 +13122,7 @@
                   </a:solidFill>
                 </a:uFill>
                 <a:latin typeface="Century Gothic"/>
+                <a:ea typeface="DejaVu Sans"/>
               </a:rPr>
               <a:t>默认创建</a:t>
             </a:r>
@@ -12832,7 +13139,7 @@
             </a:endParaRPr>
           </a:p>
           <a:p>
-            <a:pPr marL="343080" indent="-342360">
+            <a:pPr marL="343080" indent="-340920">
               <a:lnSpc>
                 <a:spcPct val="100000"/>
               </a:lnSpc>
@@ -12853,6 +13160,7 @@
                   </a:solidFill>
                 </a:uFill>
                 <a:latin typeface="Century Gothic"/>
+                <a:ea typeface="DejaVu Sans"/>
               </a:rPr>
               <a:t>默认情况下，</a:t>
             </a:r>
@@ -12867,6 +13175,7 @@
                   </a:solidFill>
                 </a:uFill>
                 <a:latin typeface="Century Gothic"/>
+                <a:ea typeface="DejaVu Sans"/>
               </a:rPr>
               <a:t>_id </a:t>
             </a:r>
@@ -12881,6 +13190,7 @@
                   </a:solidFill>
                 </a:uFill>
                 <a:latin typeface="Century Gothic"/>
+                <a:ea typeface="DejaVu Sans"/>
               </a:rPr>
               <a:t>字段的类型为 </a:t>
             </a:r>
@@ -12895,6 +13205,7 @@
                   </a:solidFill>
                 </a:uFill>
                 <a:latin typeface="Century Gothic"/>
+                <a:ea typeface="DejaVu Sans"/>
               </a:rPr>
               <a:t>ObjectID</a:t>
             </a:r>
@@ -12909,6 +13220,7 @@
                   </a:solidFill>
                 </a:uFill>
                 <a:latin typeface="Century Gothic"/>
+                <a:ea typeface="DejaVu Sans"/>
               </a:rPr>
               <a:t>，是 </a:t>
             </a:r>
@@ -12923,6 +13235,7 @@
                   </a:solidFill>
                 </a:uFill>
                 <a:latin typeface="Century Gothic"/>
+                <a:ea typeface="DejaVu Sans"/>
               </a:rPr>
               <a:t>MongoDB </a:t>
             </a:r>
@@ -12937,6 +13250,7 @@
                   </a:solidFill>
                 </a:uFill>
                 <a:latin typeface="Century Gothic"/>
+                <a:ea typeface="DejaVu Sans"/>
               </a:rPr>
               <a:t>的 </a:t>
             </a:r>
@@ -12951,6 +13265,7 @@
                   </a:solidFill>
                 </a:uFill>
                 <a:latin typeface="Century Gothic"/>
+                <a:ea typeface="DejaVu Sans"/>
               </a:rPr>
               <a:t>BSON </a:t>
             </a:r>
@@ -12965,6 +13280,7 @@
                   </a:solidFill>
                 </a:uFill>
                 <a:latin typeface="Century Gothic"/>
+                <a:ea typeface="DejaVu Sans"/>
               </a:rPr>
               <a:t>类型之一。</a:t>
             </a:r>
@@ -12981,7 +13297,7 @@
             </a:endParaRPr>
           </a:p>
           <a:p>
-            <a:pPr marL="343080" indent="-342360">
+            <a:pPr marL="343080" indent="-340920">
               <a:lnSpc>
                 <a:spcPct val="100000"/>
               </a:lnSpc>
@@ -13002,6 +13318,7 @@
                   </a:solidFill>
                 </a:uFill>
                 <a:latin typeface="Century Gothic"/>
+                <a:ea typeface="DejaVu Sans"/>
               </a:rPr>
               <a:t>ObjectID </a:t>
             </a:r>
@@ -13016,6 +13333,7 @@
                   </a:solidFill>
                 </a:uFill>
                 <a:latin typeface="Century Gothic"/>
+                <a:ea typeface="DejaVu Sans"/>
               </a:rPr>
               <a:t>长度为 </a:t>
             </a:r>
@@ -13030,6 +13348,7 @@
                   </a:solidFill>
                 </a:uFill>
                 <a:latin typeface="Century Gothic"/>
+                <a:ea typeface="DejaVu Sans"/>
               </a:rPr>
               <a:t>12 </a:t>
             </a:r>
@@ -13044,6 +13363,7 @@
                   </a:solidFill>
                 </a:uFill>
                 <a:latin typeface="Century Gothic"/>
+                <a:ea typeface="DejaVu Sans"/>
               </a:rPr>
               <a:t>字节，由以下</a:t>
             </a:r>
@@ -13058,6 +13378,7 @@
                   </a:solidFill>
                 </a:uFill>
                 <a:latin typeface="Century Gothic"/>
+                <a:ea typeface="DejaVu Sans"/>
               </a:rPr>
               <a:t>4</a:t>
             </a:r>
@@ -13072,6 +13393,7 @@
                   </a:solidFill>
                 </a:uFill>
                 <a:latin typeface="Century Gothic"/>
+                <a:ea typeface="DejaVu Sans"/>
               </a:rPr>
               <a:t>个部分组成：</a:t>
             </a:r>
@@ -13088,7 +13410,7 @@
             </a:endParaRPr>
           </a:p>
           <a:p>
-            <a:pPr marL="343080" indent="-342360">
+            <a:pPr marL="343080" indent="-340920">
               <a:lnSpc>
                 <a:spcPct val="100000"/>
               </a:lnSpc>
@@ -13109,6 +13431,7 @@
                   </a:solidFill>
                 </a:uFill>
                 <a:latin typeface="Century Gothic"/>
+                <a:ea typeface="DejaVu Sans"/>
               </a:rPr>
               <a:t>4 </a:t>
             </a:r>
@@ -13123,6 +13446,7 @@
                   </a:solidFill>
                 </a:uFill>
                 <a:latin typeface="Century Gothic"/>
+                <a:ea typeface="DejaVu Sans"/>
               </a:rPr>
               <a:t>字节的</a:t>
             </a:r>
@@ -13137,6 +13461,7 @@
                   </a:solidFill>
                 </a:uFill>
                 <a:latin typeface="Century Gothic"/>
+                <a:ea typeface="DejaVu Sans"/>
               </a:rPr>
               <a:t>Unix</a:t>
             </a:r>
@@ -13151,6 +13476,7 @@
                   </a:solidFill>
                 </a:uFill>
                 <a:latin typeface="Century Gothic"/>
+                <a:ea typeface="DejaVu Sans"/>
               </a:rPr>
               <a:t>时间戳，单位为秒</a:t>
             </a:r>
@@ -13167,7 +13493,7 @@
             </a:endParaRPr>
           </a:p>
           <a:p>
-            <a:pPr marL="343080" indent="-342360">
+            <a:pPr marL="343080" indent="-340920">
               <a:lnSpc>
                 <a:spcPct val="100000"/>
               </a:lnSpc>
@@ -13188,6 +13514,7 @@
                   </a:solidFill>
                 </a:uFill>
                 <a:latin typeface="Century Gothic"/>
+                <a:ea typeface="DejaVu Sans"/>
               </a:rPr>
               <a:t>3 </a:t>
             </a:r>
@@ -13202,6 +13529,7 @@
                   </a:solidFill>
                 </a:uFill>
                 <a:latin typeface="Century Gothic"/>
+                <a:ea typeface="DejaVu Sans"/>
               </a:rPr>
               <a:t>字节的机器标识符</a:t>
             </a:r>
@@ -13218,7 +13546,7 @@
             </a:endParaRPr>
           </a:p>
           <a:p>
-            <a:pPr marL="343080" indent="-342360">
+            <a:pPr marL="343080" indent="-340920">
               <a:lnSpc>
                 <a:spcPct val="100000"/>
               </a:lnSpc>
@@ -13239,6 +13567,7 @@
                   </a:solidFill>
                 </a:uFill>
                 <a:latin typeface="Century Gothic"/>
+                <a:ea typeface="DejaVu Sans"/>
               </a:rPr>
               <a:t>2 </a:t>
             </a:r>
@@ -13253,6 +13582,7 @@
                   </a:solidFill>
                 </a:uFill>
                 <a:latin typeface="Century Gothic"/>
+                <a:ea typeface="DejaVu Sans"/>
               </a:rPr>
               <a:t>字节的进程 </a:t>
             </a:r>
@@ -13267,6 +13597,7 @@
                   </a:solidFill>
                 </a:uFill>
                 <a:latin typeface="Century Gothic"/>
+                <a:ea typeface="DejaVu Sans"/>
               </a:rPr>
               <a:t>ID</a:t>
             </a:r>
@@ -13283,7 +13614,7 @@
             </a:endParaRPr>
           </a:p>
           <a:p>
-            <a:pPr marL="343080" indent="-342360">
+            <a:pPr marL="343080" indent="-340920">
               <a:lnSpc>
                 <a:spcPct val="100000"/>
               </a:lnSpc>
@@ -13304,6 +13635,7 @@
                   </a:solidFill>
                 </a:uFill>
                 <a:latin typeface="Century Gothic"/>
+                <a:ea typeface="DejaVu Sans"/>
               </a:rPr>
               <a:t>3</a:t>
             </a:r>
@@ -13318,6 +13650,7 @@
                   </a:solidFill>
                 </a:uFill>
                 <a:latin typeface="Century Gothic"/>
+                <a:ea typeface="DejaVu Sans"/>
               </a:rPr>
               <a:t>字节的计数器，以随机值开始</a:t>
             </a:r>
@@ -13393,7 +13726,7 @@
         <p:spPr>
           <a:xfrm>
             <a:off x="2593080" y="624240"/>
-            <a:ext cx="8911080" cy="1280160"/>
+            <a:ext cx="8909640" cy="1278720"/>
           </a:xfrm>
           <a:prstGeom prst="rect">
             <a:avLst/>
@@ -13428,6 +13761,7 @@
                   </a:solidFill>
                 </a:uFill>
                 <a:latin typeface="Century Gothic"/>
+                <a:ea typeface="DejaVu Sans"/>
               </a:rPr>
               <a:t>复合索引</a:t>
             </a:r>
@@ -13454,7 +13788,7 @@
         <p:spPr>
           <a:xfrm>
             <a:off x="2589120" y="2133720"/>
-            <a:ext cx="8914680" cy="3776760"/>
+            <a:ext cx="8913240" cy="3775320"/>
           </a:xfrm>
           <a:prstGeom prst="rect">
             <a:avLst/>
@@ -13473,7 +13807,7 @@
         <p:txBody>
           <a:bodyPr lIns="90000" rIns="90000" tIns="45000" bIns="45000"/>
           <a:p>
-            <a:pPr marL="343080" indent="-342360">
+            <a:pPr marL="343080" indent="-340920">
               <a:lnSpc>
                 <a:spcPct val="100000"/>
               </a:lnSpc>
@@ -13494,6 +13828,7 @@
                   </a:solidFill>
                 </a:uFill>
                 <a:latin typeface="Century Gothic"/>
+                <a:ea typeface="DejaVu Sans"/>
               </a:rPr>
               <a:t>MongoDB </a:t>
             </a:r>
@@ -13508,6 +13843,7 @@
                   </a:solidFill>
                 </a:uFill>
                 <a:latin typeface="Century Gothic"/>
+                <a:ea typeface="DejaVu Sans"/>
               </a:rPr>
               <a:t>支持在文档集合中多个某个字段上创建索引</a:t>
             </a:r>
@@ -13524,280 +13860,7 @@
             </a:endParaRPr>
           </a:p>
           <a:p>
-            <a:pPr marL="343080" indent="-342360">
-              <a:buClr>
-                <a:srgbClr val="a53010"/>
-              </a:buClr>
-              <a:buFont typeface="Wingdings 3" charset="2"/>
-              <a:buChar char=""/>
-            </a:pPr>
-            <a:r>
-              <a:rPr b="0" lang="en-US" sz="1800" spc="-1" strike="noStrike">
-                <a:solidFill>
-                  <a:srgbClr val="404040"/>
-                </a:solidFill>
-                <a:uFill>
-                  <a:solidFill>
-                    <a:srgbClr val="ffffff"/>
-                  </a:solidFill>
-                </a:uFill>
-                <a:latin typeface="Century Gothic"/>
-              </a:rPr>
-              <a:t>创建复合索引时指定的字段顺序会影响排序时是否可以命中索引。</a:t>
-            </a:r>
-            <a:endParaRPr b="0" lang="en-US" sz="1800" spc="-1" strike="noStrike">
-              <a:solidFill>
-                <a:srgbClr val="000000"/>
-              </a:solidFill>
-              <a:uFill>
-                <a:solidFill>
-                  <a:srgbClr val="ffffff"/>
-                </a:solidFill>
-              </a:uFill>
-              <a:latin typeface="Arial"/>
-            </a:endParaRPr>
-          </a:p>
-          <a:p>
-            <a:pPr marL="343080" indent="-342360">
-              <a:buClr>
-                <a:srgbClr val="a53010"/>
-              </a:buClr>
-              <a:buFont typeface="Wingdings 3" charset="2"/>
-              <a:buChar char=""/>
-            </a:pPr>
-            <a:r>
-              <a:rPr b="0" lang="en-US" sz="1800" spc="-1" strike="noStrike">
-                <a:solidFill>
-                  <a:srgbClr val="404040"/>
-                </a:solidFill>
-                <a:uFill>
-                  <a:solidFill>
-                    <a:srgbClr val="ffffff"/>
-                  </a:solidFill>
-                </a:uFill>
-                <a:latin typeface="Century Gothic"/>
-              </a:rPr>
-              <a:t>db.product.createIndex({price:1,stock:-1})</a:t>
-            </a:r>
-            <a:r>
-              <a:rPr b="0" lang="en-US" sz="1000" spc="-1" strike="noStrike">
-                <a:solidFill>
-                  <a:srgbClr val="cc7832"/>
-                </a:solidFill>
-                <a:uFill>
-                  <a:solidFill>
-                    <a:srgbClr val="ffffff"/>
-                  </a:solidFill>
-                </a:uFill>
-                <a:latin typeface="JetBrains Mono"/>
-                <a:ea typeface="JetBrains Mono"/>
-              </a:rPr>
-              <a:t>;</a:t>
-            </a:r>
-            <a:endParaRPr b="0" lang="en-US" sz="1800" spc="-1" strike="noStrike">
-              <a:solidFill>
-                <a:srgbClr val="000000"/>
-              </a:solidFill>
-              <a:uFill>
-                <a:solidFill>
-                  <a:srgbClr val="ffffff"/>
-                </a:solidFill>
-              </a:uFill>
-              <a:latin typeface="Arial"/>
-            </a:endParaRPr>
-          </a:p>
-          <a:p>
-            <a:pPr marL="343080" indent="-342360">
-              <a:buClr>
-                <a:srgbClr val="a53010"/>
-              </a:buClr>
-              <a:buFont typeface="Wingdings 3" charset="2"/>
-              <a:buChar char=""/>
-            </a:pPr>
-            <a:r>
-              <a:rPr b="0" lang="en-US" sz="1800" spc="-1" strike="noStrike">
-                <a:solidFill>
-                  <a:srgbClr val="404040"/>
-                </a:solidFill>
-                <a:uFill>
-                  <a:solidFill>
-                    <a:srgbClr val="ffffff"/>
-                  </a:solidFill>
-                </a:uFill>
-                <a:latin typeface="Century Gothic"/>
-              </a:rPr>
-              <a:t>//</a:t>
-            </a:r>
-            <a:r>
-              <a:rPr b="0" lang="en-US" sz="1800" spc="-1" strike="noStrike">
-                <a:solidFill>
-                  <a:srgbClr val="404040"/>
-                </a:solidFill>
-                <a:uFill>
-                  <a:solidFill>
-                    <a:srgbClr val="ffffff"/>
-                  </a:solidFill>
-                </a:uFill>
-                <a:latin typeface="Century Gothic"/>
-              </a:rPr>
-              <a:t>索引支持排序</a:t>
-            </a:r>
-            <a:endParaRPr b="0" lang="en-US" sz="1800" spc="-1" strike="noStrike">
-              <a:solidFill>
-                <a:srgbClr val="000000"/>
-              </a:solidFill>
-              <a:uFill>
-                <a:solidFill>
-                  <a:srgbClr val="ffffff"/>
-                </a:solidFill>
-              </a:uFill>
-              <a:latin typeface="Arial"/>
-            </a:endParaRPr>
-          </a:p>
-          <a:p>
-            <a:pPr>
-              <a:lnSpc>
-                <a:spcPct val="100000"/>
-              </a:lnSpc>
-            </a:pPr>
-            <a:r>
-              <a:rPr b="0" lang="en-US" sz="1800" spc="-1" strike="noStrike">
-                <a:solidFill>
-                  <a:srgbClr val="404040"/>
-                </a:solidFill>
-                <a:uFill>
-                  <a:solidFill>
-                    <a:srgbClr val="ffffff"/>
-                  </a:solidFill>
-                </a:uFill>
-                <a:latin typeface="Century Gothic"/>
-              </a:rPr>
-              <a:t>db.product.find().sort({price:1,stock:-1}).explain();</a:t>
-            </a:r>
-            <a:endParaRPr b="0" lang="en-US" sz="1800" spc="-1" strike="noStrike">
-              <a:solidFill>
-                <a:srgbClr val="000000"/>
-              </a:solidFill>
-              <a:uFill>
-                <a:solidFill>
-                  <a:srgbClr val="ffffff"/>
-                </a:solidFill>
-              </a:uFill>
-              <a:latin typeface="Arial"/>
-            </a:endParaRPr>
-          </a:p>
-          <a:p>
-            <a:pPr>
-              <a:lnSpc>
-                <a:spcPct val="100000"/>
-              </a:lnSpc>
-            </a:pPr>
-            <a:r>
-              <a:rPr b="0" lang="en-US" sz="1800" spc="-1" strike="noStrike">
-                <a:solidFill>
-                  <a:srgbClr val="404040"/>
-                </a:solidFill>
-                <a:uFill>
-                  <a:solidFill>
-                    <a:srgbClr val="ffffff"/>
-                  </a:solidFill>
-                </a:uFill>
-                <a:latin typeface="Century Gothic"/>
-              </a:rPr>
-              <a:t>db.product.find().sort({price:-1,stock:1}).explain();</a:t>
-            </a:r>
-            <a:endParaRPr b="0" lang="en-US" sz="1800" spc="-1" strike="noStrike">
-              <a:solidFill>
-                <a:srgbClr val="000000"/>
-              </a:solidFill>
-              <a:uFill>
-                <a:solidFill>
-                  <a:srgbClr val="ffffff"/>
-                </a:solidFill>
-              </a:uFill>
-              <a:latin typeface="Arial"/>
-            </a:endParaRPr>
-          </a:p>
-          <a:p>
-            <a:pPr>
-              <a:lnSpc>
-                <a:spcPct val="100000"/>
-              </a:lnSpc>
-            </a:pPr>
-            <a:r>
-              <a:rPr b="0" lang="en-US" sz="1800" spc="-1" strike="noStrike">
-                <a:solidFill>
-                  <a:srgbClr val="404040"/>
-                </a:solidFill>
-                <a:uFill>
-                  <a:solidFill>
-                    <a:srgbClr val="ffffff"/>
-                  </a:solidFill>
-                </a:uFill>
-                <a:latin typeface="Century Gothic"/>
-              </a:rPr>
-              <a:t>//</a:t>
-            </a:r>
-            <a:r>
-              <a:rPr b="0" lang="en-US" sz="1800" spc="-1" strike="noStrike">
-                <a:solidFill>
-                  <a:srgbClr val="404040"/>
-                </a:solidFill>
-                <a:uFill>
-                  <a:solidFill>
-                    <a:srgbClr val="ffffff"/>
-                  </a:solidFill>
-                </a:uFill>
-                <a:latin typeface="Century Gothic"/>
-              </a:rPr>
-              <a:t>索引不支持排序</a:t>
-            </a:r>
-            <a:endParaRPr b="0" lang="en-US" sz="1800" spc="-1" strike="noStrike">
-              <a:solidFill>
-                <a:srgbClr val="000000"/>
-              </a:solidFill>
-              <a:uFill>
-                <a:solidFill>
-                  <a:srgbClr val="ffffff"/>
-                </a:solidFill>
-              </a:uFill>
-              <a:latin typeface="Arial"/>
-            </a:endParaRPr>
-          </a:p>
-          <a:p>
-            <a:pPr>
-              <a:lnSpc>
-                <a:spcPct val="100000"/>
-              </a:lnSpc>
-            </a:pPr>
-            <a:r>
-              <a:rPr b="0" lang="en-US" sz="1800" spc="-1" strike="noStrike">
-                <a:solidFill>
-                  <a:srgbClr val="404040"/>
-                </a:solidFill>
-                <a:uFill>
-                  <a:solidFill>
-                    <a:srgbClr val="ffffff"/>
-                  </a:solidFill>
-                </a:uFill>
-                <a:latin typeface="Century Gothic"/>
-              </a:rPr>
-              <a:t>db.product.find().sort({price:1,stock:1}).explain();</a:t>
-            </a:r>
-            <a:endParaRPr b="0" lang="en-US" sz="1800" spc="-1" strike="noStrike">
-              <a:solidFill>
-                <a:srgbClr val="000000"/>
-              </a:solidFill>
-              <a:uFill>
-                <a:solidFill>
-                  <a:srgbClr val="ffffff"/>
-                </a:solidFill>
-              </a:uFill>
-              <a:latin typeface="Arial"/>
-            </a:endParaRPr>
-          </a:p>
-          <a:p>
-            <a:pPr marL="343080" indent="-342360">
+            <a:pPr marL="343080" indent="-340920">
               <a:lnSpc>
                 <a:spcPct val="100000"/>
               </a:lnSpc>
@@ -13818,9 +13881,349 @@
                   </a:solidFill>
                 </a:uFill>
                 <a:latin typeface="Century Gothic"/>
-              </a:rPr>
-              <a:t>符合最左前缀原则。</a:t>
-            </a:r>
+                <a:ea typeface="DejaVu Sans"/>
+              </a:rPr>
+              <a:t>创建复合索引时指定的字段顺序会影响排序时是否可以命中索引。</a:t>
+            </a:r>
+            <a:endParaRPr b="0" lang="en-US" sz="1800" spc="-1" strike="noStrike">
+              <a:solidFill>
+                <a:srgbClr val="000000"/>
+              </a:solidFill>
+              <a:uFill>
+                <a:solidFill>
+                  <a:srgbClr val="ffffff"/>
+                </a:solidFill>
+              </a:uFill>
+              <a:latin typeface="Arial"/>
+            </a:endParaRPr>
+          </a:p>
+          <a:p>
+            <a:pPr marL="343080" indent="-340920">
+              <a:lnSpc>
+                <a:spcPct val="100000"/>
+              </a:lnSpc>
+              <a:buClr>
+                <a:srgbClr val="a53010"/>
+              </a:buClr>
+              <a:buFont typeface="Wingdings 3" charset="2"/>
+              <a:buChar char=""/>
+            </a:pPr>
+            <a:r>
+              <a:rPr b="0" lang="en-US" sz="1800" spc="-1" strike="noStrike">
+                <a:solidFill>
+                  <a:srgbClr val="404040"/>
+                </a:solidFill>
+                <a:uFill>
+                  <a:solidFill>
+                    <a:srgbClr val="ffffff"/>
+                  </a:solidFill>
+                </a:uFill>
+                <a:latin typeface="Century Gothic"/>
+                <a:ea typeface="DejaVu Sans"/>
+              </a:rPr>
+              <a:t>db.product.createIndex({price:1,stock:-1})</a:t>
+            </a:r>
+            <a:r>
+              <a:rPr b="0" lang="en-US" sz="1000" spc="-1" strike="noStrike">
+                <a:solidFill>
+                  <a:srgbClr val="cc7832"/>
+                </a:solidFill>
+                <a:uFill>
+                  <a:solidFill>
+                    <a:srgbClr val="ffffff"/>
+                  </a:solidFill>
+                </a:uFill>
+                <a:latin typeface="JetBrains Mono"/>
+                <a:ea typeface="JetBrains Mono"/>
+              </a:rPr>
+              <a:t>;</a:t>
+            </a:r>
+            <a:endParaRPr b="0" lang="en-US" sz="1800" spc="-1" strike="noStrike">
+              <a:solidFill>
+                <a:srgbClr val="000000"/>
+              </a:solidFill>
+              <a:uFill>
+                <a:solidFill>
+                  <a:srgbClr val="ffffff"/>
+                </a:solidFill>
+              </a:uFill>
+              <a:latin typeface="Arial"/>
+            </a:endParaRPr>
+          </a:p>
+          <a:p>
+            <a:pPr marL="343080" indent="-340920">
+              <a:lnSpc>
+                <a:spcPct val="100000"/>
+              </a:lnSpc>
+              <a:buClr>
+                <a:srgbClr val="a53010"/>
+              </a:buClr>
+              <a:buFont typeface="Wingdings 3" charset="2"/>
+              <a:buChar char=""/>
+            </a:pPr>
+            <a:r>
+              <a:rPr b="0" lang="en-US" sz="1800" spc="-1" strike="noStrike">
+                <a:solidFill>
+                  <a:srgbClr val="404040"/>
+                </a:solidFill>
+                <a:uFill>
+                  <a:solidFill>
+                    <a:srgbClr val="ffffff"/>
+                  </a:solidFill>
+                </a:uFill>
+                <a:latin typeface="Century Gothic"/>
+                <a:ea typeface="DejaVu Sans"/>
+              </a:rPr>
+              <a:t>//</a:t>
+            </a:r>
+            <a:r>
+              <a:rPr b="0" lang="en-US" sz="1800" spc="-1" strike="noStrike">
+                <a:solidFill>
+                  <a:srgbClr val="404040"/>
+                </a:solidFill>
+                <a:uFill>
+                  <a:solidFill>
+                    <a:srgbClr val="ffffff"/>
+                  </a:solidFill>
+                </a:uFill>
+                <a:latin typeface="Century Gothic"/>
+                <a:ea typeface="DejaVu Sans"/>
+              </a:rPr>
+              <a:t>索引支持排序</a:t>
+            </a:r>
+            <a:endParaRPr b="0" lang="en-US" sz="1800" spc="-1" strike="noStrike">
+              <a:solidFill>
+                <a:srgbClr val="000000"/>
+              </a:solidFill>
+              <a:uFill>
+                <a:solidFill>
+                  <a:srgbClr val="ffffff"/>
+                </a:solidFill>
+              </a:uFill>
+              <a:latin typeface="Arial"/>
+            </a:endParaRPr>
+          </a:p>
+          <a:p>
+            <a:pPr>
+              <a:lnSpc>
+                <a:spcPct val="100000"/>
+              </a:lnSpc>
+            </a:pPr>
+            <a:r>
+              <a:rPr b="0" lang="en-US" sz="1800" spc="-1" strike="noStrike">
+                <a:solidFill>
+                  <a:srgbClr val="404040"/>
+                </a:solidFill>
+                <a:uFill>
+                  <a:solidFill>
+                    <a:srgbClr val="ffffff"/>
+                  </a:solidFill>
+                </a:uFill>
+                <a:latin typeface="Century Gothic"/>
+                <a:ea typeface="DejaVu Sans"/>
+              </a:rPr>
+              <a:t>db.product.find().sort({price:1,stock:-1}).explain();</a:t>
+            </a:r>
+            <a:endParaRPr b="0" lang="en-US" sz="1800" spc="-1" strike="noStrike">
+              <a:solidFill>
+                <a:srgbClr val="000000"/>
+              </a:solidFill>
+              <a:uFill>
+                <a:solidFill>
+                  <a:srgbClr val="ffffff"/>
+                </a:solidFill>
+              </a:uFill>
+              <a:latin typeface="Arial"/>
+            </a:endParaRPr>
+          </a:p>
+          <a:p>
+            <a:pPr>
+              <a:lnSpc>
+                <a:spcPct val="100000"/>
+              </a:lnSpc>
+            </a:pPr>
+            <a:r>
+              <a:rPr b="0" lang="en-US" sz="1800" spc="-1" strike="noStrike">
+                <a:solidFill>
+                  <a:srgbClr val="404040"/>
+                </a:solidFill>
+                <a:uFill>
+                  <a:solidFill>
+                    <a:srgbClr val="ffffff"/>
+                  </a:solidFill>
+                </a:uFill>
+                <a:latin typeface="Century Gothic"/>
+                <a:ea typeface="DejaVu Sans"/>
+              </a:rPr>
+              <a:t>db.product.find().sort({price:-1,stock:1}).explain();</a:t>
+            </a:r>
+            <a:endParaRPr b="0" lang="en-US" sz="1800" spc="-1" strike="noStrike">
+              <a:solidFill>
+                <a:srgbClr val="000000"/>
+              </a:solidFill>
+              <a:uFill>
+                <a:solidFill>
+                  <a:srgbClr val="ffffff"/>
+                </a:solidFill>
+              </a:uFill>
+              <a:latin typeface="Arial"/>
+            </a:endParaRPr>
+          </a:p>
+          <a:p>
+            <a:pPr>
+              <a:lnSpc>
+                <a:spcPct val="100000"/>
+              </a:lnSpc>
+            </a:pPr>
+            <a:r>
+              <a:rPr b="0" lang="en-US" sz="1800" spc="-1" strike="noStrike">
+                <a:solidFill>
+                  <a:srgbClr val="404040"/>
+                </a:solidFill>
+                <a:uFill>
+                  <a:solidFill>
+                    <a:srgbClr val="ffffff"/>
+                  </a:solidFill>
+                </a:uFill>
+                <a:latin typeface="Century Gothic"/>
+                <a:ea typeface="DejaVu Sans"/>
+              </a:rPr>
+              <a:t>//</a:t>
+            </a:r>
+            <a:r>
+              <a:rPr b="0" lang="en-US" sz="1800" spc="-1" strike="noStrike">
+                <a:solidFill>
+                  <a:srgbClr val="404040"/>
+                </a:solidFill>
+                <a:uFill>
+                  <a:solidFill>
+                    <a:srgbClr val="ffffff"/>
+                  </a:solidFill>
+                </a:uFill>
+                <a:latin typeface="Century Gothic"/>
+                <a:ea typeface="DejaVu Sans"/>
+              </a:rPr>
+              <a:t>索引不支持排序</a:t>
+            </a:r>
+            <a:endParaRPr b="0" lang="en-US" sz="1800" spc="-1" strike="noStrike">
+              <a:solidFill>
+                <a:srgbClr val="000000"/>
+              </a:solidFill>
+              <a:uFill>
+                <a:solidFill>
+                  <a:srgbClr val="ffffff"/>
+                </a:solidFill>
+              </a:uFill>
+              <a:latin typeface="Arial"/>
+            </a:endParaRPr>
+          </a:p>
+          <a:p>
+            <a:pPr>
+              <a:lnSpc>
+                <a:spcPct val="100000"/>
+              </a:lnSpc>
+            </a:pPr>
+            <a:r>
+              <a:rPr b="0" lang="en-US" sz="1800" spc="-1" strike="noStrike">
+                <a:solidFill>
+                  <a:srgbClr val="404040"/>
+                </a:solidFill>
+                <a:uFill>
+                  <a:solidFill>
+                    <a:srgbClr val="ffffff"/>
+                  </a:solidFill>
+                </a:uFill>
+                <a:latin typeface="Century Gothic"/>
+                <a:ea typeface="DejaVu Sans"/>
+              </a:rPr>
+              <a:t>db.product.find().sort({price:1,stock:1}).explain();</a:t>
+            </a:r>
+            <a:endParaRPr b="0" lang="en-US" sz="1800" spc="-1" strike="noStrike">
+              <a:solidFill>
+                <a:srgbClr val="000000"/>
+              </a:solidFill>
+              <a:uFill>
+                <a:solidFill>
+                  <a:srgbClr val="ffffff"/>
+                </a:solidFill>
+              </a:uFill>
+              <a:latin typeface="Arial"/>
+            </a:endParaRPr>
+          </a:p>
+          <a:p>
+            <a:pPr marL="343080" indent="-340920">
+              <a:lnSpc>
+                <a:spcPct val="100000"/>
+              </a:lnSpc>
+              <a:buClr>
+                <a:srgbClr val="a53010"/>
+              </a:buClr>
+              <a:buFont typeface="Wingdings 3" charset="2"/>
+              <a:buChar char=""/>
+            </a:pPr>
+            <a:r>
+              <a:rPr b="0" lang="en-US" sz="1800" spc="-1" strike="noStrike">
+                <a:solidFill>
+                  <a:srgbClr val="404040"/>
+                </a:solidFill>
+                <a:uFill>
+                  <a:solidFill>
+                    <a:srgbClr val="ffffff"/>
+                  </a:solidFill>
+                </a:uFill>
+                <a:latin typeface="Century Gothic"/>
+                <a:ea typeface="DejaVu Sans"/>
+              </a:rPr>
+              <a:t>一个复合索引最多可以有</a:t>
+            </a:r>
+            <a:r>
+              <a:rPr b="0" lang="en-US" sz="1800" spc="-1" strike="noStrike">
+                <a:solidFill>
+                  <a:srgbClr val="404040"/>
+                </a:solidFill>
+                <a:uFill>
+                  <a:solidFill>
+                    <a:srgbClr val="ffffff"/>
+                  </a:solidFill>
+                </a:uFill>
+                <a:latin typeface="Century Gothic"/>
+                <a:ea typeface="DejaVu Sans"/>
+              </a:rPr>
+              <a:t>31</a:t>
+            </a:r>
+            <a:r>
+              <a:rPr b="0" lang="en-US" sz="1800" spc="-1" strike="noStrike">
+                <a:solidFill>
+                  <a:srgbClr val="404040"/>
+                </a:solidFill>
+                <a:uFill>
+                  <a:solidFill>
+                    <a:srgbClr val="ffffff"/>
+                  </a:solidFill>
+                </a:uFill>
+                <a:latin typeface="Century Gothic"/>
+                <a:ea typeface="DejaVu Sans"/>
+              </a:rPr>
+              <a:t>个字段。</a:t>
+            </a:r>
+            <a:endParaRPr b="0" lang="en-US" sz="1800" spc="-1" strike="noStrike">
+              <a:solidFill>
+                <a:srgbClr val="000000"/>
+              </a:solidFill>
+              <a:uFill>
+                <a:solidFill>
+                  <a:srgbClr val="ffffff"/>
+                </a:solidFill>
+              </a:uFill>
+              <a:latin typeface="Arial"/>
+            </a:endParaRPr>
+          </a:p>
+          <a:p>
+            <a:pPr>
+              <a:lnSpc>
+                <a:spcPct val="100000"/>
+              </a:lnSpc>
+            </a:pPr>
             <a:endParaRPr b="0" lang="en-US" sz="1800" spc="-1" strike="noStrike">
               <a:solidFill>
                 <a:srgbClr val="000000"/>
@@ -13893,7 +14296,7 @@
         <p:spPr>
           <a:xfrm>
             <a:off x="2593080" y="624240"/>
-            <a:ext cx="8911080" cy="1280160"/>
+            <a:ext cx="8909640" cy="1278720"/>
           </a:xfrm>
           <a:prstGeom prst="rect">
             <a:avLst/>
@@ -13928,6 +14331,7 @@
                   </a:solidFill>
                 </a:uFill>
                 <a:latin typeface="Century Gothic"/>
+                <a:ea typeface="DejaVu Sans"/>
               </a:rPr>
               <a:t>多键索引</a:t>
             </a:r>
@@ -13954,7 +14358,7 @@
         <p:spPr>
           <a:xfrm>
             <a:off x="2589120" y="2133720"/>
-            <a:ext cx="8914680" cy="3776760"/>
+            <a:ext cx="8913240" cy="3775320"/>
           </a:xfrm>
           <a:prstGeom prst="rect">
             <a:avLst/>
@@ -13973,7 +14377,7 @@
         <p:txBody>
           <a:bodyPr lIns="90000" rIns="90000" tIns="45000" bIns="45000"/>
           <a:p>
-            <a:pPr marL="343080" indent="-342360">
+            <a:pPr marL="343080" indent="-340920">
               <a:lnSpc>
                 <a:spcPct val="100000"/>
               </a:lnSpc>
@@ -13994,6 +14398,7 @@
                   </a:solidFill>
                 </a:uFill>
                 <a:latin typeface="Century Gothic"/>
+                <a:ea typeface="DejaVu Sans"/>
               </a:rPr>
               <a:t>MongoDB</a:t>
             </a:r>
@@ -14008,6 +14413,7 @@
                   </a:solidFill>
                 </a:uFill>
                 <a:latin typeface="Century Gothic"/>
+                <a:ea typeface="DejaVu Sans"/>
               </a:rPr>
               <a:t>支持基于一个数组创建索引，</a:t>
             </a:r>
@@ -14022,6 +14428,7 @@
                   </a:solidFill>
                 </a:uFill>
                 <a:latin typeface="Century Gothic"/>
+                <a:ea typeface="DejaVu Sans"/>
               </a:rPr>
               <a:t>MongoDB</a:t>
             </a:r>
@@ -14036,6 +14443,7 @@
                   </a:solidFill>
                 </a:uFill>
                 <a:latin typeface="Century Gothic"/>
+                <a:ea typeface="DejaVu Sans"/>
               </a:rPr>
               <a:t>会自动创建为多键索引，无需刻意指定。</a:t>
             </a:r>
@@ -14052,7 +14460,7 @@
             </a:endParaRPr>
           </a:p>
           <a:p>
-            <a:pPr marL="343080" indent="-342360">
+            <a:pPr marL="343080" indent="-340920">
               <a:lnSpc>
                 <a:spcPct val="100000"/>
               </a:lnSpc>
@@ -14073,6 +14481,7 @@
                   </a:solidFill>
                 </a:uFill>
                 <a:latin typeface="Century Gothic"/>
+                <a:ea typeface="DejaVu Sans"/>
               </a:rPr>
               <a:t>多键索引也可以基于内嵌文档来创建。</a:t>
             </a:r>
@@ -14089,7 +14498,7 @@
             </a:endParaRPr>
           </a:p>
           <a:p>
-            <a:pPr marL="343080" indent="-342360">
+            <a:pPr marL="343080" indent="-340920">
               <a:lnSpc>
                 <a:spcPct val="100000"/>
               </a:lnSpc>
@@ -14110,6 +14519,7 @@
                   </a:solidFill>
                 </a:uFill>
                 <a:latin typeface="Century Gothic"/>
+                <a:ea typeface="DejaVu Sans"/>
               </a:rPr>
               <a:t>如果是复合多键索引，则索引中只有一个字段可以是数组。</a:t>
             </a:r>
@@ -14126,7 +14536,7 @@
             </a:endParaRPr>
           </a:p>
           <a:p>
-            <a:pPr marL="343080" indent="-342360">
+            <a:pPr marL="343080" indent="-340920">
               <a:lnSpc>
                 <a:spcPct val="100000"/>
               </a:lnSpc>
@@ -14147,6 +14557,7 @@
                   </a:solidFill>
                 </a:uFill>
                 <a:latin typeface="Century Gothic"/>
+                <a:ea typeface="DejaVu Sans"/>
               </a:rPr>
               <a:t> </a:t>
             </a:r>
@@ -14161,6 +14572,7 @@
                   </a:solidFill>
                 </a:uFill>
                 <a:latin typeface="Century Gothic"/>
+                <a:ea typeface="DejaVu Sans"/>
               </a:rPr>
               <a:t>执行计划中 </a:t>
             </a:r>
@@ -14175,6 +14587,7 @@
                   </a:solidFill>
                 </a:uFill>
                 <a:latin typeface="Century Gothic"/>
+                <a:ea typeface="DejaVu Sans"/>
               </a:rPr>
               <a:t>isMultiKey : true </a:t>
             </a:r>
@@ -14189,6 +14602,7 @@
                   </a:solidFill>
                 </a:uFill>
                 <a:latin typeface="Century Gothic"/>
+                <a:ea typeface="DejaVu Sans"/>
               </a:rPr>
               <a:t>代表命中多键索引。</a:t>
             </a:r>
@@ -14282,7 +14696,7 @@
         <p:spPr>
           <a:xfrm>
             <a:off x="2593080" y="624240"/>
-            <a:ext cx="8911080" cy="1280160"/>
+            <a:ext cx="8909640" cy="1278720"/>
           </a:xfrm>
           <a:prstGeom prst="rect">
             <a:avLst/>
@@ -14317,6 +14731,7 @@
                   </a:solidFill>
                 </a:uFill>
                 <a:latin typeface="Century Gothic"/>
+                <a:ea typeface="DejaVu Sans"/>
               </a:rPr>
               <a:t>其他索引</a:t>
             </a:r>
@@ -14343,7 +14758,7 @@
         <p:spPr>
           <a:xfrm>
             <a:off x="2589120" y="2133720"/>
-            <a:ext cx="8914680" cy="3776760"/>
+            <a:ext cx="8913240" cy="3775320"/>
           </a:xfrm>
           <a:prstGeom prst="rect">
             <a:avLst/>
@@ -14362,7 +14777,7 @@
         <p:txBody>
           <a:bodyPr lIns="90000" rIns="90000" tIns="45000" bIns="45000"/>
           <a:p>
-            <a:pPr marL="343080" indent="-342360">
+            <a:pPr marL="343080" indent="-340920">
               <a:lnSpc>
                 <a:spcPct val="100000"/>
               </a:lnSpc>
@@ -14383,6 +14798,7 @@
                   </a:solidFill>
                 </a:uFill>
                 <a:latin typeface="Century Gothic"/>
+                <a:ea typeface="DejaVu Sans"/>
               </a:rPr>
               <a:t>哈希索引（</a:t>
             </a:r>
@@ -14397,6 +14813,7 @@
                   </a:solidFill>
                 </a:uFill>
                 <a:latin typeface="Century Gothic"/>
+                <a:ea typeface="DejaVu Sans"/>
               </a:rPr>
               <a:t>Hashed Index</a:t>
             </a:r>
@@ -14411,6 +14828,7 @@
                   </a:solidFill>
                 </a:uFill>
                 <a:latin typeface="Century Gothic"/>
+                <a:ea typeface="DejaVu Sans"/>
               </a:rPr>
               <a:t>）</a:t>
             </a:r>
@@ -14443,6 +14861,7 @@
                   </a:solidFill>
                 </a:uFill>
                 <a:latin typeface="Century Gothic"/>
+                <a:ea typeface="DejaVu Sans"/>
               </a:rPr>
               <a:t>	</a:t>
             </a:r>
@@ -14457,6 +14876,7 @@
                   </a:solidFill>
                 </a:uFill>
                 <a:latin typeface="Century Gothic"/>
+                <a:ea typeface="DejaVu Sans"/>
               </a:rPr>
               <a:t>照某个字段的散列值来建立索引，目前主要用于 </a:t>
             </a:r>
@@ -14471,6 +14891,7 @@
                   </a:solidFill>
                 </a:uFill>
                 <a:latin typeface="Century Gothic"/>
+                <a:ea typeface="DejaVu Sans"/>
               </a:rPr>
               <a:t>MongoDB</a:t>
             </a:r>
@@ -14485,6 +14906,7 @@
                   </a:solidFill>
                 </a:uFill>
                 <a:latin typeface="Century Gothic"/>
+                <a:ea typeface="DejaVu Sans"/>
               </a:rPr>
               <a:t>分片的散列分片，散列索引只能用于字段完全匹配的查询，不能用于范围查询等。</a:t>
             </a:r>
@@ -14501,7 +14923,7 @@
             </a:endParaRPr>
           </a:p>
           <a:p>
-            <a:pPr marL="343080" indent="-342360">
+            <a:pPr marL="343080" indent="-340920">
               <a:lnSpc>
                 <a:spcPct val="100000"/>
               </a:lnSpc>
@@ -14522,6 +14944,7 @@
                   </a:solidFill>
                 </a:uFill>
                 <a:latin typeface="Century Gothic"/>
+                <a:ea typeface="DejaVu Sans"/>
               </a:rPr>
               <a:t>地理位置索引（</a:t>
             </a:r>
@@ -14536,6 +14959,7 @@
                   </a:solidFill>
                 </a:uFill>
                 <a:latin typeface="Century Gothic"/>
+                <a:ea typeface="DejaVu Sans"/>
               </a:rPr>
               <a:t>Geospatial Index</a:t>
             </a:r>
@@ -14550,6 +14974,7 @@
                   </a:solidFill>
                 </a:uFill>
                 <a:latin typeface="Century Gothic"/>
+                <a:ea typeface="DejaVu Sans"/>
               </a:rPr>
               <a:t>）</a:t>
             </a:r>
@@ -14582,6 +15007,7 @@
                   </a:solidFill>
                 </a:uFill>
                 <a:latin typeface="Century Gothic"/>
+                <a:ea typeface="DejaVu Sans"/>
               </a:rPr>
               <a:t>	</a:t>
             </a:r>
@@ -14596,6 +15022,7 @@
                   </a:solidFill>
                 </a:uFill>
                 <a:latin typeface="Century Gothic"/>
+                <a:ea typeface="DejaVu Sans"/>
               </a:rPr>
               <a:t>按照坐标轴、经度、纬度的方式把位置数据存储为 </a:t>
             </a:r>
@@ -14610,6 +15037,7 @@
                   </a:solidFill>
                 </a:uFill>
                 <a:latin typeface="Century Gothic"/>
+                <a:ea typeface="DejaVu Sans"/>
               </a:rPr>
               <a:t>GeoJSON </a:t>
             </a:r>
@@ -14624,6 +15052,7 @@
                   </a:solidFill>
                 </a:uFill>
                 <a:latin typeface="Century Gothic"/>
+                <a:ea typeface="DejaVu Sans"/>
               </a:rPr>
               <a:t>对象。能解决一些场景，比如『查找附近的停车场』、『查找附近的加油站』等。</a:t>
             </a:r>
@@ -14640,7 +15069,7 @@
             </a:endParaRPr>
           </a:p>
           <a:p>
-            <a:pPr marL="343080" indent="-342360">
+            <a:pPr marL="343080" indent="-340920">
               <a:lnSpc>
                 <a:spcPct val="100000"/>
               </a:lnSpc>
@@ -14661,6 +15090,7 @@
                   </a:solidFill>
                 </a:uFill>
                 <a:latin typeface="Century Gothic"/>
+                <a:ea typeface="DejaVu Sans"/>
               </a:rPr>
               <a:t>文本索引（</a:t>
             </a:r>
@@ -14675,6 +15105,7 @@
                   </a:solidFill>
                 </a:uFill>
                 <a:latin typeface="Century Gothic"/>
+                <a:ea typeface="DejaVu Sans"/>
               </a:rPr>
               <a:t>Text Index</a:t>
             </a:r>
@@ -14689,6 +15120,7 @@
                   </a:solidFill>
                 </a:uFill>
                 <a:latin typeface="Century Gothic"/>
+                <a:ea typeface="DejaVu Sans"/>
               </a:rPr>
               <a:t>）</a:t>
             </a:r>
@@ -14721,6 +15153,7 @@
                   </a:solidFill>
                 </a:uFill>
                 <a:latin typeface="Century Gothic"/>
+                <a:ea typeface="DejaVu Sans"/>
               </a:rPr>
               <a:t>     </a:t>
             </a:r>
@@ -14735,6 +15168,7 @@
                   </a:solidFill>
                 </a:uFill>
                 <a:latin typeface="Century Gothic"/>
+                <a:ea typeface="DejaVu Sans"/>
               </a:rPr>
               <a:t>能解决快速文本查找的需求，比如，日志平台，相对日志关键词查找。但是</a:t>
             </a:r>
@@ -14749,6 +15183,7 @@
                   </a:solidFill>
                 </a:uFill>
                 <a:latin typeface="Century Gothic"/>
+                <a:ea typeface="DejaVu Sans"/>
               </a:rPr>
               <a:t>MongoDB</a:t>
             </a:r>
@@ -14763,6 +15198,7 @@
                   </a:solidFill>
                 </a:uFill>
                 <a:latin typeface="Century Gothic"/>
+                <a:ea typeface="DejaVu Sans"/>
               </a:rPr>
               <a:t>官方不支持中文分词。</a:t>
             </a:r>
@@ -14856,7 +15292,7 @@
         <p:spPr>
           <a:xfrm>
             <a:off x="2593080" y="624240"/>
-            <a:ext cx="8911080" cy="1280160"/>
+            <a:ext cx="8909640" cy="1278720"/>
           </a:xfrm>
           <a:prstGeom prst="rect">
             <a:avLst/>
@@ -14891,6 +15327,7 @@
                   </a:solidFill>
                 </a:uFill>
                 <a:latin typeface="Century Gothic"/>
+                <a:ea typeface="DejaVu Sans"/>
               </a:rPr>
               <a:t>过期索引</a:t>
             </a:r>
@@ -14917,7 +15354,7 @@
         <p:spPr>
           <a:xfrm>
             <a:off x="2589120" y="2133720"/>
-            <a:ext cx="8914680" cy="3776760"/>
+            <a:ext cx="8913240" cy="3775320"/>
           </a:xfrm>
           <a:prstGeom prst="rect">
             <a:avLst/>
@@ -14936,7 +15373,7 @@
         <p:txBody>
           <a:bodyPr lIns="90000" rIns="90000" tIns="45000" bIns="45000"/>
           <a:p>
-            <a:pPr marL="343080" indent="-342360">
+            <a:pPr marL="343080" indent="-340920">
               <a:lnSpc>
                 <a:spcPct val="100000"/>
               </a:lnSpc>
@@ -14957,6 +15394,7 @@
                   </a:solidFill>
                 </a:uFill>
                 <a:latin typeface="Century Gothic"/>
+                <a:ea typeface="DejaVu Sans"/>
               </a:rPr>
               <a:t>可以在</a:t>
             </a:r>
@@ -14971,6 +15409,7 @@
                   </a:solidFill>
                 </a:uFill>
                 <a:latin typeface="Century Gothic"/>
+                <a:ea typeface="DejaVu Sans"/>
               </a:rPr>
               <a:t>date</a:t>
             </a:r>
@@ -14985,6 +15424,7 @@
                   </a:solidFill>
                 </a:uFill>
                 <a:latin typeface="Century Gothic"/>
+                <a:ea typeface="DejaVu Sans"/>
               </a:rPr>
               <a:t>类型的字段上创建一个单字段索引（不支持复合索引），记录会在指定的时间段后或在指定的时间点过期。</a:t>
             </a:r>
@@ -15001,7 +15441,7 @@
             </a:endParaRPr>
           </a:p>
           <a:p>
-            <a:pPr marL="343080" indent="-342360">
+            <a:pPr marL="343080" indent="-340920">
               <a:lnSpc>
                 <a:spcPct val="100000"/>
               </a:lnSpc>
@@ -15022,6 +15462,7 @@
                   </a:solidFill>
                 </a:uFill>
                 <a:latin typeface="Century Gothic"/>
+                <a:ea typeface="DejaVu Sans"/>
               </a:rPr>
               <a:t>db.product.createIndex(</a:t>
             </a:r>
@@ -15038,7 +15479,7 @@
             </a:endParaRPr>
           </a:p>
           <a:p>
-            <a:pPr marL="343080" indent="-342360">
+            <a:pPr marL="343080" indent="-340920">
               <a:lnSpc>
                 <a:spcPct val="100000"/>
               </a:lnSpc>
@@ -15059,6 +15500,7 @@
                   </a:solidFill>
                 </a:uFill>
                 <a:latin typeface="Century Gothic"/>
+                <a:ea typeface="DejaVu Sans"/>
               </a:rPr>
               <a:t>   </a:t>
             </a:r>
@@ -15073,6 +15515,7 @@
                   </a:solidFill>
                 </a:uFill>
                 <a:latin typeface="Century Gothic"/>
+                <a:ea typeface="DejaVu Sans"/>
               </a:rPr>
               <a:t>{createDate: 1},{expireAfterSeconds: 10},{background:true}</a:t>
             </a:r>
@@ -15089,7 +15532,7 @@
             </a:endParaRPr>
           </a:p>
           <a:p>
-            <a:pPr marL="343080" indent="-342360">
+            <a:pPr marL="343080" indent="-340920">
               <a:lnSpc>
                 <a:spcPct val="100000"/>
               </a:lnSpc>
@@ -15110,6 +15553,7 @@
                   </a:solidFill>
                 </a:uFill>
                 <a:latin typeface="Century Gothic"/>
+                <a:ea typeface="DejaVu Sans"/>
               </a:rPr>
               <a:t>);expireAfterSeconds</a:t>
             </a:r>
@@ -15124,6 +15568,7 @@
                   </a:solidFill>
                 </a:uFill>
                 <a:latin typeface="Century Gothic"/>
+                <a:ea typeface="DejaVu Sans"/>
               </a:rPr>
               <a:t>代表</a:t>
             </a:r>
@@ -15138,6 +15583,7 @@
                   </a:solidFill>
                 </a:uFill>
                 <a:latin typeface="Century Gothic"/>
+                <a:ea typeface="DejaVu Sans"/>
               </a:rPr>
               <a:t>10</a:t>
             </a:r>
@@ -15152,6 +15598,7 @@
                   </a:solidFill>
                 </a:uFill>
                 <a:latin typeface="Century Gothic"/>
+                <a:ea typeface="DejaVu Sans"/>
               </a:rPr>
               <a:t>秒后过期。</a:t>
             </a:r>
@@ -15168,7 +15615,7 @@
             </a:endParaRPr>
           </a:p>
           <a:p>
-            <a:pPr marL="343080" indent="-342360">
+            <a:pPr marL="343080" indent="-340920">
               <a:lnSpc>
                 <a:spcPct val="100000"/>
               </a:lnSpc>
@@ -15189,6 +15636,7 @@
                   </a:solidFill>
                 </a:uFill>
                 <a:latin typeface="Century Gothic"/>
+                <a:ea typeface="DejaVu Sans"/>
               </a:rPr>
               <a:t>db.product.createIndex({"expireDate": 1},{expireAfterSeconds: 0})</a:t>
             </a:r>
@@ -15221,6 +15669,7 @@
                   </a:solidFill>
                 </a:uFill>
                 <a:latin typeface="Century Gothic"/>
+                <a:ea typeface="DejaVu Sans"/>
               </a:rPr>
               <a:t>      </a:t>
             </a:r>
@@ -15235,6 +15684,7 @@
                   </a:solidFill>
                 </a:uFill>
                 <a:latin typeface="Century Gothic"/>
+                <a:ea typeface="DejaVu Sans"/>
               </a:rPr>
               <a:t>expireAfterSeconds</a:t>
             </a:r>
@@ -15249,6 +15699,7 @@
                   </a:solidFill>
                 </a:uFill>
                 <a:latin typeface="Century Gothic"/>
+                <a:ea typeface="DejaVu Sans"/>
               </a:rPr>
               <a:t>为</a:t>
             </a:r>
@@ -15263,6 +15714,7 @@
                   </a:solidFill>
                 </a:uFill>
                 <a:latin typeface="Century Gothic"/>
+                <a:ea typeface="DejaVu Sans"/>
               </a:rPr>
               <a:t>0</a:t>
             </a:r>
@@ -15277,6 +15729,7 @@
                   </a:solidFill>
                 </a:uFill>
                 <a:latin typeface="Century Gothic"/>
+                <a:ea typeface="DejaVu Sans"/>
               </a:rPr>
               <a:t>代表索引字段日期为过期时间。</a:t>
             </a:r>
@@ -15293,7 +15746,7 @@
             </a:endParaRPr>
           </a:p>
           <a:p>
-            <a:pPr marL="343080" indent="-342360">
+            <a:pPr marL="343080" indent="-340920">
               <a:lnSpc>
                 <a:spcPct val="100000"/>
               </a:lnSpc>
@@ -15314,6 +15767,7 @@
                   </a:solidFill>
                 </a:uFill>
                 <a:latin typeface="Century Gothic"/>
+                <a:ea typeface="DejaVu Sans"/>
               </a:rPr>
               <a:t>扫描 </a:t>
             </a:r>
@@ -15328,6 +15782,7 @@
                   </a:solidFill>
                 </a:uFill>
                 <a:latin typeface="Century Gothic"/>
+                <a:ea typeface="DejaVu Sans"/>
               </a:rPr>
               <a:t>Document </a:t>
             </a:r>
@@ -15342,6 +15797,7 @@
                   </a:solidFill>
                 </a:uFill>
                 <a:latin typeface="Century Gothic"/>
+                <a:ea typeface="DejaVu Sans"/>
               </a:rPr>
               <a:t>过期数据并删除是独立线程执行，默认 </a:t>
             </a:r>
@@ -15356,6 +15812,7 @@
                   </a:solidFill>
                 </a:uFill>
                 <a:latin typeface="Century Gothic"/>
+                <a:ea typeface="DejaVu Sans"/>
               </a:rPr>
               <a:t>60s </a:t>
             </a:r>
@@ -15370,6 +15827,7 @@
                   </a:solidFill>
                 </a:uFill>
                 <a:latin typeface="Century Gothic"/>
+                <a:ea typeface="DejaVu Sans"/>
               </a:rPr>
               <a:t>扫描一次。</a:t>
             </a:r>
@@ -15386,7 +15844,7 @@
             </a:endParaRPr>
           </a:p>
           <a:p>
-            <a:pPr marL="343080" indent="-342360">
+            <a:pPr marL="343080" indent="-340920">
               <a:lnSpc>
                 <a:spcPct val="100000"/>
               </a:lnSpc>
@@ -15407,6 +15865,7 @@
                   </a:solidFill>
                 </a:uFill>
                 <a:latin typeface="Century Gothic"/>
+                <a:ea typeface="DejaVu Sans"/>
               </a:rPr>
               <a:t>适合场景：保存最近一段时间的热门数据。</a:t>
             </a:r>

</xml_diff>

<commit_message>
文档 by qiyu 2022-06-02
</commit_message>
<xml_diff>
--- a/doc/MongoDB索引.pptx
+++ b/doc/MongoDB索引.pptx
@@ -3002,7 +3002,7 @@
         <p:spPr>
           <a:xfrm>
             <a:off x="0" y="2575080"/>
-            <a:ext cx="98640" cy="623880"/>
+            <a:ext cx="98280" cy="623520"/>
           </a:xfrm>
           <a:custGeom>
             <a:avLst/>
@@ -3068,7 +3068,7 @@
         <p:spPr>
           <a:xfrm>
             <a:off x="128520" y="3156480"/>
-            <a:ext cx="644400" cy="2320200"/>
+            <a:ext cx="644040" cy="2319840"/>
           </a:xfrm>
           <a:custGeom>
             <a:avLst/>
@@ -3139,7 +3139,7 @@
         <p:spPr>
           <a:xfrm>
             <a:off x="807120" y="5447160"/>
-            <a:ext cx="607320" cy="1418040"/>
+            <a:ext cx="606960" cy="1417680"/>
           </a:xfrm>
           <a:custGeom>
             <a:avLst/>
@@ -3215,7 +3215,7 @@
         <p:spPr>
           <a:xfrm>
             <a:off x="959760" y="6503760"/>
-            <a:ext cx="169200" cy="361440"/>
+            <a:ext cx="168840" cy="361080"/>
           </a:xfrm>
           <a:custGeom>
             <a:avLst/>
@@ -3271,7 +3271,7 @@
         <p:spPr>
           <a:xfrm>
             <a:off x="100800" y="3201120"/>
-            <a:ext cx="819720" cy="3326400"/>
+            <a:ext cx="819360" cy="3326040"/>
           </a:xfrm>
           <a:custGeom>
             <a:avLst/>
@@ -3362,7 +3362,7 @@
         <p:spPr>
           <a:xfrm>
             <a:off x="22320" y="228600"/>
-            <a:ext cx="104040" cy="2925720"/>
+            <a:ext cx="103680" cy="2925360"/>
           </a:xfrm>
           <a:custGeom>
             <a:avLst/>
@@ -3448,7 +3448,7 @@
         <p:spPr>
           <a:xfrm>
             <a:off x="78120" y="2944080"/>
-            <a:ext cx="75960" cy="491760"/>
+            <a:ext cx="75600" cy="491400"/>
           </a:xfrm>
           <a:custGeom>
             <a:avLst/>
@@ -3514,7 +3514,7 @@
         <p:spPr>
           <a:xfrm>
             <a:off x="769680" y="5478840"/>
-            <a:ext cx="187920" cy="1022760"/>
+            <a:ext cx="187560" cy="1022400"/>
           </a:xfrm>
           <a:custGeom>
             <a:avLst/>
@@ -3600,7 +3600,7 @@
         <p:spPr>
           <a:xfrm>
             <a:off x="775440" y="1398960"/>
-            <a:ext cx="2073960" cy="4046040"/>
+            <a:ext cx="2073600" cy="4045680"/>
           </a:xfrm>
           <a:custGeom>
             <a:avLst/>
@@ -3721,7 +3721,7 @@
         <p:spPr>
           <a:xfrm>
             <a:off x="922680" y="6530040"/>
-            <a:ext cx="159840" cy="335160"/>
+            <a:ext cx="159480" cy="334800"/>
           </a:xfrm>
           <a:custGeom>
             <a:avLst/>
@@ -3777,7 +3777,7 @@
         <p:spPr>
           <a:xfrm>
             <a:off x="769680" y="5359320"/>
-            <a:ext cx="35280" cy="219600"/>
+            <a:ext cx="34920" cy="219240"/>
           </a:xfrm>
           <a:custGeom>
             <a:avLst/>
@@ -3843,7 +3843,7 @@
         <p:spPr>
           <a:xfrm>
             <a:off x="849960" y="6244560"/>
-            <a:ext cx="236520" cy="620280"/>
+            <a:ext cx="236160" cy="619920"/>
           </a:xfrm>
           <a:custGeom>
             <a:avLst/>
@@ -3919,7 +3919,7 @@
         <p:spPr>
           <a:xfrm>
             <a:off x="27360" y="-720"/>
-            <a:ext cx="492120" cy="4398840"/>
+            <a:ext cx="491760" cy="4398480"/>
           </a:xfrm>
           <a:custGeom>
             <a:avLst/>
@@ -4028,7 +4028,7 @@
         <p:spPr>
           <a:xfrm>
             <a:off x="550440" y="4316400"/>
-            <a:ext cx="421200" cy="1578600"/>
+            <a:ext cx="420840" cy="1578240"/>
           </a:xfrm>
           <a:custGeom>
             <a:avLst/>
@@ -4102,7 +4102,7 @@
         <p:spPr>
           <a:xfrm>
             <a:off x="1006200" y="5862600"/>
-            <a:ext cx="428760" cy="988560"/>
+            <a:ext cx="428400" cy="988200"/>
           </a:xfrm>
           <a:custGeom>
             <a:avLst/>
@@ -4176,7 +4176,7 @@
         <p:spPr>
           <a:xfrm>
             <a:off x="521640" y="4364280"/>
-            <a:ext cx="549720" cy="2233800"/>
+            <a:ext cx="549360" cy="2233440"/>
           </a:xfrm>
           <a:custGeom>
             <a:avLst/>
@@ -4265,7 +4265,7 @@
         <p:spPr>
           <a:xfrm>
             <a:off x="468000" y="1289160"/>
-            <a:ext cx="172080" cy="3025080"/>
+            <a:ext cx="171720" cy="3024720"/>
           </a:xfrm>
           <a:custGeom>
             <a:avLst/>
@@ -4364,7 +4364,7 @@
         <p:spPr>
           <a:xfrm>
             <a:off x="1111680" y="6571440"/>
-            <a:ext cx="132120" cy="279360"/>
+            <a:ext cx="131760" cy="279000"/>
           </a:xfrm>
           <a:custGeom>
             <a:avLst/>
@@ -4418,7 +4418,7 @@
         <p:spPr>
           <a:xfrm>
             <a:off x="502560" y="4107600"/>
-            <a:ext cx="80280" cy="509400"/>
+            <a:ext cx="79920" cy="509040"/>
           </a:xfrm>
           <a:custGeom>
             <a:avLst/>
@@ -4487,7 +4487,7 @@
         <p:spPr>
           <a:xfrm>
             <a:off x="973800" y="3145680"/>
-            <a:ext cx="1407960" cy="2714760"/>
+            <a:ext cx="1407600" cy="2714400"/>
           </a:xfrm>
           <a:custGeom>
             <a:avLst/>
@@ -4601,7 +4601,7 @@
         <p:spPr>
           <a:xfrm>
             <a:off x="1073520" y="6600240"/>
-            <a:ext cx="118440" cy="250920"/>
+            <a:ext cx="118080" cy="250560"/>
           </a:xfrm>
           <a:custGeom>
             <a:avLst/>
@@ -4655,7 +4655,7 @@
         <p:spPr>
           <a:xfrm>
             <a:off x="973800" y="5897160"/>
-            <a:ext cx="135720" cy="672120"/>
+            <a:ext cx="135360" cy="671760"/>
           </a:xfrm>
           <a:custGeom>
             <a:avLst/>
@@ -4729,7 +4729,7 @@
         <p:spPr>
           <a:xfrm>
             <a:off x="973800" y="5772600"/>
-            <a:ext cx="36000" cy="225720"/>
+            <a:ext cx="35640" cy="225360"/>
           </a:xfrm>
           <a:custGeom>
             <a:avLst/>
@@ -4798,7 +4798,7 @@
         <p:spPr>
           <a:xfrm>
             <a:off x="1006200" y="6322680"/>
-            <a:ext cx="208440" cy="528480"/>
+            <a:ext cx="208080" cy="528120"/>
           </a:xfrm>
           <a:custGeom>
             <a:avLst/>
@@ -4872,7 +4872,7 @@
         <p:spPr>
           <a:xfrm>
             <a:off x="0" y="0"/>
-            <a:ext cx="180720" cy="6855840"/>
+            <a:ext cx="180360" cy="6855480"/>
           </a:xfrm>
           <a:prstGeom prst="rect">
             <a:avLst/>
@@ -4913,7 +4913,7 @@
         <p:spPr>
           <a:xfrm>
             <a:off x="0" y="4323960"/>
-            <a:ext cx="1742400" cy="776520"/>
+            <a:ext cx="1742040" cy="776160"/>
           </a:xfrm>
           <a:custGeom>
             <a:avLst/>
@@ -5356,7 +5356,7 @@
         <p:spPr>
           <a:xfrm>
             <a:off x="0" y="2575080"/>
-            <a:ext cx="98640" cy="623880"/>
+            <a:ext cx="98280" cy="623520"/>
           </a:xfrm>
           <a:custGeom>
             <a:avLst/>
@@ -5422,7 +5422,7 @@
         <p:spPr>
           <a:xfrm>
             <a:off x="128520" y="3156480"/>
-            <a:ext cx="644400" cy="2320200"/>
+            <a:ext cx="644040" cy="2319840"/>
           </a:xfrm>
           <a:custGeom>
             <a:avLst/>
@@ -5493,7 +5493,7 @@
         <p:spPr>
           <a:xfrm>
             <a:off x="807120" y="5447160"/>
-            <a:ext cx="607320" cy="1418040"/>
+            <a:ext cx="606960" cy="1417680"/>
           </a:xfrm>
           <a:custGeom>
             <a:avLst/>
@@ -5569,7 +5569,7 @@
         <p:spPr>
           <a:xfrm>
             <a:off x="959760" y="6503760"/>
-            <a:ext cx="169200" cy="361440"/>
+            <a:ext cx="168840" cy="361080"/>
           </a:xfrm>
           <a:custGeom>
             <a:avLst/>
@@ -5625,7 +5625,7 @@
         <p:spPr>
           <a:xfrm>
             <a:off x="100800" y="3201120"/>
-            <a:ext cx="819720" cy="3326400"/>
+            <a:ext cx="819360" cy="3326040"/>
           </a:xfrm>
           <a:custGeom>
             <a:avLst/>
@@ -5716,7 +5716,7 @@
         <p:spPr>
           <a:xfrm>
             <a:off x="22320" y="228600"/>
-            <a:ext cx="104040" cy="2925720"/>
+            <a:ext cx="103680" cy="2925360"/>
           </a:xfrm>
           <a:custGeom>
             <a:avLst/>
@@ -5802,7 +5802,7 @@
         <p:spPr>
           <a:xfrm>
             <a:off x="78120" y="2944080"/>
-            <a:ext cx="75960" cy="491760"/>
+            <a:ext cx="75600" cy="491400"/>
           </a:xfrm>
           <a:custGeom>
             <a:avLst/>
@@ -5868,7 +5868,7 @@
         <p:spPr>
           <a:xfrm>
             <a:off x="769680" y="5478840"/>
-            <a:ext cx="187920" cy="1022760"/>
+            <a:ext cx="187560" cy="1022400"/>
           </a:xfrm>
           <a:custGeom>
             <a:avLst/>
@@ -5954,7 +5954,7 @@
         <p:spPr>
           <a:xfrm>
             <a:off x="775440" y="1398960"/>
-            <a:ext cx="2073960" cy="4046040"/>
+            <a:ext cx="2073600" cy="4045680"/>
           </a:xfrm>
           <a:custGeom>
             <a:avLst/>
@@ -6075,7 +6075,7 @@
         <p:spPr>
           <a:xfrm>
             <a:off x="922680" y="6530040"/>
-            <a:ext cx="159840" cy="335160"/>
+            <a:ext cx="159480" cy="334800"/>
           </a:xfrm>
           <a:custGeom>
             <a:avLst/>
@@ -6131,7 +6131,7 @@
         <p:spPr>
           <a:xfrm>
             <a:off x="769680" y="5359320"/>
-            <a:ext cx="35280" cy="219600"/>
+            <a:ext cx="34920" cy="219240"/>
           </a:xfrm>
           <a:custGeom>
             <a:avLst/>
@@ -6197,7 +6197,7 @@
         <p:spPr>
           <a:xfrm>
             <a:off x="849960" y="6244560"/>
-            <a:ext cx="236520" cy="620280"/>
+            <a:ext cx="236160" cy="619920"/>
           </a:xfrm>
           <a:custGeom>
             <a:avLst/>
@@ -6273,7 +6273,7 @@
         <p:spPr>
           <a:xfrm>
             <a:off x="27360" y="-720"/>
-            <a:ext cx="492120" cy="4398840"/>
+            <a:ext cx="491760" cy="4398480"/>
           </a:xfrm>
           <a:custGeom>
             <a:avLst/>
@@ -6382,7 +6382,7 @@
         <p:spPr>
           <a:xfrm>
             <a:off x="550440" y="4316400"/>
-            <a:ext cx="421200" cy="1578600"/>
+            <a:ext cx="420840" cy="1578240"/>
           </a:xfrm>
           <a:custGeom>
             <a:avLst/>
@@ -6456,7 +6456,7 @@
         <p:spPr>
           <a:xfrm>
             <a:off x="1006200" y="5862600"/>
-            <a:ext cx="428760" cy="988560"/>
+            <a:ext cx="428400" cy="988200"/>
           </a:xfrm>
           <a:custGeom>
             <a:avLst/>
@@ -6530,7 +6530,7 @@
         <p:spPr>
           <a:xfrm>
             <a:off x="521640" y="4364280"/>
-            <a:ext cx="549720" cy="2233800"/>
+            <a:ext cx="549360" cy="2233440"/>
           </a:xfrm>
           <a:custGeom>
             <a:avLst/>
@@ -6619,7 +6619,7 @@
         <p:spPr>
           <a:xfrm>
             <a:off x="468000" y="1289160"/>
-            <a:ext cx="172080" cy="3025080"/>
+            <a:ext cx="171720" cy="3024720"/>
           </a:xfrm>
           <a:custGeom>
             <a:avLst/>
@@ -6718,7 +6718,7 @@
         <p:spPr>
           <a:xfrm>
             <a:off x="1111680" y="6571440"/>
-            <a:ext cx="132120" cy="279360"/>
+            <a:ext cx="131760" cy="279000"/>
           </a:xfrm>
           <a:custGeom>
             <a:avLst/>
@@ -6772,7 +6772,7 @@
         <p:spPr>
           <a:xfrm>
             <a:off x="502560" y="4107600"/>
-            <a:ext cx="80280" cy="509400"/>
+            <a:ext cx="79920" cy="509040"/>
           </a:xfrm>
           <a:custGeom>
             <a:avLst/>
@@ -6841,7 +6841,7 @@
         <p:spPr>
           <a:xfrm>
             <a:off x="973800" y="3145680"/>
-            <a:ext cx="1407960" cy="2714760"/>
+            <a:ext cx="1407600" cy="2714400"/>
           </a:xfrm>
           <a:custGeom>
             <a:avLst/>
@@ -6955,7 +6955,7 @@
         <p:spPr>
           <a:xfrm>
             <a:off x="1073520" y="6600240"/>
-            <a:ext cx="118440" cy="250920"/>
+            <a:ext cx="118080" cy="250560"/>
           </a:xfrm>
           <a:custGeom>
             <a:avLst/>
@@ -7009,7 +7009,7 @@
         <p:spPr>
           <a:xfrm>
             <a:off x="973800" y="5897160"/>
-            <a:ext cx="135720" cy="672120"/>
+            <a:ext cx="135360" cy="671760"/>
           </a:xfrm>
           <a:custGeom>
             <a:avLst/>
@@ -7083,7 +7083,7 @@
         <p:spPr>
           <a:xfrm>
             <a:off x="973800" y="5772600"/>
-            <a:ext cx="36000" cy="225720"/>
+            <a:ext cx="35640" cy="225360"/>
           </a:xfrm>
           <a:custGeom>
             <a:avLst/>
@@ -7152,7 +7152,7 @@
         <p:spPr>
           <a:xfrm>
             <a:off x="1006200" y="6322680"/>
-            <a:ext cx="208440" cy="528480"/>
+            <a:ext cx="208080" cy="528120"/>
           </a:xfrm>
           <a:custGeom>
             <a:avLst/>
@@ -7226,7 +7226,7 @@
         <p:spPr>
           <a:xfrm>
             <a:off x="0" y="0"/>
-            <a:ext cx="180720" cy="6855840"/>
+            <a:ext cx="180360" cy="6855480"/>
           </a:xfrm>
           <a:prstGeom prst="rect">
             <a:avLst/>
@@ -7267,7 +7267,7 @@
         <p:spPr>
           <a:xfrm flipV="1">
             <a:off x="-4320" y="712080"/>
-            <a:ext cx="1586520" cy="505080"/>
+            <a:ext cx="1586160" cy="504720"/>
           </a:xfrm>
           <a:custGeom>
             <a:avLst/>
@@ -7710,7 +7710,7 @@
         <p:spPr>
           <a:xfrm>
             <a:off x="2589120" y="792720"/>
-            <a:ext cx="8913240" cy="2260800"/>
+            <a:ext cx="8912880" cy="2260440"/>
           </a:xfrm>
           <a:prstGeom prst="rect">
             <a:avLst/>
@@ -7800,7 +7800,7 @@
         <p:spPr>
           <a:xfrm>
             <a:off x="2589120" y="4777200"/>
-            <a:ext cx="8913240" cy="1124280"/>
+            <a:ext cx="8912880" cy="1123920"/>
           </a:xfrm>
           <a:prstGeom prst="rect">
             <a:avLst/>
@@ -7911,7 +7911,7 @@
         <p:spPr>
           <a:xfrm>
             <a:off x="2593080" y="624240"/>
-            <a:ext cx="8909640" cy="1278720"/>
+            <a:ext cx="8909280" cy="1278360"/>
           </a:xfrm>
           <a:prstGeom prst="rect">
             <a:avLst/>
@@ -7973,7 +7973,7 @@
         <p:spPr>
           <a:xfrm>
             <a:off x="2589120" y="2133720"/>
-            <a:ext cx="8913240" cy="3775320"/>
+            <a:ext cx="8912880" cy="3774960"/>
           </a:xfrm>
           <a:prstGeom prst="rect">
             <a:avLst/>
@@ -7992,7 +7992,7 @@
         <p:txBody>
           <a:bodyPr lIns="90000" rIns="90000" tIns="45000" bIns="45000"/>
           <a:p>
-            <a:pPr marL="343080" indent="-340920">
+            <a:pPr marL="343080" indent="-340560">
               <a:lnSpc>
                 <a:spcPct val="100000"/>
               </a:lnSpc>
@@ -8045,7 +8045,7 @@
             </a:endParaRPr>
           </a:p>
           <a:p>
-            <a:pPr marL="343080" indent="-340920">
+            <a:pPr marL="343080" indent="-340560">
               <a:lnSpc>
                 <a:spcPct val="100000"/>
               </a:lnSpc>
@@ -8083,7 +8083,7 @@
             </a:endParaRPr>
           </a:p>
           <a:p>
-            <a:pPr marL="343080" indent="-340920">
+            <a:pPr marL="343080" indent="-340560">
               <a:lnSpc>
                 <a:spcPct val="100000"/>
               </a:lnSpc>
@@ -8151,7 +8151,7 @@
             </a:endParaRPr>
           </a:p>
           <a:p>
-            <a:pPr marL="343080" indent="-340920">
+            <a:pPr marL="343080" indent="-340560">
               <a:lnSpc>
                 <a:spcPct val="100000"/>
               </a:lnSpc>
@@ -8189,7 +8189,7 @@
             </a:endParaRPr>
           </a:p>
           <a:p>
-            <a:pPr marL="343080" indent="-340920">
+            <a:pPr marL="343080" indent="-340560">
               <a:lnSpc>
                 <a:spcPct val="100000"/>
               </a:lnSpc>
@@ -8242,7 +8242,7 @@
             </a:endParaRPr>
           </a:p>
           <a:p>
-            <a:pPr marL="343080" indent="-340920">
+            <a:pPr marL="343080" indent="-340560">
               <a:lnSpc>
                 <a:spcPct val="100000"/>
               </a:lnSpc>
@@ -8295,7 +8295,7 @@
             </a:endParaRPr>
           </a:p>
           <a:p>
-            <a:pPr marL="343080" indent="-340920">
+            <a:pPr marL="343080" indent="-340560">
               <a:lnSpc>
                 <a:spcPct val="100000"/>
               </a:lnSpc>
@@ -8333,7 +8333,7 @@
             </a:endParaRPr>
           </a:p>
           <a:p>
-            <a:pPr marL="343080" indent="-340920">
+            <a:pPr marL="343080" indent="-340560">
               <a:lnSpc>
                 <a:spcPct val="100000"/>
               </a:lnSpc>
@@ -8386,7 +8386,7 @@
             </a:endParaRPr>
           </a:p>
           <a:p>
-            <a:pPr marL="343080" indent="-340920">
+            <a:pPr marL="343080" indent="-340560">
               <a:lnSpc>
                 <a:spcPct val="100000"/>
               </a:lnSpc>
@@ -8439,7 +8439,7 @@
             </a:endParaRPr>
           </a:p>
           <a:p>
-            <a:pPr marL="343080" indent="-340920">
+            <a:pPr marL="343080" indent="-340560">
               <a:lnSpc>
                 <a:spcPct val="100000"/>
               </a:lnSpc>
@@ -8492,7 +8492,7 @@
             </a:endParaRPr>
           </a:p>
           <a:p>
-            <a:pPr marL="343080" indent="-340920">
+            <a:pPr marL="343080" indent="-340560">
               <a:lnSpc>
                 <a:spcPct val="100000"/>
               </a:lnSpc>
@@ -8530,7 +8530,7 @@
             </a:endParaRPr>
           </a:p>
           <a:p>
-            <a:pPr marL="343080" indent="-340920">
+            <a:pPr marL="343080" indent="-340560">
               <a:lnSpc>
                 <a:spcPct val="100000"/>
               </a:lnSpc>
@@ -8583,7 +8583,7 @@
             </a:endParaRPr>
           </a:p>
           <a:p>
-            <a:pPr marL="343080" indent="-340920">
+            <a:pPr marL="343080" indent="-340560">
               <a:lnSpc>
                 <a:spcPct val="100000"/>
               </a:lnSpc>
@@ -8621,7 +8621,7 @@
             </a:endParaRPr>
           </a:p>
           <a:p>
-            <a:pPr marL="343080" indent="-340920">
+            <a:pPr marL="343080" indent="-340560">
               <a:lnSpc>
                 <a:spcPct val="100000"/>
               </a:lnSpc>
@@ -8718,7 +8718,7 @@
         <p:spPr>
           <a:xfrm>
             <a:off x="2593080" y="624240"/>
-            <a:ext cx="8909640" cy="1278720"/>
+            <a:ext cx="8909280" cy="1278360"/>
           </a:xfrm>
           <a:prstGeom prst="rect">
             <a:avLst/>
@@ -8780,7 +8780,7 @@
         <p:spPr>
           <a:xfrm>
             <a:off x="2589120" y="2133720"/>
-            <a:ext cx="8913240" cy="3775320"/>
+            <a:ext cx="8912880" cy="3774960"/>
           </a:xfrm>
           <a:prstGeom prst="rect">
             <a:avLst/>
@@ -8799,7 +8799,7 @@
         <p:txBody>
           <a:bodyPr lIns="90000" rIns="90000" tIns="45000" bIns="45000"/>
           <a:p>
-            <a:pPr marL="343080" indent="-340920">
+            <a:pPr marL="343080" indent="-340560">
               <a:lnSpc>
                 <a:spcPct val="100000"/>
               </a:lnSpc>
@@ -8963,7 +8963,7 @@
             </a:endParaRPr>
           </a:p>
           <a:p>
-            <a:pPr marL="343080" indent="-340920">
+            <a:pPr marL="343080" indent="-340560">
               <a:lnSpc>
                 <a:spcPct val="100000"/>
               </a:lnSpc>
@@ -9031,7 +9031,7 @@
             </a:endParaRPr>
           </a:p>
           <a:p>
-            <a:pPr marL="343080" indent="-340920">
+            <a:pPr marL="343080" indent="-340560">
               <a:lnSpc>
                 <a:spcPct val="100000"/>
               </a:lnSpc>
@@ -9189,7 +9189,7 @@
             </a:endParaRPr>
           </a:p>
           <a:p>
-            <a:pPr marL="343080" indent="-340920">
+            <a:pPr marL="343080" indent="-340560">
               <a:lnSpc>
                 <a:spcPct val="100000"/>
               </a:lnSpc>
@@ -9439,7 +9439,7 @@
         <p:spPr>
           <a:xfrm>
             <a:off x="2593080" y="624240"/>
-            <a:ext cx="8868240" cy="901080"/>
+            <a:ext cx="8867880" cy="900720"/>
           </a:xfrm>
           <a:prstGeom prst="rect">
             <a:avLst/>
@@ -9516,7 +9516,7 @@
         <p:spPr>
           <a:xfrm>
             <a:off x="2776680" y="1895760"/>
-            <a:ext cx="182520" cy="367200"/>
+            <a:ext cx="182160" cy="366840"/>
           </a:xfrm>
           <a:prstGeom prst="rect">
             <a:avLst/>
@@ -9542,7 +9542,7 @@
         <p:spPr>
           <a:xfrm>
             <a:off x="2637360" y="1438560"/>
-            <a:ext cx="182520" cy="367200"/>
+            <a:ext cx="182160" cy="366840"/>
           </a:xfrm>
           <a:prstGeom prst="rect">
             <a:avLst/>
@@ -9568,7 +9568,7 @@
         <p:spPr>
           <a:xfrm>
             <a:off x="3847320" y="2653920"/>
-            <a:ext cx="182520" cy="367200"/>
+            <a:ext cx="182160" cy="366840"/>
           </a:xfrm>
           <a:prstGeom prst="rect">
             <a:avLst/>
@@ -9594,7 +9594,7 @@
         <p:spPr>
           <a:xfrm>
             <a:off x="3456720" y="1706040"/>
-            <a:ext cx="182520" cy="367200"/>
+            <a:ext cx="182160" cy="366840"/>
           </a:xfrm>
           <a:prstGeom prst="rect">
             <a:avLst/>
@@ -9620,7 +9620,7 @@
         <p:spPr>
           <a:xfrm>
             <a:off x="2589120" y="2133720"/>
-            <a:ext cx="8913240" cy="3775320"/>
+            <a:ext cx="8912880" cy="3774960"/>
           </a:xfrm>
           <a:prstGeom prst="rect">
             <a:avLst/>
@@ -9639,7 +9639,7 @@
         <p:txBody>
           <a:bodyPr lIns="90000" rIns="90000" tIns="45000" bIns="45000"/>
           <a:p>
-            <a:pPr marL="343080" indent="-340920">
+            <a:pPr marL="343080" indent="-340560">
               <a:lnSpc>
                 <a:spcPct val="100000"/>
               </a:lnSpc>
@@ -9677,7 +9677,7 @@
             </a:endParaRPr>
           </a:p>
           <a:p>
-            <a:pPr marL="343080" indent="-340920">
+            <a:pPr marL="343080" indent="-340560">
               <a:lnSpc>
                 <a:spcPct val="100000"/>
               </a:lnSpc>
@@ -9715,7 +9715,7 @@
             </a:endParaRPr>
           </a:p>
           <a:p>
-            <a:pPr marL="343080" indent="-340920">
+            <a:pPr marL="343080" indent="-340560">
               <a:lnSpc>
                 <a:spcPct val="100000"/>
               </a:lnSpc>
@@ -9842,7 +9842,7 @@
         <p:spPr>
           <a:xfrm>
             <a:off x="2637360" y="3599640"/>
-            <a:ext cx="8519400" cy="2829960"/>
+            <a:ext cx="8519040" cy="2829600"/>
           </a:xfrm>
           <a:prstGeom prst="rect">
             <a:avLst/>
@@ -9910,7 +9910,7 @@
         <p:spPr>
           <a:xfrm>
             <a:off x="2593080" y="624240"/>
-            <a:ext cx="8909640" cy="1278720"/>
+            <a:ext cx="8909280" cy="1278360"/>
           </a:xfrm>
           <a:prstGeom prst="rect">
             <a:avLst/>
@@ -9987,7 +9987,7 @@
         <p:spPr>
           <a:xfrm>
             <a:off x="2589120" y="2133720"/>
-            <a:ext cx="8913240" cy="3775320"/>
+            <a:ext cx="8912880" cy="3774960"/>
           </a:xfrm>
           <a:prstGeom prst="rect">
             <a:avLst/>
@@ -10006,7 +10006,7 @@
         <p:txBody>
           <a:bodyPr lIns="90000" rIns="90000" tIns="45000" bIns="45000"/>
           <a:p>
-            <a:pPr marL="343080" indent="-340920">
+            <a:pPr marL="343080" indent="-340560">
               <a:lnSpc>
                 <a:spcPct val="100000"/>
               </a:lnSpc>
@@ -10044,7 +10044,7 @@
             </a:endParaRPr>
           </a:p>
           <a:p>
-            <a:pPr marL="343080" indent="-340920">
+            <a:pPr marL="343080" indent="-340560">
               <a:lnSpc>
                 <a:spcPct val="100000"/>
               </a:lnSpc>
@@ -10082,7 +10082,7 @@
             </a:endParaRPr>
           </a:p>
           <a:p>
-            <a:pPr marL="343080" indent="-340920">
+            <a:pPr marL="343080" indent="-340560">
               <a:lnSpc>
                 <a:spcPct val="100000"/>
               </a:lnSpc>
@@ -10135,7 +10135,7 @@
             </a:endParaRPr>
           </a:p>
           <a:p>
-            <a:pPr marL="343080" indent="-340920">
+            <a:pPr marL="343080" indent="-340560">
               <a:lnSpc>
                 <a:spcPct val="100000"/>
               </a:lnSpc>
@@ -10202,7 +10202,7 @@
         <p:spPr>
           <a:xfrm>
             <a:off x="2589120" y="3545280"/>
-            <a:ext cx="8913240" cy="3312720"/>
+            <a:ext cx="8912880" cy="3312360"/>
           </a:xfrm>
           <a:prstGeom prst="rect">
             <a:avLst/>
@@ -10270,7 +10270,7 @@
         <p:spPr>
           <a:xfrm>
             <a:off x="2593080" y="624240"/>
-            <a:ext cx="8909640" cy="1278720"/>
+            <a:ext cx="8909280" cy="1278360"/>
           </a:xfrm>
           <a:prstGeom prst="rect">
             <a:avLst/>
@@ -10437,7 +10437,7 @@
         <p:spPr>
           <a:xfrm>
             <a:off x="2589120" y="2133720"/>
-            <a:ext cx="8913240" cy="3775320"/>
+            <a:ext cx="8912880" cy="3774960"/>
           </a:xfrm>
           <a:prstGeom prst="rect">
             <a:avLst/>
@@ -10456,7 +10456,7 @@
         <p:txBody>
           <a:bodyPr lIns="90000" rIns="90000" tIns="45000" bIns="45000"/>
           <a:p>
-            <a:pPr marL="343080" indent="-340920">
+            <a:pPr marL="343080" indent="-340560">
               <a:lnSpc>
                 <a:spcPct val="100000"/>
               </a:lnSpc>
@@ -10539,7 +10539,7 @@
             </a:endParaRPr>
           </a:p>
           <a:p>
-            <a:pPr marL="343080" indent="-340920">
+            <a:pPr marL="343080" indent="-340560">
               <a:lnSpc>
                 <a:spcPct val="100000"/>
               </a:lnSpc>
@@ -10592,7 +10592,7 @@
             </a:endParaRPr>
           </a:p>
           <a:p>
-            <a:pPr marL="343080" indent="-340920">
+            <a:pPr marL="343080" indent="-340560">
               <a:lnSpc>
                 <a:spcPct val="100000"/>
               </a:lnSpc>
@@ -10755,7 +10755,7 @@
         <p:spPr>
           <a:xfrm>
             <a:off x="2589120" y="3935880"/>
-            <a:ext cx="1989720" cy="2658960"/>
+            <a:ext cx="1989360" cy="2658600"/>
           </a:xfrm>
           <a:prstGeom prst="rect">
             <a:avLst/>
@@ -10778,7 +10778,7 @@
         <p:spPr>
           <a:xfrm>
             <a:off x="7610760" y="3609720"/>
-            <a:ext cx="2212560" cy="3005640"/>
+            <a:ext cx="2212200" cy="3005280"/>
           </a:xfrm>
           <a:prstGeom prst="rect">
             <a:avLst/>
@@ -10846,7 +10846,7 @@
         <p:spPr>
           <a:xfrm>
             <a:off x="2593080" y="624240"/>
-            <a:ext cx="8909640" cy="1278720"/>
+            <a:ext cx="8909280" cy="1278360"/>
           </a:xfrm>
           <a:prstGeom prst="rect">
             <a:avLst/>
@@ -10923,7 +10923,7 @@
         <p:spPr>
           <a:xfrm>
             <a:off x="2589120" y="2133720"/>
-            <a:ext cx="8913240" cy="3775320"/>
+            <a:ext cx="8912880" cy="3774960"/>
           </a:xfrm>
           <a:prstGeom prst="rect">
             <a:avLst/>
@@ -10942,7 +10942,7 @@
         <p:txBody>
           <a:bodyPr lIns="90000" rIns="90000" tIns="45000" bIns="45000"/>
           <a:p>
-            <a:pPr marL="343080" indent="-340920">
+            <a:pPr marL="343080" indent="-340560">
               <a:lnSpc>
                 <a:spcPct val="100000"/>
               </a:lnSpc>
@@ -11072,7 +11072,7 @@
             </a:endParaRPr>
           </a:p>
           <a:p>
-            <a:pPr marL="343080" indent="-340920">
+            <a:pPr marL="343080" indent="-340560">
               <a:lnSpc>
                 <a:spcPct val="100000"/>
               </a:lnSpc>
@@ -11201,7 +11201,7 @@
             </a:endParaRPr>
           </a:p>
           <a:p>
-            <a:pPr marL="343080" indent="-340920">
+            <a:pPr marL="343080" indent="-340560">
               <a:lnSpc>
                 <a:spcPct val="100000"/>
               </a:lnSpc>
@@ -11240,7 +11240,7 @@
             </a:endParaRPr>
           </a:p>
           <a:p>
-            <a:pPr marL="343080" indent="-340920">
+            <a:pPr marL="343080" indent="-340560">
               <a:lnSpc>
                 <a:spcPct val="100000"/>
               </a:lnSpc>
@@ -11279,7 +11279,7 @@
             </a:endParaRPr>
           </a:p>
           <a:p>
-            <a:pPr marL="343080" indent="-340920">
+            <a:pPr marL="343080" indent="-340560">
               <a:lnSpc>
                 <a:spcPct val="100000"/>
               </a:lnSpc>
@@ -11349,7 +11349,7 @@
         <p:spPr>
           <a:xfrm>
             <a:off x="1385640" y="4577760"/>
-            <a:ext cx="10386360" cy="1559880"/>
+            <a:ext cx="10386000" cy="1559520"/>
           </a:xfrm>
           <a:prstGeom prst="rect">
             <a:avLst/>
@@ -11417,7 +11417,7 @@
         <p:spPr>
           <a:xfrm>
             <a:off x="2593080" y="624240"/>
-            <a:ext cx="8909640" cy="1278720"/>
+            <a:ext cx="8909280" cy="1278360"/>
           </a:xfrm>
           <a:prstGeom prst="rect">
             <a:avLst/>
@@ -11498,7 +11498,7 @@
         <p:spPr>
           <a:xfrm>
             <a:off x="4208400" y="2251080"/>
-            <a:ext cx="5674680" cy="3541320"/>
+            <a:ext cx="5674320" cy="3540960"/>
           </a:xfrm>
           <a:prstGeom prst="rect">
             <a:avLst/>
@@ -11566,7 +11566,7 @@
         <p:spPr>
           <a:xfrm>
             <a:off x="2593080" y="624240"/>
-            <a:ext cx="8909640" cy="1278720"/>
+            <a:ext cx="8909280" cy="1278360"/>
           </a:xfrm>
           <a:prstGeom prst="rect">
             <a:avLst/>
@@ -11643,7 +11643,7 @@
         <p:spPr>
           <a:xfrm>
             <a:off x="2589120" y="2133720"/>
-            <a:ext cx="8913240" cy="3775320"/>
+            <a:ext cx="8912880" cy="3774960"/>
           </a:xfrm>
           <a:prstGeom prst="rect">
             <a:avLst/>
@@ -11662,7 +11662,7 @@
         <p:txBody>
           <a:bodyPr lIns="90000" rIns="90000" tIns="45000" bIns="45000"/>
           <a:p>
-            <a:pPr marL="343080" indent="-340920">
+            <a:pPr marL="343080" indent="-340560">
               <a:lnSpc>
                 <a:spcPct val="100000"/>
               </a:lnSpc>
@@ -11775,7 +11775,7 @@
             </a:endParaRPr>
           </a:p>
           <a:p>
-            <a:pPr marL="343080" indent="-340920">
+            <a:pPr marL="343080" indent="-340560">
               <a:lnSpc>
                 <a:spcPct val="100000"/>
               </a:lnSpc>
@@ -11828,7 +11828,7 @@
             </a:endParaRPr>
           </a:p>
           <a:p>
-            <a:pPr marL="343080" indent="-340920">
+            <a:pPr marL="343080" indent="-340560">
               <a:lnSpc>
                 <a:spcPct val="100000"/>
               </a:lnSpc>
@@ -11926,7 +11926,7 @@
             </a:endParaRPr>
           </a:p>
           <a:p>
-            <a:pPr marL="343080" indent="-340920">
+            <a:pPr marL="343080" indent="-340560">
               <a:lnSpc>
                 <a:spcPct val="100000"/>
               </a:lnSpc>
@@ -11979,7 +11979,7 @@
             </a:endParaRPr>
           </a:p>
           <a:p>
-            <a:pPr marL="343080" indent="-340920">
+            <a:pPr marL="343080" indent="-340560">
               <a:lnSpc>
                 <a:spcPct val="100000"/>
               </a:lnSpc>
@@ -12017,7 +12017,7 @@
             </a:endParaRPr>
           </a:p>
           <a:p>
-            <a:pPr marL="343080" indent="-340920">
+            <a:pPr marL="343080" indent="-340560">
               <a:lnSpc>
                 <a:spcPct val="100000"/>
               </a:lnSpc>
@@ -12129,7 +12129,7 @@
         <p:spPr>
           <a:xfrm>
             <a:off x="2593080" y="624240"/>
-            <a:ext cx="8909640" cy="1278720"/>
+            <a:ext cx="8909280" cy="1278360"/>
           </a:xfrm>
           <a:prstGeom prst="rect">
             <a:avLst/>
@@ -12206,7 +12206,7 @@
         <p:spPr>
           <a:xfrm>
             <a:off x="2589120" y="2133720"/>
-            <a:ext cx="8913240" cy="3775320"/>
+            <a:ext cx="8912880" cy="3774960"/>
           </a:xfrm>
           <a:prstGeom prst="rect">
             <a:avLst/>
@@ -12225,7 +12225,7 @@
         <p:txBody>
           <a:bodyPr lIns="90000" rIns="90000" tIns="45000" bIns="45000"/>
           <a:p>
-            <a:pPr marL="343080" indent="-340920">
+            <a:pPr marL="343080" indent="-340560">
               <a:lnSpc>
                 <a:spcPct val="100000"/>
               </a:lnSpc>
@@ -12263,7 +12263,7 @@
             </a:endParaRPr>
           </a:p>
           <a:p>
-            <a:pPr marL="343080" indent="-340920">
+            <a:pPr marL="343080" indent="-340560">
               <a:lnSpc>
                 <a:spcPct val="100000"/>
               </a:lnSpc>
@@ -12301,7 +12301,7 @@
             </a:endParaRPr>
           </a:p>
           <a:p>
-            <a:pPr marL="343080" indent="-340920">
+            <a:pPr marL="343080" indent="-340560">
               <a:lnSpc>
                 <a:spcPct val="100000"/>
               </a:lnSpc>
@@ -12339,7 +12339,7 @@
             </a:endParaRPr>
           </a:p>
           <a:p>
-            <a:pPr marL="343080" indent="-340920">
+            <a:pPr marL="343080" indent="-340560">
               <a:lnSpc>
                 <a:spcPct val="100000"/>
               </a:lnSpc>
@@ -12392,7 +12392,7 @@
             </a:endParaRPr>
           </a:p>
           <a:p>
-            <a:pPr marL="343080" indent="-340920">
+            <a:pPr marL="343080" indent="-340560">
               <a:lnSpc>
                 <a:spcPct val="100000"/>
               </a:lnSpc>
@@ -12430,7 +12430,7 @@
             </a:endParaRPr>
           </a:p>
           <a:p>
-            <a:pPr marL="343080" indent="-340920">
+            <a:pPr marL="343080" indent="-340560">
               <a:lnSpc>
                 <a:spcPct val="100000"/>
               </a:lnSpc>
@@ -12563,7 +12563,7 @@
         <p:spPr>
           <a:xfrm>
             <a:off x="2593080" y="624240"/>
-            <a:ext cx="8909640" cy="1278720"/>
+            <a:ext cx="8909280" cy="1278360"/>
           </a:xfrm>
           <a:prstGeom prst="rect">
             <a:avLst/>
@@ -12625,7 +12625,7 @@
         <p:spPr>
           <a:xfrm>
             <a:off x="2589120" y="2133720"/>
-            <a:ext cx="8913240" cy="3775320"/>
+            <a:ext cx="8912880" cy="3774960"/>
           </a:xfrm>
           <a:prstGeom prst="rect">
             <a:avLst/>
@@ -12644,7 +12644,7 @@
         <p:txBody>
           <a:bodyPr lIns="90000" rIns="90000" tIns="45000" bIns="45000"/>
           <a:p>
-            <a:pPr marL="343080" indent="-340920">
+            <a:pPr marL="343080" indent="-340560">
               <a:lnSpc>
                 <a:spcPct val="100000"/>
               </a:lnSpc>
@@ -12697,7 +12697,7 @@
             </a:endParaRPr>
           </a:p>
           <a:p>
-            <a:pPr marL="343080" indent="-340920">
+            <a:pPr marL="343080" indent="-340560">
               <a:lnSpc>
                 <a:spcPct val="100000"/>
               </a:lnSpc>
@@ -12765,7 +12765,7 @@
             </a:endParaRPr>
           </a:p>
           <a:p>
-            <a:pPr marL="343080" indent="-340920">
+            <a:pPr marL="343080" indent="-340560">
               <a:lnSpc>
                 <a:spcPct val="100000"/>
               </a:lnSpc>
@@ -12833,7 +12833,7 @@
             </a:endParaRPr>
           </a:p>
           <a:p>
-            <a:pPr marL="343080" indent="-340920">
+            <a:pPr marL="343080" indent="-340560">
               <a:lnSpc>
                 <a:spcPct val="100000"/>
               </a:lnSpc>
@@ -12975,7 +12975,7 @@
         <p:spPr>
           <a:xfrm>
             <a:off x="2593080" y="624240"/>
-            <a:ext cx="8909640" cy="1278720"/>
+            <a:ext cx="8909280" cy="1278360"/>
           </a:xfrm>
           <a:prstGeom prst="rect">
             <a:avLst/>
@@ -13052,7 +13052,7 @@
         <p:spPr>
           <a:xfrm>
             <a:off x="2589120" y="2133720"/>
-            <a:ext cx="8913240" cy="3775320"/>
+            <a:ext cx="8912880" cy="3774960"/>
           </a:xfrm>
           <a:prstGeom prst="rect">
             <a:avLst/>
@@ -13071,7 +13071,7 @@
         <p:txBody>
           <a:bodyPr lIns="90000" rIns="90000" tIns="45000" bIns="45000"/>
           <a:p>
-            <a:pPr marL="343080" indent="-340920">
+            <a:pPr marL="343080" indent="-340560">
               <a:lnSpc>
                 <a:spcPct val="100000"/>
               </a:lnSpc>
@@ -13139,7 +13139,7 @@
             </a:endParaRPr>
           </a:p>
           <a:p>
-            <a:pPr marL="343080" indent="-340920">
+            <a:pPr marL="343080" indent="-340560">
               <a:lnSpc>
                 <a:spcPct val="100000"/>
               </a:lnSpc>
@@ -13297,7 +13297,7 @@
             </a:endParaRPr>
           </a:p>
           <a:p>
-            <a:pPr marL="343080" indent="-340920">
+            <a:pPr marL="343080" indent="-340560">
               <a:lnSpc>
                 <a:spcPct val="100000"/>
               </a:lnSpc>
@@ -13410,7 +13410,7 @@
             </a:endParaRPr>
           </a:p>
           <a:p>
-            <a:pPr marL="343080" indent="-340920">
+            <a:pPr marL="343080" indent="-340560">
               <a:lnSpc>
                 <a:spcPct val="100000"/>
               </a:lnSpc>
@@ -13493,7 +13493,7 @@
             </a:endParaRPr>
           </a:p>
           <a:p>
-            <a:pPr marL="343080" indent="-340920">
+            <a:pPr marL="343080" indent="-340560">
               <a:lnSpc>
                 <a:spcPct val="100000"/>
               </a:lnSpc>
@@ -13546,7 +13546,7 @@
             </a:endParaRPr>
           </a:p>
           <a:p>
-            <a:pPr marL="343080" indent="-340920">
+            <a:pPr marL="343080" indent="-340560">
               <a:lnSpc>
                 <a:spcPct val="100000"/>
               </a:lnSpc>
@@ -13614,7 +13614,7 @@
             </a:endParaRPr>
           </a:p>
           <a:p>
-            <a:pPr marL="343080" indent="-340920">
+            <a:pPr marL="343080" indent="-340560">
               <a:lnSpc>
                 <a:spcPct val="100000"/>
               </a:lnSpc>
@@ -13726,7 +13726,7 @@
         <p:spPr>
           <a:xfrm>
             <a:off x="2593080" y="624240"/>
-            <a:ext cx="8909640" cy="1278720"/>
+            <a:ext cx="8909280" cy="1278360"/>
           </a:xfrm>
           <a:prstGeom prst="rect">
             <a:avLst/>
@@ -13788,7 +13788,7 @@
         <p:spPr>
           <a:xfrm>
             <a:off x="2589120" y="2133720"/>
-            <a:ext cx="8913240" cy="3775320"/>
+            <a:ext cx="8912880" cy="3774960"/>
           </a:xfrm>
           <a:prstGeom prst="rect">
             <a:avLst/>
@@ -13807,7 +13807,7 @@
         <p:txBody>
           <a:bodyPr lIns="90000" rIns="90000" tIns="45000" bIns="45000"/>
           <a:p>
-            <a:pPr marL="343080" indent="-340920">
+            <a:pPr marL="343080" indent="-340560">
               <a:lnSpc>
                 <a:spcPct val="100000"/>
               </a:lnSpc>
@@ -13860,7 +13860,7 @@
             </a:endParaRPr>
           </a:p>
           <a:p>
-            <a:pPr marL="343080" indent="-340920">
+            <a:pPr marL="343080" indent="-340560">
               <a:lnSpc>
                 <a:spcPct val="100000"/>
               </a:lnSpc>
@@ -13898,7 +13898,7 @@
             </a:endParaRPr>
           </a:p>
           <a:p>
-            <a:pPr marL="343080" indent="-340920">
+            <a:pPr marL="343080" indent="-340560">
               <a:lnSpc>
                 <a:spcPct val="100000"/>
               </a:lnSpc>
@@ -13951,7 +13951,7 @@
             </a:endParaRPr>
           </a:p>
           <a:p>
-            <a:pPr marL="343080" indent="-340920">
+            <a:pPr marL="343080" indent="-340560">
               <a:lnSpc>
                 <a:spcPct val="100000"/>
               </a:lnSpc>
@@ -14151,7 +14151,7 @@
             </a:endParaRPr>
           </a:p>
           <a:p>
-            <a:pPr marL="343080" indent="-340920">
+            <a:pPr marL="343080" indent="-340560">
               <a:lnSpc>
                 <a:spcPct val="100000"/>
               </a:lnSpc>
@@ -14296,7 +14296,7 @@
         <p:spPr>
           <a:xfrm>
             <a:off x="2593080" y="624240"/>
-            <a:ext cx="8909640" cy="1278720"/>
+            <a:ext cx="8909280" cy="1278360"/>
           </a:xfrm>
           <a:prstGeom prst="rect">
             <a:avLst/>
@@ -14358,7 +14358,7 @@
         <p:spPr>
           <a:xfrm>
             <a:off x="2589120" y="2133720"/>
-            <a:ext cx="8913240" cy="3775320"/>
+            <a:ext cx="8912880" cy="3774960"/>
           </a:xfrm>
           <a:prstGeom prst="rect">
             <a:avLst/>
@@ -14377,7 +14377,7 @@
         <p:txBody>
           <a:bodyPr lIns="90000" rIns="90000" tIns="45000" bIns="45000"/>
           <a:p>
-            <a:pPr marL="343080" indent="-340920">
+            <a:pPr marL="343080" indent="-340560">
               <a:lnSpc>
                 <a:spcPct val="100000"/>
               </a:lnSpc>
@@ -14460,7 +14460,7 @@
             </a:endParaRPr>
           </a:p>
           <a:p>
-            <a:pPr marL="343080" indent="-340920">
+            <a:pPr marL="343080" indent="-340560">
               <a:lnSpc>
                 <a:spcPct val="100000"/>
               </a:lnSpc>
@@ -14498,7 +14498,7 @@
             </a:endParaRPr>
           </a:p>
           <a:p>
-            <a:pPr marL="343080" indent="-340920">
+            <a:pPr marL="343080" indent="-340560">
               <a:lnSpc>
                 <a:spcPct val="100000"/>
               </a:lnSpc>
@@ -14536,7 +14536,7 @@
             </a:endParaRPr>
           </a:p>
           <a:p>
-            <a:pPr marL="343080" indent="-340920">
+            <a:pPr marL="343080" indent="-340560">
               <a:lnSpc>
                 <a:spcPct val="100000"/>
               </a:lnSpc>
@@ -14696,7 +14696,7 @@
         <p:spPr>
           <a:xfrm>
             <a:off x="2593080" y="624240"/>
-            <a:ext cx="8909640" cy="1278720"/>
+            <a:ext cx="8909280" cy="1278360"/>
           </a:xfrm>
           <a:prstGeom prst="rect">
             <a:avLst/>
@@ -14758,7 +14758,7 @@
         <p:spPr>
           <a:xfrm>
             <a:off x="2589120" y="2133720"/>
-            <a:ext cx="8913240" cy="3775320"/>
+            <a:ext cx="8912880" cy="3774960"/>
           </a:xfrm>
           <a:prstGeom prst="rect">
             <a:avLst/>
@@ -14777,7 +14777,7 @@
         <p:txBody>
           <a:bodyPr lIns="90000" rIns="90000" tIns="45000" bIns="45000"/>
           <a:p>
-            <a:pPr marL="343080" indent="-340920">
+            <a:pPr marL="343080" indent="-340560">
               <a:lnSpc>
                 <a:spcPct val="100000"/>
               </a:lnSpc>
@@ -14923,7 +14923,7 @@
             </a:endParaRPr>
           </a:p>
           <a:p>
-            <a:pPr marL="343080" indent="-340920">
+            <a:pPr marL="343080" indent="-340560">
               <a:lnSpc>
                 <a:spcPct val="100000"/>
               </a:lnSpc>
@@ -15069,7 +15069,7 @@
             </a:endParaRPr>
           </a:p>
           <a:p>
-            <a:pPr marL="343080" indent="-340920">
+            <a:pPr marL="343080" indent="-340560">
               <a:lnSpc>
                 <a:spcPct val="100000"/>
               </a:lnSpc>
@@ -15292,7 +15292,7 @@
         <p:spPr>
           <a:xfrm>
             <a:off x="2593080" y="624240"/>
-            <a:ext cx="8909640" cy="1278720"/>
+            <a:ext cx="8909280" cy="1278360"/>
           </a:xfrm>
           <a:prstGeom prst="rect">
             <a:avLst/>
@@ -15354,7 +15354,7 @@
         <p:spPr>
           <a:xfrm>
             <a:off x="2589120" y="2133720"/>
-            <a:ext cx="8913240" cy="3775320"/>
+            <a:ext cx="8912880" cy="3774960"/>
           </a:xfrm>
           <a:prstGeom prst="rect">
             <a:avLst/>
@@ -15373,7 +15373,7 @@
         <p:txBody>
           <a:bodyPr lIns="90000" rIns="90000" tIns="45000" bIns="45000"/>
           <a:p>
-            <a:pPr marL="343080" indent="-340920">
+            <a:pPr marL="343080" indent="-340560">
               <a:lnSpc>
                 <a:spcPct val="100000"/>
               </a:lnSpc>
@@ -15441,7 +15441,7 @@
             </a:endParaRPr>
           </a:p>
           <a:p>
-            <a:pPr marL="343080" indent="-340920">
+            <a:pPr marL="343080" indent="-340560">
               <a:lnSpc>
                 <a:spcPct val="100000"/>
               </a:lnSpc>
@@ -15479,7 +15479,7 @@
             </a:endParaRPr>
           </a:p>
           <a:p>
-            <a:pPr marL="343080" indent="-340920">
+            <a:pPr marL="343080" indent="-340560">
               <a:lnSpc>
                 <a:spcPct val="100000"/>
               </a:lnSpc>
@@ -15532,7 +15532,7 @@
             </a:endParaRPr>
           </a:p>
           <a:p>
-            <a:pPr marL="343080" indent="-340920">
+            <a:pPr marL="343080" indent="-340560">
               <a:lnSpc>
                 <a:spcPct val="100000"/>
               </a:lnSpc>
@@ -15615,7 +15615,7 @@
             </a:endParaRPr>
           </a:p>
           <a:p>
-            <a:pPr marL="343080" indent="-340920">
+            <a:pPr marL="343080" indent="-340560">
               <a:lnSpc>
                 <a:spcPct val="100000"/>
               </a:lnSpc>
@@ -15746,7 +15746,7 @@
             </a:endParaRPr>
           </a:p>
           <a:p>
-            <a:pPr marL="343080" indent="-340920">
+            <a:pPr marL="343080" indent="-340560">
               <a:lnSpc>
                 <a:spcPct val="100000"/>
               </a:lnSpc>
@@ -15844,7 +15844,7 @@
             </a:endParaRPr>
           </a:p>
           <a:p>
-            <a:pPr marL="343080" indent="-340920">
+            <a:pPr marL="343080" indent="-340560">
               <a:lnSpc>
                 <a:spcPct val="100000"/>
               </a:lnSpc>
@@ -15868,6 +15868,44 @@
                 <a:ea typeface="DejaVu Sans"/>
               </a:rPr>
               <a:t>适合场景：保存最近一段时间的热门数据。</a:t>
+            </a:r>
+            <a:endParaRPr b="0" lang="en-US" sz="1800" spc="-1" strike="noStrike">
+              <a:solidFill>
+                <a:srgbClr val="000000"/>
+              </a:solidFill>
+              <a:uFill>
+                <a:solidFill>
+                  <a:srgbClr val="ffffff"/>
+                </a:solidFill>
+              </a:uFill>
+              <a:latin typeface="Arial"/>
+            </a:endParaRPr>
+          </a:p>
+          <a:p>
+            <a:pPr marL="343080" indent="-340560">
+              <a:lnSpc>
+                <a:spcPct val="100000"/>
+              </a:lnSpc>
+              <a:buClr>
+                <a:srgbClr val="a53010"/>
+              </a:buClr>
+              <a:buFont typeface="Wingdings 3" charset="2"/>
+              <a:buChar char=""/>
+            </a:pPr>
+            <a:r>
+              <a:rPr b="0" lang="en-US" sz="1800" spc="-1" strike="noStrike">
+                <a:solidFill>
+                  <a:srgbClr val="404040"/>
+                </a:solidFill>
+                <a:uFill>
+                  <a:solidFill>
+                    <a:srgbClr val="ffffff"/>
+                  </a:solidFill>
+                </a:uFill>
+                <a:latin typeface="Century Gothic"/>
+                <a:ea typeface="DejaVu Sans"/>
+              </a:rPr>
+              <a:t>注：对过期索引字段的查询可以命中过期索引。</a:t>
             </a:r>
             <a:endParaRPr b="0" lang="en-US" sz="1800" spc="-1" strike="noStrike">
               <a:solidFill>

</xml_diff>